<commit_message>
Abhilash | modified the docker PPT
</commit_message>
<xml_diff>
--- a/Docker.pptx
+++ b/Docker.pptx
@@ -7,11 +7,14 @@
   <p:sldIdLst>
     <p:sldId id="256" r:id="rId2"/>
     <p:sldId id="257" r:id="rId3"/>
-    <p:sldId id="260" r:id="rId4"/>
-    <p:sldId id="258" r:id="rId5"/>
-    <p:sldId id="262" r:id="rId6"/>
-    <p:sldId id="261" r:id="rId7"/>
-    <p:sldId id="259" r:id="rId8"/>
+    <p:sldId id="263" r:id="rId4"/>
+    <p:sldId id="260" r:id="rId5"/>
+    <p:sldId id="264" r:id="rId6"/>
+    <p:sldId id="265" r:id="rId7"/>
+    <p:sldId id="266" r:id="rId8"/>
+    <p:sldId id="262" r:id="rId9"/>
+    <p:sldId id="261" r:id="rId10"/>
+    <p:sldId id="259" r:id="rId11"/>
   </p:sldIdLst>
   <p:sldSz cx="12192000" cy="6858000"/>
   <p:notesSz cx="6858000" cy="9144000"/>
@@ -110,6 +113,11 @@
       </a:defRPr>
     </a:lvl9pPr>
   </p:defaultTextStyle>
+  <p:extLst>
+    <p:ext uri="{EFAFB233-063F-42B5-8137-9DF3F51BA10A}">
+      <p15:sldGuideLst xmlns:p15="http://schemas.microsoft.com/office/powerpoint/2012/main"/>
+    </p:ext>
+  </p:extLst>
 </p:presentation>
 </file>
 
@@ -125,19 +133,19 @@
 <pc:chgInfo xmlns:a="http://schemas.openxmlformats.org/drawingml/2006/main" xmlns:r="http://schemas.openxmlformats.org/officeDocument/2006/relationships" xmlns:ac="http://schemas.microsoft.com/office/drawing/2013/main/command" xmlns:pc="http://schemas.microsoft.com/office/powerpoint/2013/main/command">
   <pc:docChgLst>
     <pc:chgData name="Abhilash Binkam" userId="c140e357ae8ecf43" providerId="LiveId" clId="{830B5186-96FA-40ED-BFDB-D1FE4C9834D1}"/>
-    <pc:docChg chg="undo custSel mod addSld modSld">
-      <pc:chgData name="Abhilash Binkam" userId="c140e357ae8ecf43" providerId="LiveId" clId="{830B5186-96FA-40ED-BFDB-D1FE4C9834D1}" dt="2020-12-05T18:36:36.262" v="1443" actId="13822"/>
+    <pc:docChg chg="undo custSel mod addSld delSld modSld">
+      <pc:chgData name="Abhilash Binkam" userId="c140e357ae8ecf43" providerId="LiveId" clId="{830B5186-96FA-40ED-BFDB-D1FE4C9834D1}" dt="2020-12-08T05:44:10.951" v="3078" actId="113"/>
       <pc:docMkLst>
         <pc:docMk/>
       </pc:docMkLst>
       <pc:sldChg chg="modSp mod">
-        <pc:chgData name="Abhilash Binkam" userId="c140e357ae8ecf43" providerId="LiveId" clId="{830B5186-96FA-40ED-BFDB-D1FE4C9834D1}" dt="2020-12-05T18:08:31.424" v="1130" actId="20577"/>
+        <pc:chgData name="Abhilash Binkam" userId="c140e357ae8ecf43" providerId="LiveId" clId="{830B5186-96FA-40ED-BFDB-D1FE4C9834D1}" dt="2020-12-07T17:55:26.520" v="1510" actId="20577"/>
         <pc:sldMkLst>
           <pc:docMk/>
           <pc:sldMk cId="2022134564" sldId="257"/>
         </pc:sldMkLst>
         <pc:spChg chg="mod">
-          <ac:chgData name="Abhilash Binkam" userId="c140e357ae8ecf43" providerId="LiveId" clId="{830B5186-96FA-40ED-BFDB-D1FE4C9834D1}" dt="2020-12-05T18:08:31.424" v="1130" actId="20577"/>
+          <ac:chgData name="Abhilash Binkam" userId="c140e357ae8ecf43" providerId="LiveId" clId="{830B5186-96FA-40ED-BFDB-D1FE4C9834D1}" dt="2020-12-07T17:55:26.520" v="1510" actId="20577"/>
           <ac:spMkLst>
             <pc:docMk/>
             <pc:sldMk cId="2022134564" sldId="257"/>
@@ -145,8 +153,8 @@
           </ac:spMkLst>
         </pc:spChg>
       </pc:sldChg>
-      <pc:sldChg chg="modSp new mod">
-        <pc:chgData name="Abhilash Binkam" userId="c140e357ae8ecf43" providerId="LiveId" clId="{830B5186-96FA-40ED-BFDB-D1FE4C9834D1}" dt="2020-12-05T18:19:16.280" v="1326" actId="12"/>
+      <pc:sldChg chg="modSp new del mod">
+        <pc:chgData name="Abhilash Binkam" userId="c140e357ae8ecf43" providerId="LiveId" clId="{830B5186-96FA-40ED-BFDB-D1FE4C9834D1}" dt="2020-12-07T17:56:39.279" v="1511" actId="2696"/>
         <pc:sldMkLst>
           <pc:docMk/>
           <pc:sldMk cId="991052440" sldId="258"/>
@@ -352,7 +360,7 @@
         </pc:graphicFrameChg>
       </pc:sldChg>
       <pc:sldChg chg="addSp delSp modSp new mod">
-        <pc:chgData name="Abhilash Binkam" userId="c140e357ae8ecf43" providerId="LiveId" clId="{830B5186-96FA-40ED-BFDB-D1FE4C9834D1}" dt="2020-12-05T18:08:07.104" v="1129" actId="20577"/>
+        <pc:chgData name="Abhilash Binkam" userId="c140e357ae8ecf43" providerId="LiveId" clId="{830B5186-96FA-40ED-BFDB-D1FE4C9834D1}" dt="2020-12-07T12:55:43.045" v="1444" actId="1076"/>
         <pc:sldMkLst>
           <pc:docMk/>
           <pc:sldMk cId="4025168152" sldId="260"/>
@@ -486,7 +494,7 @@
           </ac:spMkLst>
         </pc:spChg>
         <pc:spChg chg="add mod">
-          <ac:chgData name="Abhilash Binkam" userId="c140e357ae8ecf43" providerId="LiveId" clId="{830B5186-96FA-40ED-BFDB-D1FE4C9834D1}" dt="2020-12-05T18:07:06.767" v="1106" actId="14100"/>
+          <ac:chgData name="Abhilash Binkam" userId="c140e357ae8ecf43" providerId="LiveId" clId="{830B5186-96FA-40ED-BFDB-D1FE4C9834D1}" dt="2020-12-07T12:55:43.045" v="1444" actId="1076"/>
           <ac:spMkLst>
             <pc:docMk/>
             <pc:sldMk cId="4025168152" sldId="260"/>
@@ -747,6 +755,402 @@
             <ac:cxnSpMk id="31" creationId="{AA73B5E1-05A8-48FA-9B43-FC02C7D686B7}"/>
           </ac:cxnSpMkLst>
         </pc:cxnChg>
+      </pc:sldChg>
+      <pc:sldChg chg="addSp delSp modSp new mod">
+        <pc:chgData name="Abhilash Binkam" userId="c140e357ae8ecf43" providerId="LiveId" clId="{830B5186-96FA-40ED-BFDB-D1FE4C9834D1}" dt="2020-12-07T18:39:54.487" v="1815" actId="11529"/>
+        <pc:sldMkLst>
+          <pc:docMk/>
+          <pc:sldMk cId="134822380" sldId="263"/>
+        </pc:sldMkLst>
+        <pc:spChg chg="mod">
+          <ac:chgData name="Abhilash Binkam" userId="c140e357ae8ecf43" providerId="LiveId" clId="{830B5186-96FA-40ED-BFDB-D1FE4C9834D1}" dt="2020-12-07T17:59:58.267" v="1532" actId="14100"/>
+          <ac:spMkLst>
+            <pc:docMk/>
+            <pc:sldMk cId="134822380" sldId="263"/>
+            <ac:spMk id="2" creationId="{FCD3EC6A-BFA6-4457-984C-4DA3AEC5C181}"/>
+          </ac:spMkLst>
+        </pc:spChg>
+        <pc:spChg chg="add del mod">
+          <ac:chgData name="Abhilash Binkam" userId="c140e357ae8ecf43" providerId="LiveId" clId="{830B5186-96FA-40ED-BFDB-D1FE4C9834D1}" dt="2020-12-07T17:59:39.593" v="1526" actId="931"/>
+          <ac:spMkLst>
+            <pc:docMk/>
+            <pc:sldMk cId="134822380" sldId="263"/>
+            <ac:spMk id="3" creationId="{B9618239-4EE3-4934-BD37-34424C0F196D}"/>
+          </ac:spMkLst>
+        </pc:spChg>
+        <pc:spChg chg="add mod">
+          <ac:chgData name="Abhilash Binkam" userId="c140e357ae8ecf43" providerId="LiveId" clId="{830B5186-96FA-40ED-BFDB-D1FE4C9834D1}" dt="2020-12-07T18:17:11.106" v="1720" actId="255"/>
+          <ac:spMkLst>
+            <pc:docMk/>
+            <pc:sldMk cId="134822380" sldId="263"/>
+            <ac:spMk id="6" creationId="{B5EF9DF3-FE6B-4890-AFAB-0DE5D83B98B6}"/>
+          </ac:spMkLst>
+        </pc:spChg>
+        <pc:spChg chg="add mod">
+          <ac:chgData name="Abhilash Binkam" userId="c140e357ae8ecf43" providerId="LiveId" clId="{830B5186-96FA-40ED-BFDB-D1FE4C9834D1}" dt="2020-12-07T18:03:10.225" v="1593" actId="1076"/>
+          <ac:spMkLst>
+            <pc:docMk/>
+            <pc:sldMk cId="134822380" sldId="263"/>
+            <ac:spMk id="10" creationId="{D4571C5B-6DE4-46D5-8D8E-DC61DEF84732}"/>
+          </ac:spMkLst>
+        </pc:spChg>
+        <pc:spChg chg="add mod">
+          <ac:chgData name="Abhilash Binkam" userId="c140e357ae8ecf43" providerId="LiveId" clId="{830B5186-96FA-40ED-BFDB-D1FE4C9834D1}" dt="2020-12-07T18:18:30.466" v="1753" actId="1076"/>
+          <ac:spMkLst>
+            <pc:docMk/>
+            <pc:sldMk cId="134822380" sldId="263"/>
+            <ac:spMk id="13" creationId="{14705B63-E8E0-4192-9F00-A4A86705A08B}"/>
+          </ac:spMkLst>
+        </pc:spChg>
+        <pc:spChg chg="add del mod">
+          <ac:chgData name="Abhilash Binkam" userId="c140e357ae8ecf43" providerId="LiveId" clId="{830B5186-96FA-40ED-BFDB-D1FE4C9834D1}" dt="2020-12-07T18:08:45.536" v="1626" actId="478"/>
+          <ac:spMkLst>
+            <pc:docMk/>
+            <pc:sldMk cId="134822380" sldId="263"/>
+            <ac:spMk id="16" creationId="{B2DBEAA9-F762-4065-831D-FE90F8741519}"/>
+          </ac:spMkLst>
+        </pc:spChg>
+        <pc:spChg chg="add mod">
+          <ac:chgData name="Abhilash Binkam" userId="c140e357ae8ecf43" providerId="LiveId" clId="{830B5186-96FA-40ED-BFDB-D1FE4C9834D1}" dt="2020-12-07T18:18:57.781" v="1755" actId="1076"/>
+          <ac:spMkLst>
+            <pc:docMk/>
+            <pc:sldMk cId="134822380" sldId="263"/>
+            <ac:spMk id="20" creationId="{A3C7A2E1-B9DE-4277-BBD5-5048490F81BE}"/>
+          </ac:spMkLst>
+        </pc:spChg>
+        <pc:spChg chg="add mod">
+          <ac:chgData name="Abhilash Binkam" userId="c140e357ae8ecf43" providerId="LiveId" clId="{830B5186-96FA-40ED-BFDB-D1FE4C9834D1}" dt="2020-12-07T18:23:47.662" v="1781" actId="1076"/>
+          <ac:spMkLst>
+            <pc:docMk/>
+            <pc:sldMk cId="134822380" sldId="263"/>
+            <ac:spMk id="21" creationId="{0BD5A617-6AD5-4FC9-B71D-9BE3F9F3E48C}"/>
+          </ac:spMkLst>
+        </pc:spChg>
+        <pc:spChg chg="add mod">
+          <ac:chgData name="Abhilash Binkam" userId="c140e357ae8ecf43" providerId="LiveId" clId="{830B5186-96FA-40ED-BFDB-D1FE4C9834D1}" dt="2020-12-07T18:18:30.466" v="1753" actId="1076"/>
+          <ac:spMkLst>
+            <pc:docMk/>
+            <pc:sldMk cId="134822380" sldId="263"/>
+            <ac:spMk id="22" creationId="{D533DC40-BC17-49A0-835F-DF09E26E46D3}"/>
+          </ac:spMkLst>
+        </pc:spChg>
+        <pc:spChg chg="add mod">
+          <ac:chgData name="Abhilash Binkam" userId="c140e357ae8ecf43" providerId="LiveId" clId="{830B5186-96FA-40ED-BFDB-D1FE4C9834D1}" dt="2020-12-07T18:18:30.466" v="1753" actId="1076"/>
+          <ac:spMkLst>
+            <pc:docMk/>
+            <pc:sldMk cId="134822380" sldId="263"/>
+            <ac:spMk id="23" creationId="{640A1C4E-7DD8-4ED2-B850-BA0B76C36057}"/>
+          </ac:spMkLst>
+        </pc:spChg>
+        <pc:spChg chg="add mod">
+          <ac:chgData name="Abhilash Binkam" userId="c140e357ae8ecf43" providerId="LiveId" clId="{830B5186-96FA-40ED-BFDB-D1FE4C9834D1}" dt="2020-12-07T18:18:30.466" v="1753" actId="1076"/>
+          <ac:spMkLst>
+            <pc:docMk/>
+            <pc:sldMk cId="134822380" sldId="263"/>
+            <ac:spMk id="24" creationId="{B2C84E39-9B9B-42C5-BF95-D1EADFB69592}"/>
+          </ac:spMkLst>
+        </pc:spChg>
+        <pc:spChg chg="add mod">
+          <ac:chgData name="Abhilash Binkam" userId="c140e357ae8ecf43" providerId="LiveId" clId="{830B5186-96FA-40ED-BFDB-D1FE4C9834D1}" dt="2020-12-07T18:18:30.466" v="1753" actId="1076"/>
+          <ac:spMkLst>
+            <pc:docMk/>
+            <pc:sldMk cId="134822380" sldId="263"/>
+            <ac:spMk id="25" creationId="{B0DE03DC-0CCD-4E46-A09D-235D0741A073}"/>
+          </ac:spMkLst>
+        </pc:spChg>
+        <pc:spChg chg="add mod">
+          <ac:chgData name="Abhilash Binkam" userId="c140e357ae8ecf43" providerId="LiveId" clId="{830B5186-96FA-40ED-BFDB-D1FE4C9834D1}" dt="2020-12-07T18:39:17.841" v="1812" actId="1076"/>
+          <ac:spMkLst>
+            <pc:docMk/>
+            <pc:sldMk cId="134822380" sldId="263"/>
+            <ac:spMk id="28" creationId="{388FB050-6F13-4C0B-83FA-B6274BCF935E}"/>
+          </ac:spMkLst>
+        </pc:spChg>
+        <pc:spChg chg="add mod">
+          <ac:chgData name="Abhilash Binkam" userId="c140e357ae8ecf43" providerId="LiveId" clId="{830B5186-96FA-40ED-BFDB-D1FE4C9834D1}" dt="2020-12-07T18:34:56.544" v="1786" actId="1076"/>
+          <ac:spMkLst>
+            <pc:docMk/>
+            <pc:sldMk cId="134822380" sldId="263"/>
+            <ac:spMk id="31" creationId="{CDB59C54-E5F4-4641-8955-7784892ABB6D}"/>
+          </ac:spMkLst>
+        </pc:spChg>
+        <pc:spChg chg="add mod">
+          <ac:chgData name="Abhilash Binkam" userId="c140e357ae8ecf43" providerId="LiveId" clId="{830B5186-96FA-40ED-BFDB-D1FE4C9834D1}" dt="2020-12-07T18:36:07.753" v="1798" actId="1076"/>
+          <ac:spMkLst>
+            <pc:docMk/>
+            <pc:sldMk cId="134822380" sldId="263"/>
+            <ac:spMk id="34" creationId="{8AE95C0F-0951-4360-A4B9-2BDA24C9CB0A}"/>
+          </ac:spMkLst>
+        </pc:spChg>
+        <pc:spChg chg="add mod">
+          <ac:chgData name="Abhilash Binkam" userId="c140e357ae8ecf43" providerId="LiveId" clId="{830B5186-96FA-40ED-BFDB-D1FE4C9834D1}" dt="2020-12-07T18:36:31.172" v="1800" actId="1076"/>
+          <ac:spMkLst>
+            <pc:docMk/>
+            <pc:sldMk cId="134822380" sldId="263"/>
+            <ac:spMk id="35" creationId="{DAF7BCF3-CBCB-4C9F-BEE8-928F4E3F54B1}"/>
+          </ac:spMkLst>
+        </pc:spChg>
+        <pc:spChg chg="add mod">
+          <ac:chgData name="Abhilash Binkam" userId="c140e357ae8ecf43" providerId="LiveId" clId="{830B5186-96FA-40ED-BFDB-D1FE4C9834D1}" dt="2020-12-07T18:36:35.599" v="1802" actId="1076"/>
+          <ac:spMkLst>
+            <pc:docMk/>
+            <pc:sldMk cId="134822380" sldId="263"/>
+            <ac:spMk id="36" creationId="{1D4BAF5A-9B76-44D7-A46C-2992354CE02F}"/>
+          </ac:spMkLst>
+        </pc:spChg>
+        <pc:spChg chg="add mod">
+          <ac:chgData name="Abhilash Binkam" userId="c140e357ae8ecf43" providerId="LiveId" clId="{830B5186-96FA-40ED-BFDB-D1FE4C9834D1}" dt="2020-12-07T18:36:58.925" v="1808" actId="207"/>
+          <ac:spMkLst>
+            <pc:docMk/>
+            <pc:sldMk cId="134822380" sldId="263"/>
+            <ac:spMk id="37" creationId="{51F9BD81-2952-4D4E-9D83-546BA93E0E27}"/>
+          </ac:spMkLst>
+        </pc:spChg>
+        <pc:spChg chg="add mod">
+          <ac:chgData name="Abhilash Binkam" userId="c140e357ae8ecf43" providerId="LiveId" clId="{830B5186-96FA-40ED-BFDB-D1FE4C9834D1}" dt="2020-12-07T18:36:48.183" v="1807" actId="207"/>
+          <ac:spMkLst>
+            <pc:docMk/>
+            <pc:sldMk cId="134822380" sldId="263"/>
+            <ac:spMk id="38" creationId="{BD7651A6-5114-43C9-8873-3D2160369FE7}"/>
+          </ac:spMkLst>
+        </pc:spChg>
+        <pc:picChg chg="add mod">
+          <ac:chgData name="Abhilash Binkam" userId="c140e357ae8ecf43" providerId="LiveId" clId="{830B5186-96FA-40ED-BFDB-D1FE4C9834D1}" dt="2020-12-07T18:00:00.381" v="1533" actId="1076"/>
+          <ac:picMkLst>
+            <pc:docMk/>
+            <pc:sldMk cId="134822380" sldId="263"/>
+            <ac:picMk id="5" creationId="{2989205D-883E-4277-9941-EB0554851024}"/>
+          </ac:picMkLst>
+        </pc:picChg>
+        <pc:picChg chg="add mod">
+          <ac:chgData name="Abhilash Binkam" userId="c140e357ae8ecf43" providerId="LiveId" clId="{830B5186-96FA-40ED-BFDB-D1FE4C9834D1}" dt="2020-12-07T18:18:57.781" v="1755" actId="1076"/>
+          <ac:picMkLst>
+            <pc:docMk/>
+            <pc:sldMk cId="134822380" sldId="263"/>
+            <ac:picMk id="18" creationId="{C2C72F70-532E-4016-AFD4-3525A4C2C622}"/>
+          </ac:picMkLst>
+        </pc:picChg>
+        <pc:picChg chg="add mod">
+          <ac:chgData name="Abhilash Binkam" userId="c140e357ae8ecf43" providerId="LiveId" clId="{830B5186-96FA-40ED-BFDB-D1FE4C9834D1}" dt="2020-12-07T18:35:26.685" v="1791" actId="14100"/>
+          <ac:picMkLst>
+            <pc:docMk/>
+            <pc:sldMk cId="134822380" sldId="263"/>
+            <ac:picMk id="33" creationId="{06C1417B-2D88-4BFE-812F-6637C8DC9DB8}"/>
+          </ac:picMkLst>
+        </pc:picChg>
+        <pc:cxnChg chg="add mod">
+          <ac:chgData name="Abhilash Binkam" userId="c140e357ae8ecf43" providerId="LiveId" clId="{830B5186-96FA-40ED-BFDB-D1FE4C9834D1}" dt="2020-12-07T18:02:59.563" v="1592" actId="14100"/>
+          <ac:cxnSpMkLst>
+            <pc:docMk/>
+            <pc:sldMk cId="134822380" sldId="263"/>
+            <ac:cxnSpMk id="8" creationId="{E4DAD942-B524-4C64-B4D0-CD8036778119}"/>
+          </ac:cxnSpMkLst>
+        </pc:cxnChg>
+        <pc:cxnChg chg="add mod">
+          <ac:chgData name="Abhilash Binkam" userId="c140e357ae8ecf43" providerId="LiveId" clId="{830B5186-96FA-40ED-BFDB-D1FE4C9834D1}" dt="2020-12-07T18:18:20.022" v="1752" actId="14100"/>
+          <ac:cxnSpMkLst>
+            <pc:docMk/>
+            <pc:sldMk cId="134822380" sldId="263"/>
+            <ac:cxnSpMk id="14" creationId="{F9F0F36E-CB70-40C5-86BA-DD58202DB918}"/>
+          </ac:cxnSpMkLst>
+        </pc:cxnChg>
+        <pc:cxnChg chg="add mod">
+          <ac:chgData name="Abhilash Binkam" userId="c140e357ae8ecf43" providerId="LiveId" clId="{830B5186-96FA-40ED-BFDB-D1FE4C9834D1}" dt="2020-12-07T18:18:57.781" v="1755" actId="1076"/>
+          <ac:cxnSpMkLst>
+            <pc:docMk/>
+            <pc:sldMk cId="134822380" sldId="263"/>
+            <ac:cxnSpMk id="19" creationId="{D2A4B132-2C34-4A40-A999-EA71F362B217}"/>
+          </ac:cxnSpMkLst>
+        </pc:cxnChg>
+        <pc:cxnChg chg="add del mod">
+          <ac:chgData name="Abhilash Binkam" userId="c140e357ae8ecf43" providerId="LiveId" clId="{830B5186-96FA-40ED-BFDB-D1FE4C9834D1}" dt="2020-12-07T18:39:03.992" v="1811" actId="478"/>
+          <ac:cxnSpMkLst>
+            <pc:docMk/>
+            <pc:sldMk cId="134822380" sldId="263"/>
+            <ac:cxnSpMk id="30" creationId="{72B3A8C2-EC11-4E82-A44D-1DDDCB33033C}"/>
+          </ac:cxnSpMkLst>
+        </pc:cxnChg>
+        <pc:cxnChg chg="add mod">
+          <ac:chgData name="Abhilash Binkam" userId="c140e357ae8ecf43" providerId="LiveId" clId="{830B5186-96FA-40ED-BFDB-D1FE4C9834D1}" dt="2020-12-07T18:39:17.841" v="1812" actId="1076"/>
+          <ac:cxnSpMkLst>
+            <pc:docMk/>
+            <pc:sldMk cId="134822380" sldId="263"/>
+            <ac:cxnSpMk id="40" creationId="{A0DBA6C3-4473-4FA7-898C-8187E5BD0ED2}"/>
+          </ac:cxnSpMkLst>
+        </pc:cxnChg>
+        <pc:cxnChg chg="add del mod">
+          <ac:chgData name="Abhilash Binkam" userId="c140e357ae8ecf43" providerId="LiveId" clId="{830B5186-96FA-40ED-BFDB-D1FE4C9834D1}" dt="2020-12-07T18:39:43.013" v="1814" actId="478"/>
+          <ac:cxnSpMkLst>
+            <pc:docMk/>
+            <pc:sldMk cId="134822380" sldId="263"/>
+            <ac:cxnSpMk id="44" creationId="{9BD4E6A7-A162-4B1E-B881-6F3DA184B68C}"/>
+          </ac:cxnSpMkLst>
+        </pc:cxnChg>
+        <pc:cxnChg chg="add">
+          <ac:chgData name="Abhilash Binkam" userId="c140e357ae8ecf43" providerId="LiveId" clId="{830B5186-96FA-40ED-BFDB-D1FE4C9834D1}" dt="2020-12-07T18:39:54.487" v="1815" actId="11529"/>
+          <ac:cxnSpMkLst>
+            <pc:docMk/>
+            <pc:sldMk cId="134822380" sldId="263"/>
+            <ac:cxnSpMk id="46" creationId="{06440271-33FB-44AA-82B9-F42A7632A9E8}"/>
+          </ac:cxnSpMkLst>
+        </pc:cxnChg>
+      </pc:sldChg>
+      <pc:sldChg chg="addSp delSp modSp new mod">
+        <pc:chgData name="Abhilash Binkam" userId="c140e357ae8ecf43" providerId="LiveId" clId="{830B5186-96FA-40ED-BFDB-D1FE4C9834D1}" dt="2020-12-07T19:18:53.885" v="2054" actId="1076"/>
+        <pc:sldMkLst>
+          <pc:docMk/>
+          <pc:sldMk cId="1861261768" sldId="264"/>
+        </pc:sldMkLst>
+        <pc:spChg chg="mod">
+          <ac:chgData name="Abhilash Binkam" userId="c140e357ae8ecf43" providerId="LiveId" clId="{830B5186-96FA-40ED-BFDB-D1FE4C9834D1}" dt="2020-12-07T18:53:30.175" v="1857" actId="255"/>
+          <ac:spMkLst>
+            <pc:docMk/>
+            <pc:sldMk cId="1861261768" sldId="264"/>
+            <ac:spMk id="2" creationId="{F2DFA964-535F-4B57-8A63-9A3AF9551B4E}"/>
+          </ac:spMkLst>
+        </pc:spChg>
+        <pc:spChg chg="del mod">
+          <ac:chgData name="Abhilash Binkam" userId="c140e357ae8ecf43" providerId="LiveId" clId="{830B5186-96FA-40ED-BFDB-D1FE4C9834D1}" dt="2020-12-07T19:13:31.187" v="1858" actId="478"/>
+          <ac:spMkLst>
+            <pc:docMk/>
+            <pc:sldMk cId="1861261768" sldId="264"/>
+            <ac:spMk id="3" creationId="{83CD1FEB-B937-48DF-A0FF-9B9F2C03D213}"/>
+          </ac:spMkLst>
+        </pc:spChg>
+        <pc:spChg chg="add mod">
+          <ac:chgData name="Abhilash Binkam" userId="c140e357ae8ecf43" providerId="LiveId" clId="{830B5186-96FA-40ED-BFDB-D1FE4C9834D1}" dt="2020-12-07T19:13:52.742" v="1883" actId="20577"/>
+          <ac:spMkLst>
+            <pc:docMk/>
+            <pc:sldMk cId="1861261768" sldId="264"/>
+            <ac:spMk id="4" creationId="{717408AC-22A0-4FE7-A245-C6BE3B8EFDDF}"/>
+          </ac:spMkLst>
+        </pc:spChg>
+        <pc:spChg chg="add mod">
+          <ac:chgData name="Abhilash Binkam" userId="c140e357ae8ecf43" providerId="LiveId" clId="{830B5186-96FA-40ED-BFDB-D1FE4C9834D1}" dt="2020-12-07T19:14:21.324" v="1897" actId="20577"/>
+          <ac:spMkLst>
+            <pc:docMk/>
+            <pc:sldMk cId="1861261768" sldId="264"/>
+            <ac:spMk id="5" creationId="{FA6ED809-1CE0-4983-AD9F-01B3CEB47309}"/>
+          </ac:spMkLst>
+        </pc:spChg>
+        <pc:spChg chg="add mod">
+          <ac:chgData name="Abhilash Binkam" userId="c140e357ae8ecf43" providerId="LiveId" clId="{830B5186-96FA-40ED-BFDB-D1FE4C9834D1}" dt="2020-12-07T19:15:26.088" v="1935" actId="1076"/>
+          <ac:spMkLst>
+            <pc:docMk/>
+            <pc:sldMk cId="1861261768" sldId="264"/>
+            <ac:spMk id="6" creationId="{8EE79675-238D-442A-BFDF-3B5A23499AF4}"/>
+          </ac:spMkLst>
+        </pc:spChg>
+        <pc:spChg chg="add mod">
+          <ac:chgData name="Abhilash Binkam" userId="c140e357ae8ecf43" providerId="LiveId" clId="{830B5186-96FA-40ED-BFDB-D1FE4C9834D1}" dt="2020-12-07T19:15:08.879" v="1920" actId="1076"/>
+          <ac:spMkLst>
+            <pc:docMk/>
+            <pc:sldMk cId="1861261768" sldId="264"/>
+            <ac:spMk id="11" creationId="{F49CCB65-8358-4CDD-867E-E3AA55AEB8CC}"/>
+          </ac:spMkLst>
+        </pc:spChg>
+        <pc:spChg chg="add mod">
+          <ac:chgData name="Abhilash Binkam" userId="c140e357ae8ecf43" providerId="LiveId" clId="{830B5186-96FA-40ED-BFDB-D1FE4C9834D1}" dt="2020-12-07T19:15:21.439" v="1934" actId="20577"/>
+          <ac:spMkLst>
+            <pc:docMk/>
+            <pc:sldMk cId="1861261768" sldId="264"/>
+            <ac:spMk id="12" creationId="{F14D6DED-74CD-44BA-AF8A-9AA9D4654CF5}"/>
+          </ac:spMkLst>
+        </pc:spChg>
+        <pc:spChg chg="add mod">
+          <ac:chgData name="Abhilash Binkam" userId="c140e357ae8ecf43" providerId="LiveId" clId="{830B5186-96FA-40ED-BFDB-D1FE4C9834D1}" dt="2020-12-07T19:16:39.093" v="1948" actId="20577"/>
+          <ac:spMkLst>
+            <pc:docMk/>
+            <pc:sldMk cId="1861261768" sldId="264"/>
+            <ac:spMk id="14" creationId="{4BEC47F0-2CF9-472A-A2AC-9073F28E9274}"/>
+          </ac:spMkLst>
+        </pc:spChg>
+        <pc:spChg chg="add mod">
+          <ac:chgData name="Abhilash Binkam" userId="c140e357ae8ecf43" providerId="LiveId" clId="{830B5186-96FA-40ED-BFDB-D1FE4C9834D1}" dt="2020-12-07T19:17:43.129" v="1977" actId="20577"/>
+          <ac:spMkLst>
+            <pc:docMk/>
+            <pc:sldMk cId="1861261768" sldId="264"/>
+            <ac:spMk id="17" creationId="{584C473E-2E29-4656-A025-3AA199DC53AC}"/>
+          </ac:spMkLst>
+        </pc:spChg>
+        <pc:spChg chg="add mod">
+          <ac:chgData name="Abhilash Binkam" userId="c140e357ae8ecf43" providerId="LiveId" clId="{830B5186-96FA-40ED-BFDB-D1FE4C9834D1}" dt="2020-12-07T19:18:53.885" v="2054" actId="1076"/>
+          <ac:spMkLst>
+            <pc:docMk/>
+            <pc:sldMk cId="1861261768" sldId="264"/>
+            <ac:spMk id="18" creationId="{D829BD5C-ABDA-4CAA-98B0-CB0B5EB2135A}"/>
+          </ac:spMkLst>
+        </pc:spChg>
+        <pc:cxnChg chg="add">
+          <ac:chgData name="Abhilash Binkam" userId="c140e357ae8ecf43" providerId="LiveId" clId="{830B5186-96FA-40ED-BFDB-D1FE4C9834D1}" dt="2020-12-07T19:14:40.052" v="1910" actId="11529"/>
+          <ac:cxnSpMkLst>
+            <pc:docMk/>
+            <pc:sldMk cId="1861261768" sldId="264"/>
+            <ac:cxnSpMk id="8" creationId="{2B7145A7-9D76-4EA9-9BD5-A1B0951FF667}"/>
+          </ac:cxnSpMkLst>
+        </pc:cxnChg>
+        <pc:cxnChg chg="add mod">
+          <ac:chgData name="Abhilash Binkam" userId="c140e357ae8ecf43" providerId="LiveId" clId="{830B5186-96FA-40ED-BFDB-D1FE4C9834D1}" dt="2020-12-07T19:15:26.088" v="1935" actId="1076"/>
+          <ac:cxnSpMkLst>
+            <pc:docMk/>
+            <pc:sldMk cId="1861261768" sldId="264"/>
+            <ac:cxnSpMk id="10" creationId="{F032D80D-ED98-4666-A34D-3C549C5904B3}"/>
+          </ac:cxnSpMkLst>
+        </pc:cxnChg>
+        <pc:cxnChg chg="add">
+          <ac:chgData name="Abhilash Binkam" userId="c140e357ae8ecf43" providerId="LiveId" clId="{830B5186-96FA-40ED-BFDB-D1FE4C9834D1}" dt="2020-12-07T19:17:16.572" v="1949" actId="11529"/>
+          <ac:cxnSpMkLst>
+            <pc:docMk/>
+            <pc:sldMk cId="1861261768" sldId="264"/>
+            <ac:cxnSpMk id="16" creationId="{06B76A86-3B4E-42E7-B564-CE2A47A79D6D}"/>
+          </ac:cxnSpMkLst>
+        </pc:cxnChg>
+      </pc:sldChg>
+      <pc:sldChg chg="modSp new mod">
+        <pc:chgData name="Abhilash Binkam" userId="c140e357ae8ecf43" providerId="LiveId" clId="{830B5186-96FA-40ED-BFDB-D1FE4C9834D1}" dt="2020-12-08T05:40:11.471" v="2700" actId="113"/>
+        <pc:sldMkLst>
+          <pc:docMk/>
+          <pc:sldMk cId="1044793846" sldId="265"/>
+        </pc:sldMkLst>
+        <pc:spChg chg="mod">
+          <ac:chgData name="Abhilash Binkam" userId="c140e357ae8ecf43" providerId="LiveId" clId="{830B5186-96FA-40ED-BFDB-D1FE4C9834D1}" dt="2020-12-07T19:19:28.068" v="2076" actId="14100"/>
+          <ac:spMkLst>
+            <pc:docMk/>
+            <pc:sldMk cId="1044793846" sldId="265"/>
+            <ac:spMk id="2" creationId="{515A14AB-18C4-4726-A2F1-566BDAA3BB20}"/>
+          </ac:spMkLst>
+        </pc:spChg>
+        <pc:spChg chg="mod">
+          <ac:chgData name="Abhilash Binkam" userId="c140e357ae8ecf43" providerId="LiveId" clId="{830B5186-96FA-40ED-BFDB-D1FE4C9834D1}" dt="2020-12-08T05:40:11.471" v="2700" actId="113"/>
+          <ac:spMkLst>
+            <pc:docMk/>
+            <pc:sldMk cId="1044793846" sldId="265"/>
+            <ac:spMk id="3" creationId="{4ACFA12B-DD8F-4708-828C-613C2247E9D6}"/>
+          </ac:spMkLst>
+        </pc:spChg>
+      </pc:sldChg>
+      <pc:sldChg chg="modSp new mod">
+        <pc:chgData name="Abhilash Binkam" userId="c140e357ae8ecf43" providerId="LiveId" clId="{830B5186-96FA-40ED-BFDB-D1FE4C9834D1}" dt="2020-12-08T05:44:10.951" v="3078" actId="113"/>
+        <pc:sldMkLst>
+          <pc:docMk/>
+          <pc:sldMk cId="1726704696" sldId="266"/>
+        </pc:sldMkLst>
+        <pc:spChg chg="mod">
+          <ac:chgData name="Abhilash Binkam" userId="c140e357ae8ecf43" providerId="LiveId" clId="{830B5186-96FA-40ED-BFDB-D1FE4C9834D1}" dt="2020-12-08T05:41:26.846" v="2719" actId="14100"/>
+          <ac:spMkLst>
+            <pc:docMk/>
+            <pc:sldMk cId="1726704696" sldId="266"/>
+            <ac:spMk id="2" creationId="{8E3835F7-E17D-4BCF-BB32-2F69EA94C302}"/>
+          </ac:spMkLst>
+        </pc:spChg>
+        <pc:spChg chg="mod">
+          <ac:chgData name="Abhilash Binkam" userId="c140e357ae8ecf43" providerId="LiveId" clId="{830B5186-96FA-40ED-BFDB-D1FE4C9834D1}" dt="2020-12-08T05:44:10.951" v="3078" actId="113"/>
+          <ac:spMkLst>
+            <pc:docMk/>
+            <pc:sldMk cId="1726704696" sldId="266"/>
+            <ac:spMk id="3" creationId="{0F70F85C-D99B-41FF-9538-C04F808FCF7B}"/>
+          </ac:spMkLst>
+        </pc:spChg>
       </pc:sldChg>
     </pc:docChg>
   </pc:docChgLst>
@@ -940,7 +1344,7 @@
             <a:fld id="{8994394A-E95D-49DE-8614-F37E1FCF0AC3}" type="datetime2">
               <a:rPr lang="en-US" smtClean="0"/>
               <a:pPr/>
-              <a:t>Saturday, December 5, 2020</a:t>
+              <a:t>Monday, December 7, 2020</a:t>
             </a:fld>
             <a:endParaRPr lang="en-US" dirty="0"/>
           </a:p>
@@ -1280,7 +1684,7 @@
             <a:fld id="{6D51179E-60E8-4F2A-A3F9-6F3CE2ABCAF9}" type="datetime2">
               <a:rPr lang="en-US" smtClean="0"/>
               <a:pPr/>
-              <a:t>Saturday, December 5, 2020</a:t>
+              <a:t>Monday, December 7, 2020</a:t>
             </a:fld>
             <a:endParaRPr lang="en-US" dirty="0">
               <a:latin typeface="+mn-lt"/>
@@ -1628,7 +2032,7 @@
           <a:p>
             <a:fld id="{1C32B061-4DDF-403A-A7DB-3B6FD0BE9165}" type="datetime2">
               <a:rPr lang="en-US" smtClean="0"/>
-              <a:t>Saturday, December 5, 2020</a:t>
+              <a:t>Monday, December 7, 2020</a:t>
             </a:fld>
             <a:endParaRPr lang="en-US" dirty="0"/>
           </a:p>
@@ -2034,7 +2438,7 @@
             <a:fld id="{58D82CC3-100B-41FC-9DB0-99A6D4849F72}" type="datetime2">
               <a:rPr lang="en-US" smtClean="0"/>
               <a:pPr/>
-              <a:t>Saturday, December 5, 2020</a:t>
+              <a:t>Monday, December 7, 2020</a:t>
             </a:fld>
             <a:endParaRPr lang="en-US" dirty="0">
               <a:latin typeface="+mn-lt"/>
@@ -2432,7 +2836,7 @@
           <a:p>
             <a:fld id="{3E58FDCC-AC46-4D9F-98DC-C163BFA43704}" type="datetime2">
               <a:rPr lang="en-US" smtClean="0"/>
-              <a:t>Saturday, December 5, 2020</a:t>
+              <a:t>Monday, December 7, 2020</a:t>
             </a:fld>
             <a:endParaRPr lang="en-US" dirty="0"/>
           </a:p>
@@ -2813,7 +3217,7 @@
           <a:p>
             <a:fld id="{45832F11-C374-493A-BB7E-11B09A67FAD0}" type="datetime2">
               <a:rPr lang="en-US" smtClean="0"/>
-              <a:t>Saturday, December 5, 2020</a:t>
+              <a:t>Monday, December 7, 2020</a:t>
             </a:fld>
             <a:endParaRPr lang="en-US" dirty="0"/>
           </a:p>
@@ -3340,7 +3744,7 @@
           <a:p>
             <a:fld id="{5136546C-EE55-422E-9D57-50E6C4234F80}" type="datetime2">
               <a:rPr lang="en-US" smtClean="0"/>
-              <a:t>Saturday, December 5, 2020</a:t>
+              <a:t>Monday, December 7, 2020</a:t>
             </a:fld>
             <a:endParaRPr lang="en-US" dirty="0"/>
           </a:p>
@@ -3594,7 +3998,7 @@
             <a:fld id="{83685C8A-A1A1-423D-82D7-1ACC187CCA77}" type="datetime2">
               <a:rPr lang="en-US" smtClean="0"/>
               <a:pPr/>
-              <a:t>Saturday, December 5, 2020</a:t>
+              <a:t>Monday, December 7, 2020</a:t>
             </a:fld>
             <a:endParaRPr lang="en-US" dirty="0">
               <a:latin typeface="+mn-lt"/>
@@ -3824,7 +4228,7 @@
             <a:fld id="{325DF798-D264-4BC9-8824-70A25106E4C6}" type="datetime2">
               <a:rPr lang="en-US" smtClean="0"/>
               <a:pPr/>
-              <a:t>Saturday, December 5, 2020</a:t>
+              <a:t>Monday, December 7, 2020</a:t>
             </a:fld>
             <a:endParaRPr lang="en-US" dirty="0">
               <a:latin typeface="+mn-lt"/>
@@ -4308,7 +4712,7 @@
           <a:p>
             <a:fld id="{29ACAD25-C1CF-4F11-8692-066E6505443C}" type="datetime2">
               <a:rPr lang="en-US" smtClean="0"/>
-              <a:t>Saturday, December 5, 2020</a:t>
+              <a:t>Monday, December 7, 2020</a:t>
             </a:fld>
             <a:endParaRPr lang="en-US" dirty="0"/>
           </a:p>
@@ -4714,7 +5118,7 @@
           <a:p>
             <a:fld id="{91688A1C-01B8-42B6-BBF1-2BCF5E311248}" type="datetime2">
               <a:rPr lang="en-US" smtClean="0"/>
-              <a:t>Saturday, December 5, 2020</a:t>
+              <a:t>Monday, December 7, 2020</a:t>
             </a:fld>
             <a:endParaRPr lang="en-US" dirty="0"/>
           </a:p>
@@ -5047,7 +5451,7 @@
             <a:fld id="{6C03BBDD-218C-4B2A-98A0-F5F369754705}" type="datetime2">
               <a:rPr lang="en-US" smtClean="0"/>
               <a:pPr/>
-              <a:t>Saturday, December 5, 2020</a:t>
+              <a:t>Monday, December 7, 2020</a:t>
             </a:fld>
             <a:endParaRPr lang="en-US" dirty="0">
               <a:latin typeface="+mn-lt"/>
@@ -5946,6 +6350,603 @@
 </p:sld>
 </file>
 
+<file path=ppt/slides/slide10.xml><?xml version="1.0" encoding="utf-8"?>
+<p:sld xmlns:a="http://schemas.openxmlformats.org/drawingml/2006/main" xmlns:r="http://schemas.openxmlformats.org/officeDocument/2006/relationships" xmlns:p="http://schemas.openxmlformats.org/presentationml/2006/main">
+  <p:cSld>
+    <p:spTree>
+      <p:nvGrpSpPr>
+        <p:cNvPr id="1" name=""/>
+        <p:cNvGrpSpPr/>
+        <p:nvPr/>
+      </p:nvGrpSpPr>
+      <p:grpSpPr>
+        <a:xfrm>
+          <a:off x="0" y="0"/>
+          <a:ext cx="0" cy="0"/>
+          <a:chOff x="0" y="0"/>
+          <a:chExt cx="0" cy="0"/>
+        </a:xfrm>
+      </p:grpSpPr>
+      <p:sp>
+        <p:nvSpPr>
+          <p:cNvPr id="6" name="Content Placeholder 5">
+            <a:extLst>
+              <a:ext uri="{FF2B5EF4-FFF2-40B4-BE49-F238E27FC236}">
+                <a16:creationId xmlns:a16="http://schemas.microsoft.com/office/drawing/2014/main" id="{CE28E35D-9620-406A-8D70-FFB6367A26E9}"/>
+              </a:ext>
+            </a:extLst>
+          </p:cNvPr>
+          <p:cNvSpPr>
+            <a:spLocks noGrp="1"/>
+          </p:cNvSpPr>
+          <p:nvPr>
+            <p:ph idx="1"/>
+          </p:nvPr>
+        </p:nvSpPr>
+        <p:spPr>
+          <a:xfrm>
+            <a:off x="1343025" y="1704975"/>
+            <a:ext cx="10406063" cy="4711700"/>
+          </a:xfrm>
+        </p:spPr>
+        <p:txBody>
+          <a:bodyPr/>
+          <a:lstStyle/>
+          <a:p>
+            <a:pPr marL="0" indent="0" algn="ctr">
+              <a:buNone/>
+            </a:pPr>
+            <a:r>
+              <a:rPr lang="en-US" dirty="0"/>
+              <a:t>Containerized Application</a:t>
+            </a:r>
+            <a:endParaRPr lang="en-IN" dirty="0"/>
+          </a:p>
+        </p:txBody>
+      </p:sp>
+      <p:sp>
+        <p:nvSpPr>
+          <p:cNvPr id="7" name="Rectangle 6">
+            <a:extLst>
+              <a:ext uri="{FF2B5EF4-FFF2-40B4-BE49-F238E27FC236}">
+                <a16:creationId xmlns:a16="http://schemas.microsoft.com/office/drawing/2014/main" id="{184E1010-F8D6-4324-BA66-2B2A26405996}"/>
+              </a:ext>
+            </a:extLst>
+          </p:cNvPr>
+          <p:cNvSpPr/>
+          <p:nvPr/>
+        </p:nvSpPr>
+        <p:spPr>
+          <a:xfrm>
+            <a:off x="2266949" y="5405437"/>
+            <a:ext cx="8239125" cy="600075"/>
+          </a:xfrm>
+          <a:prstGeom prst="rect">
+            <a:avLst/>
+          </a:prstGeom>
+          <a:solidFill>
+            <a:srgbClr val="62C3AA"/>
+          </a:solidFill>
+        </p:spPr>
+        <p:style>
+          <a:lnRef idx="2">
+            <a:schemeClr val="accent1">
+              <a:shade val="50000"/>
+            </a:schemeClr>
+          </a:lnRef>
+          <a:fillRef idx="1">
+            <a:schemeClr val="accent1"/>
+          </a:fillRef>
+          <a:effectRef idx="0">
+            <a:schemeClr val="accent1"/>
+          </a:effectRef>
+          <a:fontRef idx="minor">
+            <a:schemeClr val="lt1"/>
+          </a:fontRef>
+        </p:style>
+        <p:txBody>
+          <a:bodyPr rtlCol="0" anchor="ctr"/>
+          <a:lstStyle/>
+          <a:p>
+            <a:pPr algn="ctr"/>
+            <a:r>
+              <a:rPr lang="en-US" dirty="0"/>
+              <a:t>Infrastructure</a:t>
+            </a:r>
+            <a:endParaRPr lang="en-IN" dirty="0"/>
+          </a:p>
+        </p:txBody>
+      </p:sp>
+      <p:sp>
+        <p:nvSpPr>
+          <p:cNvPr id="8" name="Rectangle 7">
+            <a:extLst>
+              <a:ext uri="{FF2B5EF4-FFF2-40B4-BE49-F238E27FC236}">
+                <a16:creationId xmlns:a16="http://schemas.microsoft.com/office/drawing/2014/main" id="{8F68A1FF-74E1-475D-8FA1-24158C99ADBF}"/>
+              </a:ext>
+            </a:extLst>
+          </p:cNvPr>
+          <p:cNvSpPr/>
+          <p:nvPr/>
+        </p:nvSpPr>
+        <p:spPr>
+          <a:xfrm>
+            <a:off x="2266949" y="4694236"/>
+            <a:ext cx="8239125" cy="600075"/>
+          </a:xfrm>
+          <a:prstGeom prst="rect">
+            <a:avLst/>
+          </a:prstGeom>
+          <a:solidFill>
+            <a:srgbClr val="D2E9FA"/>
+          </a:solidFill>
+        </p:spPr>
+        <p:style>
+          <a:lnRef idx="2">
+            <a:schemeClr val="accent1">
+              <a:shade val="50000"/>
+            </a:schemeClr>
+          </a:lnRef>
+          <a:fillRef idx="1">
+            <a:schemeClr val="accent1"/>
+          </a:fillRef>
+          <a:effectRef idx="0">
+            <a:schemeClr val="accent1"/>
+          </a:effectRef>
+          <a:fontRef idx="minor">
+            <a:schemeClr val="lt1"/>
+          </a:fontRef>
+        </p:style>
+        <p:txBody>
+          <a:bodyPr rtlCol="0" anchor="ctr"/>
+          <a:lstStyle/>
+          <a:p>
+            <a:pPr algn="ctr"/>
+            <a:r>
+              <a:rPr lang="en-US" dirty="0"/>
+              <a:t>Host Operating System</a:t>
+            </a:r>
+            <a:endParaRPr lang="en-IN" dirty="0"/>
+          </a:p>
+        </p:txBody>
+      </p:sp>
+      <p:sp>
+        <p:nvSpPr>
+          <p:cNvPr id="9" name="Rectangle 8">
+            <a:extLst>
+              <a:ext uri="{FF2B5EF4-FFF2-40B4-BE49-F238E27FC236}">
+                <a16:creationId xmlns:a16="http://schemas.microsoft.com/office/drawing/2014/main" id="{49797F5A-0A8D-477C-BC36-C9D9283FCA1D}"/>
+              </a:ext>
+            </a:extLst>
+          </p:cNvPr>
+          <p:cNvSpPr/>
+          <p:nvPr/>
+        </p:nvSpPr>
+        <p:spPr>
+          <a:xfrm>
+            <a:off x="2266949" y="3983035"/>
+            <a:ext cx="8239125" cy="600075"/>
+          </a:xfrm>
+          <a:prstGeom prst="rect">
+            <a:avLst/>
+          </a:prstGeom>
+          <a:solidFill>
+            <a:srgbClr val="4491CD"/>
+          </a:solidFill>
+        </p:spPr>
+        <p:style>
+          <a:lnRef idx="2">
+            <a:schemeClr val="accent1">
+              <a:shade val="50000"/>
+            </a:schemeClr>
+          </a:lnRef>
+          <a:fillRef idx="1">
+            <a:schemeClr val="accent1"/>
+          </a:fillRef>
+          <a:effectRef idx="0">
+            <a:schemeClr val="accent1"/>
+          </a:effectRef>
+          <a:fontRef idx="minor">
+            <a:schemeClr val="lt1"/>
+          </a:fontRef>
+        </p:style>
+        <p:txBody>
+          <a:bodyPr rtlCol="0" anchor="ctr"/>
+          <a:lstStyle/>
+          <a:p>
+            <a:pPr algn="ctr"/>
+            <a:r>
+              <a:rPr lang="en-US" dirty="0"/>
+              <a:t>Docker</a:t>
+            </a:r>
+            <a:endParaRPr lang="en-IN" dirty="0"/>
+          </a:p>
+        </p:txBody>
+      </p:sp>
+      <p:sp>
+        <p:nvSpPr>
+          <p:cNvPr id="10" name="Rectangle 9">
+            <a:extLst>
+              <a:ext uri="{FF2B5EF4-FFF2-40B4-BE49-F238E27FC236}">
+                <a16:creationId xmlns:a16="http://schemas.microsoft.com/office/drawing/2014/main" id="{94B16BFA-2877-46E0-A840-FE3C6AA3572B}"/>
+              </a:ext>
+            </a:extLst>
+          </p:cNvPr>
+          <p:cNvSpPr/>
+          <p:nvPr/>
+        </p:nvSpPr>
+        <p:spPr>
+          <a:xfrm>
+            <a:off x="2266949" y="2438400"/>
+            <a:ext cx="904876" cy="1433509"/>
+          </a:xfrm>
+          <a:prstGeom prst="rect">
+            <a:avLst/>
+          </a:prstGeom>
+          <a:solidFill>
+            <a:srgbClr val="4491CD"/>
+          </a:solidFill>
+        </p:spPr>
+        <p:style>
+          <a:lnRef idx="2">
+            <a:schemeClr val="accent1">
+              <a:shade val="50000"/>
+            </a:schemeClr>
+          </a:lnRef>
+          <a:fillRef idx="1">
+            <a:schemeClr val="accent1"/>
+          </a:fillRef>
+          <a:effectRef idx="0">
+            <a:schemeClr val="accent1"/>
+          </a:effectRef>
+          <a:fontRef idx="minor">
+            <a:schemeClr val="lt1"/>
+          </a:fontRef>
+        </p:style>
+        <p:txBody>
+          <a:bodyPr rtlCol="0" anchor="ctr"/>
+          <a:lstStyle/>
+          <a:p>
+            <a:pPr algn="ctr"/>
+            <a:r>
+              <a:rPr lang="en-US" dirty="0"/>
+              <a:t>App A</a:t>
+            </a:r>
+            <a:endParaRPr lang="en-IN" dirty="0"/>
+          </a:p>
+        </p:txBody>
+      </p:sp>
+      <p:sp>
+        <p:nvSpPr>
+          <p:cNvPr id="19" name="Rectangle 18">
+            <a:extLst>
+              <a:ext uri="{FF2B5EF4-FFF2-40B4-BE49-F238E27FC236}">
+                <a16:creationId xmlns:a16="http://schemas.microsoft.com/office/drawing/2014/main" id="{638A36FC-89F8-4832-9D01-B49EA1953DDD}"/>
+              </a:ext>
+            </a:extLst>
+          </p:cNvPr>
+          <p:cNvSpPr/>
+          <p:nvPr/>
+        </p:nvSpPr>
+        <p:spPr>
+          <a:xfrm>
+            <a:off x="3428999" y="2438399"/>
+            <a:ext cx="904876" cy="1433509"/>
+          </a:xfrm>
+          <a:prstGeom prst="rect">
+            <a:avLst/>
+          </a:prstGeom>
+          <a:solidFill>
+            <a:srgbClr val="4491CD"/>
+          </a:solidFill>
+        </p:spPr>
+        <p:style>
+          <a:lnRef idx="2">
+            <a:schemeClr val="accent1">
+              <a:shade val="50000"/>
+            </a:schemeClr>
+          </a:lnRef>
+          <a:fillRef idx="1">
+            <a:schemeClr val="accent1"/>
+          </a:fillRef>
+          <a:effectRef idx="0">
+            <a:schemeClr val="accent1"/>
+          </a:effectRef>
+          <a:fontRef idx="minor">
+            <a:schemeClr val="lt1"/>
+          </a:fontRef>
+        </p:style>
+        <p:txBody>
+          <a:bodyPr rtlCol="0" anchor="ctr"/>
+          <a:lstStyle/>
+          <a:p>
+            <a:pPr algn="ctr"/>
+            <a:r>
+              <a:rPr lang="en-US" dirty="0"/>
+              <a:t>App B</a:t>
+            </a:r>
+            <a:endParaRPr lang="en-IN" dirty="0"/>
+          </a:p>
+        </p:txBody>
+      </p:sp>
+      <p:sp>
+        <p:nvSpPr>
+          <p:cNvPr id="20" name="Rectangle 19">
+            <a:extLst>
+              <a:ext uri="{FF2B5EF4-FFF2-40B4-BE49-F238E27FC236}">
+                <a16:creationId xmlns:a16="http://schemas.microsoft.com/office/drawing/2014/main" id="{4CE51BE9-3162-40AA-ACA4-8B11575F0476}"/>
+              </a:ext>
+            </a:extLst>
+          </p:cNvPr>
+          <p:cNvSpPr/>
+          <p:nvPr/>
+        </p:nvSpPr>
+        <p:spPr>
+          <a:xfrm>
+            <a:off x="4591049" y="2438398"/>
+            <a:ext cx="904876" cy="1433509"/>
+          </a:xfrm>
+          <a:prstGeom prst="rect">
+            <a:avLst/>
+          </a:prstGeom>
+          <a:solidFill>
+            <a:srgbClr val="4491CD"/>
+          </a:solidFill>
+        </p:spPr>
+        <p:style>
+          <a:lnRef idx="2">
+            <a:schemeClr val="accent1">
+              <a:shade val="50000"/>
+            </a:schemeClr>
+          </a:lnRef>
+          <a:fillRef idx="1">
+            <a:schemeClr val="accent1"/>
+          </a:fillRef>
+          <a:effectRef idx="0">
+            <a:schemeClr val="accent1"/>
+          </a:effectRef>
+          <a:fontRef idx="minor">
+            <a:schemeClr val="lt1"/>
+          </a:fontRef>
+        </p:style>
+        <p:txBody>
+          <a:bodyPr rtlCol="0" anchor="ctr"/>
+          <a:lstStyle/>
+          <a:p>
+            <a:pPr algn="ctr"/>
+            <a:r>
+              <a:rPr lang="en-US" dirty="0"/>
+              <a:t>App C</a:t>
+            </a:r>
+            <a:endParaRPr lang="en-IN" dirty="0"/>
+          </a:p>
+        </p:txBody>
+      </p:sp>
+      <p:sp>
+        <p:nvSpPr>
+          <p:cNvPr id="21" name="Rectangle 20">
+            <a:extLst>
+              <a:ext uri="{FF2B5EF4-FFF2-40B4-BE49-F238E27FC236}">
+                <a16:creationId xmlns:a16="http://schemas.microsoft.com/office/drawing/2014/main" id="{6EFD4281-7C08-407A-B484-4229567E8B2E}"/>
+              </a:ext>
+            </a:extLst>
+          </p:cNvPr>
+          <p:cNvSpPr/>
+          <p:nvPr/>
+        </p:nvSpPr>
+        <p:spPr>
+          <a:xfrm>
+            <a:off x="5803104" y="2438394"/>
+            <a:ext cx="904876" cy="1433509"/>
+          </a:xfrm>
+          <a:prstGeom prst="rect">
+            <a:avLst/>
+          </a:prstGeom>
+          <a:solidFill>
+            <a:srgbClr val="4491CD"/>
+          </a:solidFill>
+        </p:spPr>
+        <p:style>
+          <a:lnRef idx="2">
+            <a:schemeClr val="accent1">
+              <a:shade val="50000"/>
+            </a:schemeClr>
+          </a:lnRef>
+          <a:fillRef idx="1">
+            <a:schemeClr val="accent1"/>
+          </a:fillRef>
+          <a:effectRef idx="0">
+            <a:schemeClr val="accent1"/>
+          </a:effectRef>
+          <a:fontRef idx="minor">
+            <a:schemeClr val="lt1"/>
+          </a:fontRef>
+        </p:style>
+        <p:txBody>
+          <a:bodyPr rtlCol="0" anchor="ctr"/>
+          <a:lstStyle/>
+          <a:p>
+            <a:pPr algn="ctr"/>
+            <a:r>
+              <a:rPr lang="en-US" dirty="0"/>
+              <a:t>App D</a:t>
+            </a:r>
+            <a:endParaRPr lang="en-IN" dirty="0"/>
+          </a:p>
+        </p:txBody>
+      </p:sp>
+      <p:sp>
+        <p:nvSpPr>
+          <p:cNvPr id="22" name="Rectangle 21">
+            <a:extLst>
+              <a:ext uri="{FF2B5EF4-FFF2-40B4-BE49-F238E27FC236}">
+                <a16:creationId xmlns:a16="http://schemas.microsoft.com/office/drawing/2014/main" id="{2739D1FA-1AAB-4CEA-BC78-8F75714FE88B}"/>
+              </a:ext>
+            </a:extLst>
+          </p:cNvPr>
+          <p:cNvSpPr/>
+          <p:nvPr/>
+        </p:nvSpPr>
+        <p:spPr>
+          <a:xfrm>
+            <a:off x="7015159" y="2438394"/>
+            <a:ext cx="904876" cy="1433509"/>
+          </a:xfrm>
+          <a:prstGeom prst="rect">
+            <a:avLst/>
+          </a:prstGeom>
+          <a:solidFill>
+            <a:srgbClr val="4491CD"/>
+          </a:solidFill>
+        </p:spPr>
+        <p:style>
+          <a:lnRef idx="2">
+            <a:schemeClr val="accent1">
+              <a:shade val="50000"/>
+            </a:schemeClr>
+          </a:lnRef>
+          <a:fillRef idx="1">
+            <a:schemeClr val="accent1"/>
+          </a:fillRef>
+          <a:effectRef idx="0">
+            <a:schemeClr val="accent1"/>
+          </a:effectRef>
+          <a:fontRef idx="minor">
+            <a:schemeClr val="lt1"/>
+          </a:fontRef>
+        </p:style>
+        <p:txBody>
+          <a:bodyPr rtlCol="0" anchor="ctr"/>
+          <a:lstStyle/>
+          <a:p>
+            <a:pPr algn="ctr"/>
+            <a:r>
+              <a:rPr lang="en-US" dirty="0"/>
+              <a:t>App E</a:t>
+            </a:r>
+            <a:endParaRPr lang="en-IN" dirty="0"/>
+          </a:p>
+        </p:txBody>
+      </p:sp>
+      <p:sp>
+        <p:nvSpPr>
+          <p:cNvPr id="23" name="Rectangle 22">
+            <a:extLst>
+              <a:ext uri="{FF2B5EF4-FFF2-40B4-BE49-F238E27FC236}">
+                <a16:creationId xmlns:a16="http://schemas.microsoft.com/office/drawing/2014/main" id="{2E94001D-92F5-457F-BE44-450C8CAAC9EF}"/>
+              </a:ext>
+            </a:extLst>
+          </p:cNvPr>
+          <p:cNvSpPr/>
+          <p:nvPr/>
+        </p:nvSpPr>
+        <p:spPr>
+          <a:xfrm>
+            <a:off x="8258173" y="2438394"/>
+            <a:ext cx="904876" cy="1433509"/>
+          </a:xfrm>
+          <a:prstGeom prst="rect">
+            <a:avLst/>
+          </a:prstGeom>
+          <a:solidFill>
+            <a:srgbClr val="4491CD"/>
+          </a:solidFill>
+        </p:spPr>
+        <p:style>
+          <a:lnRef idx="2">
+            <a:schemeClr val="accent1">
+              <a:shade val="50000"/>
+            </a:schemeClr>
+          </a:lnRef>
+          <a:fillRef idx="1">
+            <a:schemeClr val="accent1"/>
+          </a:fillRef>
+          <a:effectRef idx="0">
+            <a:schemeClr val="accent1"/>
+          </a:effectRef>
+          <a:fontRef idx="minor">
+            <a:schemeClr val="lt1"/>
+          </a:fontRef>
+        </p:style>
+        <p:txBody>
+          <a:bodyPr rtlCol="0" anchor="ctr"/>
+          <a:lstStyle/>
+          <a:p>
+            <a:pPr algn="ctr"/>
+            <a:r>
+              <a:rPr lang="en-US" dirty="0"/>
+              <a:t>App F</a:t>
+            </a:r>
+            <a:endParaRPr lang="en-IN" dirty="0"/>
+          </a:p>
+        </p:txBody>
+      </p:sp>
+      <p:sp>
+        <p:nvSpPr>
+          <p:cNvPr id="24" name="Rectangle 23">
+            <a:extLst>
+              <a:ext uri="{FF2B5EF4-FFF2-40B4-BE49-F238E27FC236}">
+                <a16:creationId xmlns:a16="http://schemas.microsoft.com/office/drawing/2014/main" id="{154930D0-3E19-4371-A953-5171C4FBC800}"/>
+              </a:ext>
+            </a:extLst>
+          </p:cNvPr>
+          <p:cNvSpPr/>
+          <p:nvPr/>
+        </p:nvSpPr>
+        <p:spPr>
+          <a:xfrm>
+            <a:off x="9601198" y="2438394"/>
+            <a:ext cx="904876" cy="1433509"/>
+          </a:xfrm>
+          <a:prstGeom prst="rect">
+            <a:avLst/>
+          </a:prstGeom>
+          <a:solidFill>
+            <a:srgbClr val="4491CD"/>
+          </a:solidFill>
+        </p:spPr>
+        <p:style>
+          <a:lnRef idx="2">
+            <a:schemeClr val="accent1">
+              <a:shade val="50000"/>
+            </a:schemeClr>
+          </a:lnRef>
+          <a:fillRef idx="1">
+            <a:schemeClr val="accent1"/>
+          </a:fillRef>
+          <a:effectRef idx="0">
+            <a:schemeClr val="accent1"/>
+          </a:effectRef>
+          <a:fontRef idx="minor">
+            <a:schemeClr val="lt1"/>
+          </a:fontRef>
+        </p:style>
+        <p:txBody>
+          <a:bodyPr rtlCol="0" anchor="ctr"/>
+          <a:lstStyle/>
+          <a:p>
+            <a:pPr algn="ctr"/>
+            <a:r>
+              <a:rPr lang="en-US" dirty="0"/>
+              <a:t>App G</a:t>
+            </a:r>
+            <a:endParaRPr lang="en-IN" dirty="0"/>
+          </a:p>
+        </p:txBody>
+      </p:sp>
+    </p:spTree>
+    <p:extLst>
+      <p:ext uri="{BB962C8B-B14F-4D97-AF65-F5344CB8AC3E}">
+        <p14:creationId xmlns:p14="http://schemas.microsoft.com/office/powerpoint/2010/main" val="668981619"/>
+      </p:ext>
+    </p:extLst>
+  </p:cSld>
+  <p:clrMapOvr>
+    <a:masterClrMapping/>
+  </p:clrMapOvr>
+</p:sld>
+</file>
+
 <file path=ppt/slides/slide2.xml><?xml version="1.0" encoding="utf-8"?>
 <p:sld xmlns:a="http://schemas.openxmlformats.org/drawingml/2006/main" xmlns:r="http://schemas.openxmlformats.org/officeDocument/2006/relationships" xmlns:p="http://schemas.openxmlformats.org/presentationml/2006/main">
   <p:cSld>
@@ -6026,20 +7027,24 @@
           <a:lstStyle/>
           <a:p>
             <a:r>
+              <a:rPr lang="en-US" dirty="0" err="1"/>
+              <a:t>cf</a:t>
+            </a:r>
+            <a:r>
               <a:rPr lang="en-US" dirty="0"/>
-              <a:t>Why Docker?</a:t>
+              <a:t> push</a:t>
             </a:r>
           </a:p>
           <a:p>
             <a:r>
               <a:rPr lang="en-US" dirty="0"/>
-              <a:t>What is Container?</a:t>
+              <a:t>What is Docker</a:t>
             </a:r>
           </a:p>
           <a:p>
             <a:r>
               <a:rPr lang="en-US" dirty="0"/>
-              <a:t>Docker vs Virtual Machine</a:t>
+              <a:t>What is Container</a:t>
             </a:r>
           </a:p>
           <a:p>
@@ -6082,7 +7087,7 @@
           <p:cNvPr id="2" name="Title 1">
             <a:extLst>
               <a:ext uri="{FF2B5EF4-FFF2-40B4-BE49-F238E27FC236}">
-                <a16:creationId xmlns:a16="http://schemas.microsoft.com/office/drawing/2014/main" id="{D8238C94-71DB-46BB-A81E-A76E97918A71}"/>
+                <a16:creationId xmlns:a16="http://schemas.microsoft.com/office/drawing/2014/main" id="{FCD3EC6A-BFA6-4457-984C-4DA3AEC5C181}"/>
               </a:ext>
             </a:extLst>
           </p:cNvPr>
@@ -6095,8 +7100,8 @@
         </p:nvSpPr>
         <p:spPr>
           <a:xfrm>
-            <a:off x="1343025" y="328840"/>
-            <a:ext cx="10406063" cy="646278"/>
+            <a:off x="957565" y="328839"/>
+            <a:ext cx="10791524" cy="1263423"/>
           </a:xfrm>
         </p:spPr>
         <p:txBody>
@@ -6106,19 +7111,61 @@
           <a:lstStyle/>
           <a:p>
             <a:r>
+              <a:rPr lang="en-US" sz="3200" dirty="0" err="1"/>
+              <a:t>cf</a:t>
+            </a:r>
+            <a:r>
               <a:rPr lang="en-US" sz="3200" dirty="0"/>
-              <a:t>Why Docker?</a:t>
+              <a:t> push</a:t>
             </a:r>
             <a:endParaRPr lang="en-IN" sz="3200" dirty="0"/>
           </a:p>
         </p:txBody>
       </p:sp>
+      <p:pic>
+        <p:nvPicPr>
+          <p:cNvPr id="5" name="Content Placeholder 4" descr="User">
+            <a:extLst>
+              <a:ext uri="{FF2B5EF4-FFF2-40B4-BE49-F238E27FC236}">
+                <a16:creationId xmlns:a16="http://schemas.microsoft.com/office/drawing/2014/main" id="{2989205D-883E-4277-9941-EB0554851024}"/>
+              </a:ext>
+            </a:extLst>
+          </p:cNvPr>
+          <p:cNvPicPr>
+            <a:picLocks noGrp="1" noChangeAspect="1"/>
+          </p:cNvPicPr>
+          <p:nvPr>
+            <p:ph idx="1"/>
+          </p:nvPr>
+        </p:nvPicPr>
+        <p:blipFill>
+          <a:blip r:embed="rId2">
+            <a:extLst>
+              <a:ext uri="{28A0092B-C50C-407E-A947-70E740481C1C}">
+                <a14:useLocalDpi xmlns:a14="http://schemas.microsoft.com/office/drawing/2010/main" val="0"/>
+              </a:ext>
+              <a:ext uri="{96DAC541-7B7A-43D3-8B79-37D633B846F1}">
+                <asvg:svgBlip xmlns:asvg="http://schemas.microsoft.com/office/drawing/2016/SVG/main" r:embed="rId3"/>
+              </a:ext>
+            </a:extLst>
+          </a:blip>
+          <a:stretch>
+            <a:fillRect/>
+          </a:stretch>
+        </p:blipFill>
+        <p:spPr>
+          <a:xfrm>
+            <a:off x="957565" y="1887538"/>
+            <a:ext cx="560388" cy="560388"/>
+          </a:xfrm>
+        </p:spPr>
+      </p:pic>
       <p:sp>
         <p:nvSpPr>
           <p:cNvPr id="6" name="Rectangle 5">
             <a:extLst>
               <a:ext uri="{FF2B5EF4-FFF2-40B4-BE49-F238E27FC236}">
-                <a16:creationId xmlns:a16="http://schemas.microsoft.com/office/drawing/2014/main" id="{D71FB4A7-CCA0-4215-930D-17511BE20C03}"/>
+                <a16:creationId xmlns:a16="http://schemas.microsoft.com/office/drawing/2014/main" id="{B5EF9DF3-FE6B-4890-AFAB-0DE5D83B98B6}"/>
               </a:ext>
             </a:extLst>
           </p:cNvPr>
@@ -6127,15 +7174,12 @@
         </p:nvSpPr>
         <p:spPr>
           <a:xfrm>
-            <a:off x="2266949" y="5405437"/>
-            <a:ext cx="8239125" cy="600075"/>
+            <a:off x="3105975" y="1889466"/>
+            <a:ext cx="1619250" cy="560388"/>
           </a:xfrm>
           <a:prstGeom prst="rect">
             <a:avLst/>
           </a:prstGeom>
-          <a:solidFill>
-            <a:srgbClr val="62C3AA"/>
-          </a:solidFill>
         </p:spPr>
         <p:style>
           <a:lnRef idx="2">
@@ -6159,19 +7203,97 @@
           <a:p>
             <a:pPr algn="ctr"/>
             <a:r>
-              <a:rPr lang="en-US" dirty="0"/>
-              <a:t>Hardware Infrastructure</a:t>
-            </a:r>
-            <a:endParaRPr lang="en-IN" dirty="0"/>
-          </a:p>
-        </p:txBody>
-      </p:sp>
-      <p:sp>
-        <p:nvSpPr>
-          <p:cNvPr id="7" name="Rectangle 6">
-            <a:extLst>
-              <a:ext uri="{FF2B5EF4-FFF2-40B4-BE49-F238E27FC236}">
-                <a16:creationId xmlns:a16="http://schemas.microsoft.com/office/drawing/2014/main" id="{5496DE79-D36F-4AF1-AB1F-2A633FDA5C51}"/>
+              <a:rPr lang="en-US" sz="1200" dirty="0"/>
+              <a:t>Cloud Controller</a:t>
+            </a:r>
+            <a:endParaRPr lang="en-IN" sz="1200" dirty="0"/>
+          </a:p>
+        </p:txBody>
+      </p:sp>
+      <p:cxnSp>
+        <p:nvCxnSpPr>
+          <p:cNvPr id="8" name="Straight Arrow Connector 7">
+            <a:extLst>
+              <a:ext uri="{FF2B5EF4-FFF2-40B4-BE49-F238E27FC236}">
+                <a16:creationId xmlns:a16="http://schemas.microsoft.com/office/drawing/2014/main" id="{E4DAD942-B524-4C64-B4D0-CD8036778119}"/>
+              </a:ext>
+            </a:extLst>
+          </p:cNvPr>
+          <p:cNvCxnSpPr>
+            <a:cxnSpLocks/>
+            <a:stCxn id="5" idx="3"/>
+          </p:cNvCxnSpPr>
+          <p:nvPr/>
+        </p:nvCxnSpPr>
+        <p:spPr>
+          <a:xfrm>
+            <a:off x="1517953" y="2167732"/>
+            <a:ext cx="1500455" cy="0"/>
+          </a:xfrm>
+          <a:prstGeom prst="straightConnector1">
+            <a:avLst/>
+          </a:prstGeom>
+          <a:ln>
+            <a:tailEnd type="triangle"/>
+          </a:ln>
+        </p:spPr>
+        <p:style>
+          <a:lnRef idx="1">
+            <a:schemeClr val="accent1"/>
+          </a:lnRef>
+          <a:fillRef idx="0">
+            <a:schemeClr val="accent1"/>
+          </a:fillRef>
+          <a:effectRef idx="0">
+            <a:schemeClr val="accent1"/>
+          </a:effectRef>
+          <a:fontRef idx="minor">
+            <a:schemeClr val="tx1"/>
+          </a:fontRef>
+        </p:style>
+      </p:cxnSp>
+      <p:sp>
+        <p:nvSpPr>
+          <p:cNvPr id="10" name="TextBox 9">
+            <a:extLst>
+              <a:ext uri="{FF2B5EF4-FFF2-40B4-BE49-F238E27FC236}">
+                <a16:creationId xmlns:a16="http://schemas.microsoft.com/office/drawing/2014/main" id="{D4571C5B-6DE4-46D5-8D8E-DC61DEF84732}"/>
+              </a:ext>
+            </a:extLst>
+          </p:cNvPr>
+          <p:cNvSpPr txBox="1"/>
+          <p:nvPr/>
+        </p:nvSpPr>
+        <p:spPr>
+          <a:xfrm>
+            <a:off x="1517953" y="1872456"/>
+            <a:ext cx="1366080" cy="276999"/>
+          </a:xfrm>
+          <a:prstGeom prst="rect">
+            <a:avLst/>
+          </a:prstGeom>
+          <a:noFill/>
+        </p:spPr>
+        <p:txBody>
+          <a:bodyPr wrap="square" rtlCol="0">
+            <a:spAutoFit/>
+          </a:bodyPr>
+          <a:lstStyle/>
+          <a:p>
+            <a:r>
+              <a:rPr lang="en-US" sz="1200" dirty="0"/>
+              <a:t>Code + manifest</a:t>
+            </a:r>
+            <a:endParaRPr lang="en-IN" sz="1200" dirty="0"/>
+          </a:p>
+        </p:txBody>
+      </p:sp>
+      <p:sp>
+        <p:nvSpPr>
+          <p:cNvPr id="13" name="Rectangle 12">
+            <a:extLst>
+              <a:ext uri="{FF2B5EF4-FFF2-40B4-BE49-F238E27FC236}">
+                <a16:creationId xmlns:a16="http://schemas.microsoft.com/office/drawing/2014/main" id="{14705B63-E8E0-4192-9F00-A4A86705A08B}"/>
               </a:ext>
             </a:extLst>
           </p:cNvPr>
@@ -6180,15 +7302,13 @@
         </p:nvSpPr>
         <p:spPr>
           <a:xfrm>
-            <a:off x="2266949" y="4694236"/>
-            <a:ext cx="8239125" cy="600075"/>
+            <a:off x="5696373" y="1592262"/>
+            <a:ext cx="3887096" cy="1208358"/>
           </a:xfrm>
           <a:prstGeom prst="rect">
             <a:avLst/>
           </a:prstGeom>
-          <a:solidFill>
-            <a:srgbClr val="D2E9FA"/>
-          </a:solidFill>
+          <a:noFill/>
         </p:spPr>
         <p:style>
           <a:lnRef idx="2">
@@ -6212,19 +7332,212 @@
           <a:p>
             <a:pPr algn="ctr"/>
             <a:r>
-              <a:rPr lang="en-US" dirty="0"/>
-              <a:t>Host Operating System</a:t>
-            </a:r>
-            <a:endParaRPr lang="en-IN" dirty="0"/>
-          </a:p>
-        </p:txBody>
-      </p:sp>
-      <p:sp>
-        <p:nvSpPr>
-          <p:cNvPr id="11" name="Rectangle 10">
-            <a:extLst>
-              <a:ext uri="{FF2B5EF4-FFF2-40B4-BE49-F238E27FC236}">
-                <a16:creationId xmlns:a16="http://schemas.microsoft.com/office/drawing/2014/main" id="{69AEBC08-778C-447C-81E6-2DF5CD1C321C}"/>
+              <a:rPr lang="en-US" sz="1400" dirty="0"/>
+              <a:t>Build pack</a:t>
+            </a:r>
+            <a:endParaRPr lang="en-IN" sz="1400" dirty="0"/>
+          </a:p>
+        </p:txBody>
+      </p:sp>
+      <p:cxnSp>
+        <p:nvCxnSpPr>
+          <p:cNvPr id="14" name="Straight Arrow Connector 13">
+            <a:extLst>
+              <a:ext uri="{FF2B5EF4-FFF2-40B4-BE49-F238E27FC236}">
+                <a16:creationId xmlns:a16="http://schemas.microsoft.com/office/drawing/2014/main" id="{F9F0F36E-CB70-40C5-86BA-DD58202DB918}"/>
+              </a:ext>
+            </a:extLst>
+          </p:cNvPr>
+          <p:cNvCxnSpPr>
+            <a:cxnSpLocks/>
+          </p:cNvCxnSpPr>
+          <p:nvPr/>
+        </p:nvCxnSpPr>
+        <p:spPr>
+          <a:xfrm flipV="1">
+            <a:off x="4731939" y="2149451"/>
+            <a:ext cx="932014" cy="4"/>
+          </a:xfrm>
+          <a:prstGeom prst="straightConnector1">
+            <a:avLst/>
+          </a:prstGeom>
+          <a:ln>
+            <a:tailEnd type="triangle"/>
+          </a:ln>
+        </p:spPr>
+        <p:style>
+          <a:lnRef idx="1">
+            <a:schemeClr val="accent1"/>
+          </a:lnRef>
+          <a:fillRef idx="0">
+            <a:schemeClr val="accent1"/>
+          </a:fillRef>
+          <a:effectRef idx="0">
+            <a:schemeClr val="accent1"/>
+          </a:effectRef>
+          <a:fontRef idx="minor">
+            <a:schemeClr val="tx1"/>
+          </a:fontRef>
+        </p:style>
+      </p:cxnSp>
+      <p:pic>
+        <p:nvPicPr>
+          <p:cNvPr id="18" name="Graphic 17" descr="Database">
+            <a:extLst>
+              <a:ext uri="{FF2B5EF4-FFF2-40B4-BE49-F238E27FC236}">
+                <a16:creationId xmlns:a16="http://schemas.microsoft.com/office/drawing/2014/main" id="{C2C72F70-532E-4016-AFD4-3525A4C2C622}"/>
+              </a:ext>
+            </a:extLst>
+          </p:cNvPr>
+          <p:cNvPicPr>
+            <a:picLocks noChangeAspect="1"/>
+          </p:cNvPicPr>
+          <p:nvPr/>
+        </p:nvPicPr>
+        <p:blipFill>
+          <a:blip r:embed="rId4">
+            <a:extLst>
+              <a:ext uri="{28A0092B-C50C-407E-A947-70E740481C1C}">
+                <a14:useLocalDpi xmlns:a14="http://schemas.microsoft.com/office/drawing/2010/main" val="0"/>
+              </a:ext>
+              <a:ext uri="{96DAC541-7B7A-43D3-8B79-37D633B846F1}">
+                <asvg:svgBlip xmlns:asvg="http://schemas.microsoft.com/office/drawing/2016/SVG/main" r:embed="rId5"/>
+              </a:ext>
+            </a:extLst>
+          </a:blip>
+          <a:stretch>
+            <a:fillRect/>
+          </a:stretch>
+        </p:blipFill>
+        <p:spPr>
+          <a:xfrm>
+            <a:off x="10065260" y="1786042"/>
+            <a:ext cx="763379" cy="763379"/>
+          </a:xfrm>
+          <a:prstGeom prst="rect">
+            <a:avLst/>
+          </a:prstGeom>
+        </p:spPr>
+      </p:pic>
+      <p:cxnSp>
+        <p:nvCxnSpPr>
+          <p:cNvPr id="19" name="Straight Arrow Connector 18">
+            <a:extLst>
+              <a:ext uri="{FF2B5EF4-FFF2-40B4-BE49-F238E27FC236}">
+                <a16:creationId xmlns:a16="http://schemas.microsoft.com/office/drawing/2014/main" id="{D2A4B132-2C34-4A40-A999-EA71F362B217}"/>
+              </a:ext>
+            </a:extLst>
+          </p:cNvPr>
+          <p:cNvCxnSpPr>
+            <a:cxnSpLocks/>
+          </p:cNvCxnSpPr>
+          <p:nvPr/>
+        </p:nvCxnSpPr>
+        <p:spPr>
+          <a:xfrm>
+            <a:off x="9595103" y="2143636"/>
+            <a:ext cx="520003" cy="0"/>
+          </a:xfrm>
+          <a:prstGeom prst="straightConnector1">
+            <a:avLst/>
+          </a:prstGeom>
+          <a:ln>
+            <a:tailEnd type="triangle"/>
+          </a:ln>
+        </p:spPr>
+        <p:style>
+          <a:lnRef idx="1">
+            <a:schemeClr val="accent1"/>
+          </a:lnRef>
+          <a:fillRef idx="0">
+            <a:schemeClr val="accent1"/>
+          </a:fillRef>
+          <a:effectRef idx="0">
+            <a:schemeClr val="accent1"/>
+          </a:effectRef>
+          <a:fontRef idx="minor">
+            <a:schemeClr val="tx1"/>
+          </a:fontRef>
+        </p:style>
+      </p:cxnSp>
+      <p:sp>
+        <p:nvSpPr>
+          <p:cNvPr id="20" name="TextBox 19">
+            <a:extLst>
+              <a:ext uri="{FF2B5EF4-FFF2-40B4-BE49-F238E27FC236}">
+                <a16:creationId xmlns:a16="http://schemas.microsoft.com/office/drawing/2014/main" id="{A3C7A2E1-B9DE-4277-BBD5-5048490F81BE}"/>
+              </a:ext>
+            </a:extLst>
+          </p:cNvPr>
+          <p:cNvSpPr txBox="1"/>
+          <p:nvPr/>
+        </p:nvSpPr>
+        <p:spPr>
+          <a:xfrm>
+            <a:off x="9994923" y="1546900"/>
+            <a:ext cx="1064730" cy="276999"/>
+          </a:xfrm>
+          <a:prstGeom prst="rect">
+            <a:avLst/>
+          </a:prstGeom>
+          <a:noFill/>
+        </p:spPr>
+        <p:txBody>
+          <a:bodyPr wrap="square" rtlCol="0">
+            <a:spAutoFit/>
+          </a:bodyPr>
+          <a:lstStyle/>
+          <a:p>
+            <a:r>
+              <a:rPr lang="en-US" sz="1200" dirty="0"/>
+              <a:t>BLOB Store</a:t>
+            </a:r>
+            <a:endParaRPr lang="en-IN" sz="1200" dirty="0"/>
+          </a:p>
+        </p:txBody>
+      </p:sp>
+      <p:sp>
+        <p:nvSpPr>
+          <p:cNvPr id="21" name="TextBox 20">
+            <a:extLst>
+              <a:ext uri="{FF2B5EF4-FFF2-40B4-BE49-F238E27FC236}">
+                <a16:creationId xmlns:a16="http://schemas.microsoft.com/office/drawing/2014/main" id="{0BD5A617-6AD5-4FC9-B71D-9BE3F9F3E48C}"/>
+              </a:ext>
+            </a:extLst>
+          </p:cNvPr>
+          <p:cNvSpPr txBox="1"/>
+          <p:nvPr/>
+        </p:nvSpPr>
+        <p:spPr>
+          <a:xfrm>
+            <a:off x="5878504" y="1229900"/>
+            <a:ext cx="3470136" cy="276999"/>
+          </a:xfrm>
+          <a:prstGeom prst="rect">
+            <a:avLst/>
+          </a:prstGeom>
+          <a:noFill/>
+        </p:spPr>
+        <p:txBody>
+          <a:bodyPr wrap="square" rtlCol="0">
+            <a:spAutoFit/>
+          </a:bodyPr>
+          <a:lstStyle/>
+          <a:p>
+            <a:r>
+              <a:rPr lang="en-US" sz="1200" dirty="0"/>
+              <a:t>Build Pack (Converts code to Container Image</a:t>
+            </a:r>
+            <a:endParaRPr lang="en-IN" sz="1200" dirty="0"/>
+          </a:p>
+        </p:txBody>
+      </p:sp>
+      <p:sp>
+        <p:nvSpPr>
+          <p:cNvPr id="22" name="Rectangle 21">
+            <a:extLst>
+              <a:ext uri="{FF2B5EF4-FFF2-40B4-BE49-F238E27FC236}">
+                <a16:creationId xmlns:a16="http://schemas.microsoft.com/office/drawing/2014/main" id="{D533DC40-BC17-49A0-835F-DF09E26E46D3}"/>
               </a:ext>
             </a:extLst>
           </p:cNvPr>
@@ -6233,8 +7546,8 @@
         </p:nvSpPr>
         <p:spPr>
           <a:xfrm>
-            <a:off x="2266949" y="4064222"/>
-            <a:ext cx="3829051" cy="518888"/>
+            <a:off x="5843089" y="1797275"/>
+            <a:ext cx="3540967" cy="304420"/>
           </a:xfrm>
           <a:prstGeom prst="rect">
             <a:avLst/>
@@ -6262,19 +7575,19 @@
           <a:p>
             <a:pPr algn="ctr"/>
             <a:r>
-              <a:rPr lang="en-US" dirty="0"/>
-              <a:t>Libraries</a:t>
-            </a:r>
-            <a:endParaRPr lang="en-IN" dirty="0"/>
-          </a:p>
-        </p:txBody>
-      </p:sp>
-      <p:sp>
-        <p:nvSpPr>
-          <p:cNvPr id="13" name="Rectangle 12">
-            <a:extLst>
-              <a:ext uri="{FF2B5EF4-FFF2-40B4-BE49-F238E27FC236}">
-                <a16:creationId xmlns:a16="http://schemas.microsoft.com/office/drawing/2014/main" id="{D75A79A7-795A-4A72-94A5-4DD8B9941F9D}"/>
+              <a:rPr lang="en-US" sz="1200" dirty="0"/>
+              <a:t>Application Code</a:t>
+            </a:r>
+            <a:endParaRPr lang="en-IN" sz="1200" dirty="0"/>
+          </a:p>
+        </p:txBody>
+      </p:sp>
+      <p:sp>
+        <p:nvSpPr>
+          <p:cNvPr id="23" name="Rectangle 22">
+            <a:extLst>
+              <a:ext uri="{FF2B5EF4-FFF2-40B4-BE49-F238E27FC236}">
+                <a16:creationId xmlns:a16="http://schemas.microsoft.com/office/drawing/2014/main" id="{640A1C4E-7DD8-4ED2-B850-BA0B76C36057}"/>
               </a:ext>
             </a:extLst>
           </p:cNvPr>
@@ -6283,15 +7596,12 @@
         </p:nvSpPr>
         <p:spPr>
           <a:xfrm>
-            <a:off x="6677024" y="4064222"/>
-            <a:ext cx="3829051" cy="518888"/>
+            <a:off x="5843090" y="2304827"/>
+            <a:ext cx="948687" cy="304419"/>
           </a:xfrm>
           <a:prstGeom prst="rect">
             <a:avLst/>
           </a:prstGeom>
-          <a:solidFill>
-            <a:srgbClr val="FF75AD"/>
-          </a:solidFill>
         </p:spPr>
         <p:style>
           <a:lnRef idx="2">
@@ -6315,139 +7625,220 @@
           <a:p>
             <a:pPr algn="ctr"/>
             <a:r>
-              <a:rPr lang="en-US" dirty="0"/>
-              <a:t>Dependencies</a:t>
-            </a:r>
-            <a:endParaRPr lang="en-IN" dirty="0"/>
+              <a:rPr lang="en-US" sz="1200" dirty="0"/>
+              <a:t>Runtime</a:t>
+            </a:r>
+            <a:endParaRPr lang="en-IN" sz="1200" dirty="0"/>
+          </a:p>
+        </p:txBody>
+      </p:sp>
+      <p:sp>
+        <p:nvSpPr>
+          <p:cNvPr id="24" name="Rectangle 23">
+            <a:extLst>
+              <a:ext uri="{FF2B5EF4-FFF2-40B4-BE49-F238E27FC236}">
+                <a16:creationId xmlns:a16="http://schemas.microsoft.com/office/drawing/2014/main" id="{B2C84E39-9B9B-42C5-BF95-D1EADFB69592}"/>
+              </a:ext>
+            </a:extLst>
+          </p:cNvPr>
+          <p:cNvSpPr/>
+          <p:nvPr/>
+        </p:nvSpPr>
+        <p:spPr>
+          <a:xfrm>
+            <a:off x="6938494" y="2297240"/>
+            <a:ext cx="1107669" cy="304419"/>
+          </a:xfrm>
+          <a:prstGeom prst="rect">
+            <a:avLst/>
+          </a:prstGeom>
+        </p:spPr>
+        <p:style>
+          <a:lnRef idx="2">
+            <a:schemeClr val="accent1">
+              <a:shade val="50000"/>
+            </a:schemeClr>
+          </a:lnRef>
+          <a:fillRef idx="1">
+            <a:schemeClr val="accent1"/>
+          </a:fillRef>
+          <a:effectRef idx="0">
+            <a:schemeClr val="accent1"/>
+          </a:effectRef>
+          <a:fontRef idx="minor">
+            <a:schemeClr val="lt1"/>
+          </a:fontRef>
+        </p:style>
+        <p:txBody>
+          <a:bodyPr rtlCol="0" anchor="ctr"/>
+          <a:lstStyle/>
+          <a:p>
+            <a:pPr algn="ctr"/>
+            <a:r>
+              <a:rPr lang="en-US" sz="1200" dirty="0"/>
+              <a:t>Agent</a:t>
+            </a:r>
+            <a:endParaRPr lang="en-IN" sz="1200" dirty="0"/>
+          </a:p>
+        </p:txBody>
+      </p:sp>
+      <p:sp>
+        <p:nvSpPr>
+          <p:cNvPr id="25" name="Rectangle 24">
+            <a:extLst>
+              <a:ext uri="{FF2B5EF4-FFF2-40B4-BE49-F238E27FC236}">
+                <a16:creationId xmlns:a16="http://schemas.microsoft.com/office/drawing/2014/main" id="{B0DE03DC-0CCD-4E46-A09D-235D0741A073}"/>
+              </a:ext>
+            </a:extLst>
+          </p:cNvPr>
+          <p:cNvSpPr/>
+          <p:nvPr/>
+        </p:nvSpPr>
+        <p:spPr>
+          <a:xfrm>
+            <a:off x="8116693" y="2297240"/>
+            <a:ext cx="1267363" cy="304419"/>
+          </a:xfrm>
+          <a:prstGeom prst="rect">
+            <a:avLst/>
+          </a:prstGeom>
+        </p:spPr>
+        <p:style>
+          <a:lnRef idx="2">
+            <a:schemeClr val="accent1">
+              <a:shade val="50000"/>
+            </a:schemeClr>
+          </a:lnRef>
+          <a:fillRef idx="1">
+            <a:schemeClr val="accent1"/>
+          </a:fillRef>
+          <a:effectRef idx="0">
+            <a:schemeClr val="accent1"/>
+          </a:effectRef>
+          <a:fontRef idx="minor">
+            <a:schemeClr val="lt1"/>
+          </a:fontRef>
+        </p:style>
+        <p:txBody>
+          <a:bodyPr rtlCol="0" anchor="ctr"/>
+          <a:lstStyle/>
+          <a:p>
+            <a:pPr algn="ctr"/>
+            <a:r>
+              <a:rPr lang="en-US" sz="1200" dirty="0"/>
+              <a:t>Run Command</a:t>
+            </a:r>
+            <a:endParaRPr lang="en-IN" sz="1200" dirty="0"/>
+          </a:p>
+        </p:txBody>
+      </p:sp>
+      <p:sp>
+        <p:nvSpPr>
+          <p:cNvPr id="28" name="Rectangle 27">
+            <a:extLst>
+              <a:ext uri="{FF2B5EF4-FFF2-40B4-BE49-F238E27FC236}">
+                <a16:creationId xmlns:a16="http://schemas.microsoft.com/office/drawing/2014/main" id="{388FB050-6F13-4C0B-83FA-B6274BCF935E}"/>
+              </a:ext>
+            </a:extLst>
+          </p:cNvPr>
+          <p:cNvSpPr/>
+          <p:nvPr/>
+        </p:nvSpPr>
+        <p:spPr>
+          <a:xfrm>
+            <a:off x="7639921" y="4362214"/>
+            <a:ext cx="1032901" cy="560388"/>
+          </a:xfrm>
+          <a:prstGeom prst="rect">
+            <a:avLst/>
+          </a:prstGeom>
+        </p:spPr>
+        <p:style>
+          <a:lnRef idx="2">
+            <a:schemeClr val="accent1">
+              <a:shade val="50000"/>
+            </a:schemeClr>
+          </a:lnRef>
+          <a:fillRef idx="1">
+            <a:schemeClr val="accent1"/>
+          </a:fillRef>
+          <a:effectRef idx="0">
+            <a:schemeClr val="accent1"/>
+          </a:effectRef>
+          <a:fontRef idx="minor">
+            <a:schemeClr val="lt1"/>
+          </a:fontRef>
+        </p:style>
+        <p:txBody>
+          <a:bodyPr rtlCol="0" anchor="ctr"/>
+          <a:lstStyle/>
+          <a:p>
+            <a:pPr algn="ctr"/>
+            <a:r>
+              <a:rPr lang="en-US" sz="1200" dirty="0"/>
+              <a:t>Diego </a:t>
+            </a:r>
+            <a:endParaRPr lang="en-IN" sz="1200" dirty="0"/>
+          </a:p>
+        </p:txBody>
+      </p:sp>
+      <p:sp>
+        <p:nvSpPr>
+          <p:cNvPr id="31" name="Rectangle 30">
+            <a:extLst>
+              <a:ext uri="{FF2B5EF4-FFF2-40B4-BE49-F238E27FC236}">
+                <a16:creationId xmlns:a16="http://schemas.microsoft.com/office/drawing/2014/main" id="{CDB59C54-E5F4-4641-8955-7784892ABB6D}"/>
+              </a:ext>
+            </a:extLst>
+          </p:cNvPr>
+          <p:cNvSpPr/>
+          <p:nvPr/>
+        </p:nvSpPr>
+        <p:spPr>
+          <a:xfrm>
+            <a:off x="2109819" y="3628200"/>
+            <a:ext cx="3170684" cy="2028416"/>
+          </a:xfrm>
+          <a:prstGeom prst="rect">
+            <a:avLst/>
+          </a:prstGeom>
+          <a:noFill/>
+        </p:spPr>
+        <p:style>
+          <a:lnRef idx="2">
+            <a:schemeClr val="accent1">
+              <a:shade val="50000"/>
+            </a:schemeClr>
+          </a:lnRef>
+          <a:fillRef idx="1">
+            <a:schemeClr val="accent1"/>
+          </a:fillRef>
+          <a:effectRef idx="0">
+            <a:schemeClr val="accent1"/>
+          </a:effectRef>
+          <a:fontRef idx="minor">
+            <a:schemeClr val="lt1"/>
+          </a:fontRef>
+        </p:style>
+        <p:txBody>
+          <a:bodyPr rtlCol="0" anchor="ctr"/>
+          <a:lstStyle/>
+          <a:p>
+            <a:pPr algn="ctr"/>
+            <a:r>
+              <a:rPr lang="en-US" sz="1400" dirty="0"/>
+              <a:t>Build pack</a:t>
+            </a:r>
+            <a:endParaRPr lang="en-IN" sz="1400" dirty="0"/>
           </a:p>
         </p:txBody>
       </p:sp>
       <p:pic>
         <p:nvPicPr>
-          <p:cNvPr id="17" name="Picture 16" descr="A picture containing text, clipart&#10;&#10;Description automatically generated">
-            <a:extLst>
-              <a:ext uri="{FF2B5EF4-FFF2-40B4-BE49-F238E27FC236}">
-                <a16:creationId xmlns:a16="http://schemas.microsoft.com/office/drawing/2014/main" id="{A1B34113-ADB7-4A46-8AF1-4180E4C0F5E2}"/>
-              </a:ext>
-            </a:extLst>
-          </p:cNvPr>
-          <p:cNvPicPr>
-            <a:picLocks noChangeAspect="1"/>
-          </p:cNvPicPr>
-          <p:nvPr/>
-        </p:nvPicPr>
-        <p:blipFill>
-          <a:blip r:embed="rId2">
-            <a:extLst>
-              <a:ext uri="{BEBA8EAE-BF5A-486C-A8C5-ECC9F3942E4B}">
-                <a14:imgProps xmlns:a14="http://schemas.microsoft.com/office/drawing/2010/main">
-                  <a14:imgLayer r:embed="rId3">
-                    <a14:imgEffect>
-                      <a14:artisticPhotocopy trans="36000" detail="6"/>
-                    </a14:imgEffect>
-                  </a14:imgLayer>
-                </a14:imgProps>
-              </a:ext>
-              <a:ext uri="{28A0092B-C50C-407E-A947-70E740481C1C}">
-                <a14:useLocalDpi xmlns:a14="http://schemas.microsoft.com/office/drawing/2010/main" val="0"/>
-              </a:ext>
-            </a:extLst>
-          </a:blip>
-          <a:stretch>
-            <a:fillRect/>
-          </a:stretch>
-        </p:blipFill>
-        <p:spPr>
-          <a:xfrm>
-            <a:off x="2266949" y="2004371"/>
-            <a:ext cx="1362076" cy="759252"/>
-          </a:xfrm>
-          <a:prstGeom prst="rect">
-            <a:avLst/>
-          </a:prstGeom>
-          <a:solidFill>
-            <a:schemeClr val="bg1"/>
-          </a:solidFill>
-        </p:spPr>
-      </p:pic>
-      <p:pic>
-        <p:nvPicPr>
-          <p:cNvPr id="19" name="Picture 18" descr="Logo, company name&#10;&#10;Description automatically generated">
-            <a:extLst>
-              <a:ext uri="{FF2B5EF4-FFF2-40B4-BE49-F238E27FC236}">
-                <a16:creationId xmlns:a16="http://schemas.microsoft.com/office/drawing/2014/main" id="{4FF9DE22-8B05-456C-84EF-322748384BE1}"/>
-              </a:ext>
-            </a:extLst>
-          </p:cNvPr>
-          <p:cNvPicPr>
-            <a:picLocks noChangeAspect="1"/>
-          </p:cNvPicPr>
-          <p:nvPr/>
-        </p:nvPicPr>
-        <p:blipFill>
-          <a:blip r:embed="rId4">
-            <a:extLst>
-              <a:ext uri="{28A0092B-C50C-407E-A947-70E740481C1C}">
-                <a14:useLocalDpi xmlns:a14="http://schemas.microsoft.com/office/drawing/2010/main" val="0"/>
-              </a:ext>
-            </a:extLst>
-          </a:blip>
-          <a:stretch>
-            <a:fillRect/>
-          </a:stretch>
-        </p:blipFill>
-        <p:spPr>
-          <a:xfrm>
-            <a:off x="6386511" y="2004371"/>
-            <a:ext cx="1362076" cy="759252"/>
-          </a:xfrm>
-          <a:prstGeom prst="rect">
-            <a:avLst/>
-          </a:prstGeom>
-        </p:spPr>
-      </p:pic>
-      <p:pic>
-        <p:nvPicPr>
-          <p:cNvPr id="21" name="Picture 20" descr="A picture containing text&#10;&#10;Description automatically generated">
-            <a:extLst>
-              <a:ext uri="{FF2B5EF4-FFF2-40B4-BE49-F238E27FC236}">
-                <a16:creationId xmlns:a16="http://schemas.microsoft.com/office/drawing/2014/main" id="{9E2300D6-17CE-4F6C-BDE9-87EFE172EC02}"/>
-              </a:ext>
-            </a:extLst>
-          </p:cNvPr>
-          <p:cNvPicPr>
-            <a:picLocks noChangeAspect="1"/>
-          </p:cNvPicPr>
-          <p:nvPr/>
-        </p:nvPicPr>
-        <p:blipFill>
-          <a:blip r:embed="rId5">
-            <a:extLst>
-              <a:ext uri="{28A0092B-C50C-407E-A947-70E740481C1C}">
-                <a14:useLocalDpi xmlns:a14="http://schemas.microsoft.com/office/drawing/2010/main" val="0"/>
-              </a:ext>
-            </a:extLst>
-          </a:blip>
-          <a:stretch>
-            <a:fillRect/>
-          </a:stretch>
-        </p:blipFill>
-        <p:spPr>
-          <a:xfrm>
-            <a:off x="8616150" y="2004371"/>
-            <a:ext cx="1556550" cy="759252"/>
-          </a:xfrm>
-          <a:prstGeom prst="rect">
-            <a:avLst/>
-          </a:prstGeom>
-        </p:spPr>
-      </p:pic>
-      <p:pic>
-        <p:nvPicPr>
-          <p:cNvPr id="23" name="Picture 22" descr="A picture containing text&#10;&#10;Description automatically generated">
-            <a:extLst>
-              <a:ext uri="{FF2B5EF4-FFF2-40B4-BE49-F238E27FC236}">
-                <a16:creationId xmlns:a16="http://schemas.microsoft.com/office/drawing/2014/main" id="{DBF29F5B-788D-4254-A217-8CEB220672ED}"/>
+          <p:cNvPr id="33" name="Graphic 32" descr="Cloud">
+            <a:extLst>
+              <a:ext uri="{FF2B5EF4-FFF2-40B4-BE49-F238E27FC236}">
+                <a16:creationId xmlns:a16="http://schemas.microsoft.com/office/drawing/2014/main" id="{06C1417B-2D88-4BFE-812F-6637C8DC9DB8}"/>
               </a:ext>
             </a:extLst>
           </p:cNvPr>
@@ -6462,6 +7853,9 @@
               <a:ext uri="{28A0092B-C50C-407E-A947-70E740481C1C}">
                 <a14:useLocalDpi xmlns:a14="http://schemas.microsoft.com/office/drawing/2010/main" val="0"/>
               </a:ext>
+              <a:ext uri="{96DAC541-7B7A-43D3-8B79-37D633B846F1}">
+                <asvg:svgBlip xmlns:asvg="http://schemas.microsoft.com/office/drawing/2016/SVG/main" r:embed="rId7"/>
+              </a:ext>
             </a:extLst>
           </a:blip>
           <a:stretch>
@@ -6470,8 +7864,8 @@
         </p:blipFill>
         <p:spPr>
           <a:xfrm>
-            <a:off x="4238563" y="2004371"/>
-            <a:ext cx="1409822" cy="759252"/>
+            <a:off x="2161984" y="3603618"/>
+            <a:ext cx="625604" cy="625604"/>
           </a:xfrm>
           <a:prstGeom prst="rect">
             <a:avLst/>
@@ -6480,10 +7874,46 @@
       </p:pic>
       <p:sp>
         <p:nvSpPr>
-          <p:cNvPr id="24" name="Rectangle 23">
-            <a:extLst>
-              <a:ext uri="{FF2B5EF4-FFF2-40B4-BE49-F238E27FC236}">
-                <a16:creationId xmlns:a16="http://schemas.microsoft.com/office/drawing/2014/main" id="{9E63B231-4C53-49D6-9EE5-31660A5E5AA9}"/>
+          <p:cNvPr id="34" name="TextBox 33">
+            <a:extLst>
+              <a:ext uri="{FF2B5EF4-FFF2-40B4-BE49-F238E27FC236}">
+                <a16:creationId xmlns:a16="http://schemas.microsoft.com/office/drawing/2014/main" id="{8AE95C0F-0951-4360-A4B9-2BDA24C9CB0A}"/>
+              </a:ext>
+            </a:extLst>
+          </p:cNvPr>
+          <p:cNvSpPr txBox="1"/>
+          <p:nvPr/>
+        </p:nvSpPr>
+        <p:spPr>
+          <a:xfrm>
+            <a:off x="3403286" y="5780111"/>
+            <a:ext cx="512314" cy="276999"/>
+          </a:xfrm>
+          <a:prstGeom prst="rect">
+            <a:avLst/>
+          </a:prstGeom>
+          <a:noFill/>
+        </p:spPr>
+        <p:txBody>
+          <a:bodyPr wrap="square" rtlCol="0">
+            <a:spAutoFit/>
+          </a:bodyPr>
+          <a:lstStyle/>
+          <a:p>
+            <a:r>
+              <a:rPr lang="en-US" sz="1200" dirty="0"/>
+              <a:t>VM</a:t>
+            </a:r>
+            <a:endParaRPr lang="en-IN" sz="1200" dirty="0"/>
+          </a:p>
+        </p:txBody>
+      </p:sp>
+      <p:sp>
+        <p:nvSpPr>
+          <p:cNvPr id="35" name="Rectangle 34">
+            <a:extLst>
+              <a:ext uri="{FF2B5EF4-FFF2-40B4-BE49-F238E27FC236}">
+                <a16:creationId xmlns:a16="http://schemas.microsoft.com/office/drawing/2014/main" id="{DAF7BCF3-CBCB-4C9F-BEE8-928F4E3F54B1}"/>
               </a:ext>
             </a:extLst>
           </p:cNvPr>
@@ -6492,18 +7922,12 @@
         </p:nvSpPr>
         <p:spPr>
           <a:xfrm>
-            <a:off x="2095501" y="1762125"/>
-            <a:ext cx="1657350" cy="1263423"/>
+            <a:off x="2268180" y="4500979"/>
+            <a:ext cx="452761" cy="390617"/>
           </a:xfrm>
           <a:prstGeom prst="rect">
             <a:avLst/>
           </a:prstGeom>
-          <a:noFill/>
-          <a:ln>
-            <a:solidFill>
-              <a:schemeClr val="accent1"/>
-            </a:solidFill>
-          </a:ln>
         </p:spPr>
         <p:style>
           <a:lnRef idx="2">
@@ -6532,10 +7956,10 @@
       </p:sp>
       <p:sp>
         <p:nvSpPr>
-          <p:cNvPr id="25" name="Rectangle 24">
-            <a:extLst>
-              <a:ext uri="{FF2B5EF4-FFF2-40B4-BE49-F238E27FC236}">
-                <a16:creationId xmlns:a16="http://schemas.microsoft.com/office/drawing/2014/main" id="{0921A963-ABE7-47D3-BA08-A170B12B4693}"/>
+          <p:cNvPr id="36" name="Rectangle 35">
+            <a:extLst>
+              <a:ext uri="{FF2B5EF4-FFF2-40B4-BE49-F238E27FC236}">
+                <a16:creationId xmlns:a16="http://schemas.microsoft.com/office/drawing/2014/main" id="{1D4BAF5A-9B76-44D7-A46C-2992354CE02F}"/>
               </a:ext>
             </a:extLst>
           </p:cNvPr>
@@ -6544,18 +7968,12 @@
         </p:nvSpPr>
         <p:spPr>
           <a:xfrm>
-            <a:off x="4114799" y="1762125"/>
-            <a:ext cx="1657350" cy="1263423"/>
+            <a:off x="2879594" y="4500978"/>
+            <a:ext cx="452761" cy="390617"/>
           </a:xfrm>
           <a:prstGeom prst="rect">
             <a:avLst/>
           </a:prstGeom>
-          <a:noFill/>
-          <a:ln>
-            <a:solidFill>
-              <a:schemeClr val="accent1"/>
-            </a:solidFill>
-          </a:ln>
         </p:spPr>
         <p:style>
           <a:lnRef idx="2">
@@ -6584,10 +8002,10 @@
       </p:sp>
       <p:sp>
         <p:nvSpPr>
-          <p:cNvPr id="26" name="Rectangle 25">
-            <a:extLst>
-              <a:ext uri="{FF2B5EF4-FFF2-40B4-BE49-F238E27FC236}">
-                <a16:creationId xmlns:a16="http://schemas.microsoft.com/office/drawing/2014/main" id="{7293032A-A67E-4570-B871-BBA30D4744A7}"/>
+          <p:cNvPr id="37" name="Rectangle 36">
+            <a:extLst>
+              <a:ext uri="{FF2B5EF4-FFF2-40B4-BE49-F238E27FC236}">
+                <a16:creationId xmlns:a16="http://schemas.microsoft.com/office/drawing/2014/main" id="{51F9BD81-2952-4D4E-9D83-546BA93E0E27}"/>
               </a:ext>
             </a:extLst>
           </p:cNvPr>
@@ -6596,18 +8014,15 @@
         </p:nvSpPr>
         <p:spPr>
           <a:xfrm>
-            <a:off x="6238874" y="1762125"/>
-            <a:ext cx="1657350" cy="1263423"/>
+            <a:off x="3508519" y="4500978"/>
+            <a:ext cx="452761" cy="390617"/>
           </a:xfrm>
           <a:prstGeom prst="rect">
             <a:avLst/>
           </a:prstGeom>
-          <a:noFill/>
-          <a:ln>
-            <a:solidFill>
-              <a:schemeClr val="accent1"/>
-            </a:solidFill>
-          </a:ln>
+          <a:solidFill>
+            <a:srgbClr val="92D050"/>
+          </a:solidFill>
         </p:spPr>
         <p:style>
           <a:lnRef idx="2">
@@ -6636,10 +8051,10 @@
       </p:sp>
       <p:sp>
         <p:nvSpPr>
-          <p:cNvPr id="27" name="Rectangle 26">
-            <a:extLst>
-              <a:ext uri="{FF2B5EF4-FFF2-40B4-BE49-F238E27FC236}">
-                <a16:creationId xmlns:a16="http://schemas.microsoft.com/office/drawing/2014/main" id="{882A0A3C-2B62-4441-A824-1B9CDC60F780}"/>
+          <p:cNvPr id="38" name="Rectangle 37">
+            <a:extLst>
+              <a:ext uri="{FF2B5EF4-FFF2-40B4-BE49-F238E27FC236}">
+                <a16:creationId xmlns:a16="http://schemas.microsoft.com/office/drawing/2014/main" id="{BD7651A6-5114-43C9-8873-3D2160369FE7}"/>
               </a:ext>
             </a:extLst>
           </p:cNvPr>
@@ -6648,18 +8063,13 @@
         </p:nvSpPr>
         <p:spPr>
           <a:xfrm>
-            <a:off x="8591549" y="1762125"/>
-            <a:ext cx="1657350" cy="1263423"/>
+            <a:off x="4168130" y="4500977"/>
+            <a:ext cx="452761" cy="390617"/>
           </a:xfrm>
           <a:prstGeom prst="rect">
             <a:avLst/>
           </a:prstGeom>
           <a:noFill/>
-          <a:ln>
-            <a:solidFill>
-              <a:schemeClr val="accent1"/>
-            </a:solidFill>
-          </a:ln>
         </p:spPr>
         <p:style>
           <a:lnRef idx="2">
@@ -6686,154 +8096,94 @@
           </a:p>
         </p:txBody>
       </p:sp>
-      <p:sp>
-        <p:nvSpPr>
-          <p:cNvPr id="28" name="TextBox 27">
-            <a:extLst>
-              <a:ext uri="{FF2B5EF4-FFF2-40B4-BE49-F238E27FC236}">
-                <a16:creationId xmlns:a16="http://schemas.microsoft.com/office/drawing/2014/main" id="{10176CB8-A2BC-432D-8746-6811212AF9C3}"/>
-              </a:ext>
-            </a:extLst>
-          </p:cNvPr>
-          <p:cNvSpPr txBox="1"/>
+      <p:cxnSp>
+        <p:nvCxnSpPr>
+          <p:cNvPr id="40" name="Straight Arrow Connector 39">
+            <a:extLst>
+              <a:ext uri="{FF2B5EF4-FFF2-40B4-BE49-F238E27FC236}">
+                <a16:creationId xmlns:a16="http://schemas.microsoft.com/office/drawing/2014/main" id="{A0DBA6C3-4473-4FA7-898C-8187E5BD0ED2}"/>
+              </a:ext>
+            </a:extLst>
+          </p:cNvPr>
+          <p:cNvCxnSpPr>
+            <a:stCxn id="28" idx="1"/>
+            <a:endCxn id="31" idx="3"/>
+          </p:cNvCxnSpPr>
           <p:nvPr/>
-        </p:nvSpPr>
-        <p:spPr>
-          <a:xfrm>
-            <a:off x="2198657" y="1217364"/>
-            <a:ext cx="1168910" cy="307777"/>
-          </a:xfrm>
-          <a:prstGeom prst="rect">
-            <a:avLst/>
-          </a:prstGeom>
-          <a:noFill/>
-        </p:spPr>
-        <p:txBody>
-          <a:bodyPr wrap="none" rtlCol="0">
-            <a:spAutoFit/>
-          </a:bodyPr>
-          <a:lstStyle/>
-          <a:p>
-            <a:r>
-              <a:rPr lang="en-US" sz="1400" dirty="0"/>
-              <a:t>Web Server</a:t>
-            </a:r>
-            <a:endParaRPr lang="en-IN" sz="1400" dirty="0"/>
-          </a:p>
-        </p:txBody>
-      </p:sp>
-      <p:sp>
-        <p:nvSpPr>
-          <p:cNvPr id="29" name="TextBox 28">
-            <a:extLst>
-              <a:ext uri="{FF2B5EF4-FFF2-40B4-BE49-F238E27FC236}">
-                <a16:creationId xmlns:a16="http://schemas.microsoft.com/office/drawing/2014/main" id="{3D16C034-D015-4B68-91D2-C03B34D249DF}"/>
-              </a:ext>
-            </a:extLst>
-          </p:cNvPr>
-          <p:cNvSpPr txBox="1"/>
+        </p:nvCxnSpPr>
+        <p:spPr>
+          <a:xfrm flipH="1">
+            <a:off x="5280503" y="4642408"/>
+            <a:ext cx="2359418" cy="0"/>
+          </a:xfrm>
+          <a:prstGeom prst="straightConnector1">
+            <a:avLst/>
+          </a:prstGeom>
+          <a:ln>
+            <a:tailEnd type="triangle"/>
+          </a:ln>
+        </p:spPr>
+        <p:style>
+          <a:lnRef idx="1">
+            <a:schemeClr val="accent1"/>
+          </a:lnRef>
+          <a:fillRef idx="0">
+            <a:schemeClr val="accent1"/>
+          </a:fillRef>
+          <a:effectRef idx="0">
+            <a:schemeClr val="accent1"/>
+          </a:effectRef>
+          <a:fontRef idx="minor">
+            <a:schemeClr val="tx1"/>
+          </a:fontRef>
+        </p:style>
+      </p:cxnSp>
+      <p:cxnSp>
+        <p:nvCxnSpPr>
+          <p:cNvPr id="46" name="Connector: Elbow 45">
+            <a:extLst>
+              <a:ext uri="{FF2B5EF4-FFF2-40B4-BE49-F238E27FC236}">
+                <a16:creationId xmlns:a16="http://schemas.microsoft.com/office/drawing/2014/main" id="{06440271-33FB-44AA-82B9-F42A7632A9E8}"/>
+              </a:ext>
+            </a:extLst>
+          </p:cNvPr>
+          <p:cNvCxnSpPr>
+            <a:stCxn id="18" idx="2"/>
+            <a:endCxn id="28" idx="3"/>
+          </p:cNvCxnSpPr>
           <p:nvPr/>
-        </p:nvSpPr>
-        <p:spPr>
-          <a:xfrm>
-            <a:off x="4114800" y="1222422"/>
-            <a:ext cx="1743076" cy="523220"/>
-          </a:xfrm>
-          <a:prstGeom prst="rect">
-            <a:avLst/>
-          </a:prstGeom>
-          <a:noFill/>
-        </p:spPr>
-        <p:txBody>
-          <a:bodyPr wrap="square" rtlCol="0">
-            <a:spAutoFit/>
-          </a:bodyPr>
-          <a:lstStyle/>
-          <a:p>
-            <a:r>
-              <a:rPr lang="en-US" sz="1400" dirty="0"/>
-              <a:t>Session Management</a:t>
-            </a:r>
-            <a:endParaRPr lang="en-IN" sz="1400" dirty="0"/>
-          </a:p>
-        </p:txBody>
-      </p:sp>
-      <p:sp>
-        <p:nvSpPr>
-          <p:cNvPr id="30" name="TextBox 29">
-            <a:extLst>
-              <a:ext uri="{FF2B5EF4-FFF2-40B4-BE49-F238E27FC236}">
-                <a16:creationId xmlns:a16="http://schemas.microsoft.com/office/drawing/2014/main" id="{13DDAFB5-C4FB-48A7-A748-7F45211616DC}"/>
-              </a:ext>
-            </a:extLst>
-          </p:cNvPr>
-          <p:cNvSpPr txBox="1"/>
-          <p:nvPr/>
-        </p:nvSpPr>
-        <p:spPr>
-          <a:xfrm>
-            <a:off x="6483094" y="1217364"/>
-            <a:ext cx="986167" cy="307777"/>
-          </a:xfrm>
-          <a:prstGeom prst="rect">
-            <a:avLst/>
-          </a:prstGeom>
-          <a:noFill/>
-        </p:spPr>
-        <p:txBody>
-          <a:bodyPr wrap="none" rtlCol="0">
-            <a:spAutoFit/>
-          </a:bodyPr>
-          <a:lstStyle/>
-          <a:p>
-            <a:r>
-              <a:rPr lang="en-US" sz="1400" dirty="0"/>
-              <a:t>Database</a:t>
-            </a:r>
-            <a:endParaRPr lang="en-IN" sz="1400" dirty="0"/>
-          </a:p>
-        </p:txBody>
-      </p:sp>
-      <p:sp>
-        <p:nvSpPr>
-          <p:cNvPr id="31" name="TextBox 30">
-            <a:extLst>
-              <a:ext uri="{FF2B5EF4-FFF2-40B4-BE49-F238E27FC236}">
-                <a16:creationId xmlns:a16="http://schemas.microsoft.com/office/drawing/2014/main" id="{9DF10547-2B45-49F6-8815-3934812EE862}"/>
-              </a:ext>
-            </a:extLst>
-          </p:cNvPr>
-          <p:cNvSpPr txBox="1"/>
-          <p:nvPr/>
-        </p:nvSpPr>
-        <p:spPr>
-          <a:xfrm>
-            <a:off x="9174804" y="1214733"/>
-            <a:ext cx="490840" cy="307777"/>
-          </a:xfrm>
-          <a:prstGeom prst="rect">
-            <a:avLst/>
-          </a:prstGeom>
-          <a:noFill/>
-        </p:spPr>
-        <p:txBody>
-          <a:bodyPr wrap="none" rtlCol="0">
-            <a:spAutoFit/>
-          </a:bodyPr>
-          <a:lstStyle/>
-          <a:p>
-            <a:r>
-              <a:rPr lang="en-US" sz="1400" dirty="0"/>
-              <a:t>MQ</a:t>
-            </a:r>
-            <a:endParaRPr lang="en-IN" sz="1400" dirty="0"/>
-          </a:p>
-        </p:txBody>
-      </p:sp>
+        </p:nvCxnSpPr>
+        <p:spPr>
+          <a:xfrm rot="5400000">
+            <a:off x="8513393" y="2708850"/>
+            <a:ext cx="2092987" cy="1774128"/>
+          </a:xfrm>
+          <a:prstGeom prst="bentConnector2">
+            <a:avLst/>
+          </a:prstGeom>
+          <a:ln>
+            <a:tailEnd type="triangle"/>
+          </a:ln>
+        </p:spPr>
+        <p:style>
+          <a:lnRef idx="1">
+            <a:schemeClr val="accent1"/>
+          </a:lnRef>
+          <a:fillRef idx="0">
+            <a:schemeClr val="accent1"/>
+          </a:fillRef>
+          <a:effectRef idx="0">
+            <a:schemeClr val="accent1"/>
+          </a:effectRef>
+          <a:fontRef idx="minor">
+            <a:schemeClr val="tx1"/>
+          </a:fontRef>
+        </p:style>
+      </p:cxnSp>
     </p:spTree>
     <p:extLst>
       <p:ext uri="{BB962C8B-B14F-4D97-AF65-F5344CB8AC3E}">
-        <p14:creationId xmlns:p14="http://schemas.microsoft.com/office/powerpoint/2010/main" val="4025168152"/>
+        <p14:creationId xmlns:p14="http://schemas.microsoft.com/office/powerpoint/2010/main" val="134822380"/>
       </p:ext>
     </p:extLst>
   </p:cSld>
@@ -6865,7 +8215,7 @@
           <p:cNvPr id="2" name="Title 1">
             <a:extLst>
               <a:ext uri="{FF2B5EF4-FFF2-40B4-BE49-F238E27FC236}">
-                <a16:creationId xmlns:a16="http://schemas.microsoft.com/office/drawing/2014/main" id="{498676B0-627E-428C-95E5-3520225D7BDC}"/>
+                <a16:creationId xmlns:a16="http://schemas.microsoft.com/office/drawing/2014/main" id="{D8238C94-71DB-46BB-A81E-A76E97918A71}"/>
               </a:ext>
             </a:extLst>
           </p:cNvPr>
@@ -6876,7 +8226,12 @@
             <p:ph type="title"/>
           </p:nvPr>
         </p:nvSpPr>
-        <p:spPr/>
+        <p:spPr>
+          <a:xfrm>
+            <a:off x="1343025" y="328840"/>
+            <a:ext cx="10406063" cy="646278"/>
+          </a:xfrm>
+        </p:spPr>
         <p:txBody>
           <a:bodyPr>
             <a:normAutofit/>
@@ -6885,7 +8240,7 @@
           <a:p>
             <a:r>
               <a:rPr lang="en-US" sz="3200" dirty="0"/>
-              <a:t>What is Docker?</a:t>
+              <a:t>Why Docker?</a:t>
             </a:r>
             <a:endParaRPr lang="en-IN" sz="3200" dirty="0"/>
           </a:p>
@@ -6893,91 +8248,725 @@
       </p:sp>
       <p:sp>
         <p:nvSpPr>
-          <p:cNvPr id="3" name="Content Placeholder 2">
-            <a:extLst>
-              <a:ext uri="{FF2B5EF4-FFF2-40B4-BE49-F238E27FC236}">
-                <a16:creationId xmlns:a16="http://schemas.microsoft.com/office/drawing/2014/main" id="{4B55B512-0B02-406F-B7B1-316454910E39}"/>
-              </a:ext>
-            </a:extLst>
-          </p:cNvPr>
-          <p:cNvSpPr>
-            <a:spLocks noGrp="1"/>
-          </p:cNvSpPr>
-          <p:nvPr>
-            <p:ph idx="1"/>
-          </p:nvPr>
-        </p:nvSpPr>
-        <p:spPr>
-          <a:xfrm>
-            <a:off x="1343024" y="1412875"/>
-            <a:ext cx="10406063" cy="4356100"/>
-          </a:xfrm>
-        </p:spPr>
-        <p:txBody>
-          <a:bodyPr/>
+          <p:cNvPr id="6" name="Rectangle 5">
+            <a:extLst>
+              <a:ext uri="{FF2B5EF4-FFF2-40B4-BE49-F238E27FC236}">
+                <a16:creationId xmlns:a16="http://schemas.microsoft.com/office/drawing/2014/main" id="{D71FB4A7-CCA0-4215-930D-17511BE20C03}"/>
+              </a:ext>
+            </a:extLst>
+          </p:cNvPr>
+          <p:cNvSpPr/>
+          <p:nvPr/>
+        </p:nvSpPr>
+        <p:spPr>
+          <a:xfrm>
+            <a:off x="2266949" y="5405437"/>
+            <a:ext cx="8239125" cy="600075"/>
+          </a:xfrm>
+          <a:prstGeom prst="rect">
+            <a:avLst/>
+          </a:prstGeom>
+          <a:solidFill>
+            <a:srgbClr val="62C3AA"/>
+          </a:solidFill>
+        </p:spPr>
+        <p:style>
+          <a:lnRef idx="2">
+            <a:schemeClr val="accent1">
+              <a:shade val="50000"/>
+            </a:schemeClr>
+          </a:lnRef>
+          <a:fillRef idx="1">
+            <a:schemeClr val="accent1"/>
+          </a:fillRef>
+          <a:effectRef idx="0">
+            <a:schemeClr val="accent1"/>
+          </a:effectRef>
+          <a:fontRef idx="minor">
+            <a:schemeClr val="lt1"/>
+          </a:fontRef>
+        </p:style>
+        <p:txBody>
+          <a:bodyPr rtlCol="0" anchor="ctr"/>
           <a:lstStyle/>
           <a:p>
-            <a:pPr>
-              <a:buClr>
-                <a:srgbClr val="C00000"/>
-              </a:buClr>
-              <a:buSzPct val="80000"/>
-              <a:buFont typeface="Wingdings 2" panose="05020102010507070707" pitchFamily="18" charset="2"/>
-              <a:buChar char=""/>
-            </a:pPr>
+            <a:pPr algn="ctr"/>
             <a:r>
               <a:rPr lang="en-US" dirty="0"/>
-              <a:t>Docker isn’t programming Language</a:t>
-            </a:r>
-          </a:p>
-          <a:p>
-            <a:pPr>
-              <a:buClr>
-                <a:srgbClr val="C00000"/>
-              </a:buClr>
-              <a:buSzPct val="75000"/>
-              <a:buFont typeface="Wingdings 2" panose="05020102010507070707" pitchFamily="18" charset="2"/>
-              <a:buChar char=""/>
-            </a:pPr>
+              <a:t>Hardware Infrastructure</a:t>
+            </a:r>
+            <a:endParaRPr lang="en-IN" dirty="0"/>
+          </a:p>
+        </p:txBody>
+      </p:sp>
+      <p:sp>
+        <p:nvSpPr>
+          <p:cNvPr id="7" name="Rectangle 6">
+            <a:extLst>
+              <a:ext uri="{FF2B5EF4-FFF2-40B4-BE49-F238E27FC236}">
+                <a16:creationId xmlns:a16="http://schemas.microsoft.com/office/drawing/2014/main" id="{5496DE79-D36F-4AF1-AB1F-2A633FDA5C51}"/>
+              </a:ext>
+            </a:extLst>
+          </p:cNvPr>
+          <p:cNvSpPr/>
+          <p:nvPr/>
+        </p:nvSpPr>
+        <p:spPr>
+          <a:xfrm>
+            <a:off x="2266949" y="4694236"/>
+            <a:ext cx="8239125" cy="600075"/>
+          </a:xfrm>
+          <a:prstGeom prst="rect">
+            <a:avLst/>
+          </a:prstGeom>
+          <a:solidFill>
+            <a:srgbClr val="D2E9FA"/>
+          </a:solidFill>
+        </p:spPr>
+        <p:style>
+          <a:lnRef idx="2">
+            <a:schemeClr val="accent1">
+              <a:shade val="50000"/>
+            </a:schemeClr>
+          </a:lnRef>
+          <a:fillRef idx="1">
+            <a:schemeClr val="accent1"/>
+          </a:fillRef>
+          <a:effectRef idx="0">
+            <a:schemeClr val="accent1"/>
+          </a:effectRef>
+          <a:fontRef idx="minor">
+            <a:schemeClr val="lt1"/>
+          </a:fontRef>
+        </p:style>
+        <p:txBody>
+          <a:bodyPr rtlCol="0" anchor="ctr"/>
+          <a:lstStyle/>
+          <a:p>
+            <a:pPr algn="ctr"/>
             <a:r>
               <a:rPr lang="en-US" dirty="0"/>
-              <a:t>Docker isn’t framework</a:t>
-            </a:r>
-          </a:p>
-          <a:p>
-            <a:pPr>
-              <a:buClr>
-                <a:srgbClr val="00B050"/>
-              </a:buClr>
-              <a:buSzPct val="75000"/>
-              <a:buFont typeface="Wingdings 2" panose="05020102010507070707" pitchFamily="18" charset="2"/>
-              <a:buChar char=""/>
-            </a:pPr>
+              <a:t>Host Operating System</a:t>
+            </a:r>
+            <a:endParaRPr lang="en-IN" dirty="0"/>
+          </a:p>
+        </p:txBody>
+      </p:sp>
+      <p:sp>
+        <p:nvSpPr>
+          <p:cNvPr id="11" name="Rectangle 10">
+            <a:extLst>
+              <a:ext uri="{FF2B5EF4-FFF2-40B4-BE49-F238E27FC236}">
+                <a16:creationId xmlns:a16="http://schemas.microsoft.com/office/drawing/2014/main" id="{69AEBC08-778C-447C-81E6-2DF5CD1C321C}"/>
+              </a:ext>
+            </a:extLst>
+          </p:cNvPr>
+          <p:cNvSpPr/>
+          <p:nvPr/>
+        </p:nvSpPr>
+        <p:spPr>
+          <a:xfrm>
+            <a:off x="2266949" y="4064222"/>
+            <a:ext cx="3829051" cy="518888"/>
+          </a:xfrm>
+          <a:prstGeom prst="rect">
+            <a:avLst/>
+          </a:prstGeom>
+        </p:spPr>
+        <p:style>
+          <a:lnRef idx="2">
+            <a:schemeClr val="accent1">
+              <a:shade val="50000"/>
+            </a:schemeClr>
+          </a:lnRef>
+          <a:fillRef idx="1">
+            <a:schemeClr val="accent1"/>
+          </a:fillRef>
+          <a:effectRef idx="0">
+            <a:schemeClr val="accent1"/>
+          </a:effectRef>
+          <a:fontRef idx="minor">
+            <a:schemeClr val="lt1"/>
+          </a:fontRef>
+        </p:style>
+        <p:txBody>
+          <a:bodyPr rtlCol="0" anchor="ctr"/>
+          <a:lstStyle/>
+          <a:p>
+            <a:pPr algn="ctr"/>
             <a:r>
               <a:rPr lang="en-US" dirty="0"/>
-              <a:t>Docker is a tool that helps</a:t>
-            </a:r>
-          </a:p>
-          <a:p>
-            <a:pPr lvl="1">
-              <a:buClr>
-                <a:srgbClr val="00B050"/>
-              </a:buClr>
-              <a:buSzPct val="75000"/>
-              <a:buFont typeface="Wingdings 2" panose="05020102010507070707" pitchFamily="18" charset="2"/>
-              <a:buChar char=""/>
-            </a:pPr>
+              <a:t>Libraries</a:t>
+            </a:r>
+            <a:endParaRPr lang="en-IN" dirty="0"/>
+          </a:p>
+        </p:txBody>
+      </p:sp>
+      <p:sp>
+        <p:nvSpPr>
+          <p:cNvPr id="13" name="Rectangle 12">
+            <a:extLst>
+              <a:ext uri="{FF2B5EF4-FFF2-40B4-BE49-F238E27FC236}">
+                <a16:creationId xmlns:a16="http://schemas.microsoft.com/office/drawing/2014/main" id="{D75A79A7-795A-4A72-94A5-4DD8B9941F9D}"/>
+              </a:ext>
+            </a:extLst>
+          </p:cNvPr>
+          <p:cNvSpPr/>
+          <p:nvPr/>
+        </p:nvSpPr>
+        <p:spPr>
+          <a:xfrm>
+            <a:off x="6677024" y="4064222"/>
+            <a:ext cx="3829051" cy="518888"/>
+          </a:xfrm>
+          <a:prstGeom prst="rect">
+            <a:avLst/>
+          </a:prstGeom>
+          <a:solidFill>
+            <a:srgbClr val="FF75AD"/>
+          </a:solidFill>
+        </p:spPr>
+        <p:style>
+          <a:lnRef idx="2">
+            <a:schemeClr val="accent1">
+              <a:shade val="50000"/>
+            </a:schemeClr>
+          </a:lnRef>
+          <a:fillRef idx="1">
+            <a:schemeClr val="accent1"/>
+          </a:fillRef>
+          <a:effectRef idx="0">
+            <a:schemeClr val="accent1"/>
+          </a:effectRef>
+          <a:fontRef idx="minor">
+            <a:schemeClr val="lt1"/>
+          </a:fontRef>
+        </p:style>
+        <p:txBody>
+          <a:bodyPr rtlCol="0" anchor="ctr"/>
+          <a:lstStyle/>
+          <a:p>
+            <a:pPr algn="ctr"/>
             <a:r>
               <a:rPr lang="en-US" dirty="0"/>
-              <a:t>Installing, removing, upgrading, distributing and running software</a:t>
-            </a:r>
+              <a:t>Dependencies</a:t>
+            </a:r>
+            <a:endParaRPr lang="en-IN" dirty="0"/>
+          </a:p>
+        </p:txBody>
+      </p:sp>
+      <p:pic>
+        <p:nvPicPr>
+          <p:cNvPr id="17" name="Picture 16" descr="A picture containing text, clipart&#10;&#10;Description automatically generated">
+            <a:extLst>
+              <a:ext uri="{FF2B5EF4-FFF2-40B4-BE49-F238E27FC236}">
+                <a16:creationId xmlns:a16="http://schemas.microsoft.com/office/drawing/2014/main" id="{A1B34113-ADB7-4A46-8AF1-4180E4C0F5E2}"/>
+              </a:ext>
+            </a:extLst>
+          </p:cNvPr>
+          <p:cNvPicPr>
+            <a:picLocks noChangeAspect="1"/>
+          </p:cNvPicPr>
+          <p:nvPr/>
+        </p:nvPicPr>
+        <p:blipFill>
+          <a:blip r:embed="rId2">
+            <a:extLst>
+              <a:ext uri="{BEBA8EAE-BF5A-486C-A8C5-ECC9F3942E4B}">
+                <a14:imgProps xmlns:a14="http://schemas.microsoft.com/office/drawing/2010/main">
+                  <a14:imgLayer r:embed="rId3">
+                    <a14:imgEffect>
+                      <a14:artisticPhotocopy trans="36000" detail="6"/>
+                    </a14:imgEffect>
+                  </a14:imgLayer>
+                </a14:imgProps>
+              </a:ext>
+              <a:ext uri="{28A0092B-C50C-407E-A947-70E740481C1C}">
+                <a14:useLocalDpi xmlns:a14="http://schemas.microsoft.com/office/drawing/2010/main" val="0"/>
+              </a:ext>
+            </a:extLst>
+          </a:blip>
+          <a:stretch>
+            <a:fillRect/>
+          </a:stretch>
+        </p:blipFill>
+        <p:spPr>
+          <a:xfrm>
+            <a:off x="2266949" y="2004371"/>
+            <a:ext cx="1362076" cy="759252"/>
+          </a:xfrm>
+          <a:prstGeom prst="rect">
+            <a:avLst/>
+          </a:prstGeom>
+          <a:solidFill>
+            <a:schemeClr val="bg1"/>
+          </a:solidFill>
+        </p:spPr>
+      </p:pic>
+      <p:pic>
+        <p:nvPicPr>
+          <p:cNvPr id="19" name="Picture 18" descr="Logo, company name&#10;&#10;Description automatically generated">
+            <a:extLst>
+              <a:ext uri="{FF2B5EF4-FFF2-40B4-BE49-F238E27FC236}">
+                <a16:creationId xmlns:a16="http://schemas.microsoft.com/office/drawing/2014/main" id="{4FF9DE22-8B05-456C-84EF-322748384BE1}"/>
+              </a:ext>
+            </a:extLst>
+          </p:cNvPr>
+          <p:cNvPicPr>
+            <a:picLocks noChangeAspect="1"/>
+          </p:cNvPicPr>
+          <p:nvPr/>
+        </p:nvPicPr>
+        <p:blipFill>
+          <a:blip r:embed="rId4">
+            <a:extLst>
+              <a:ext uri="{28A0092B-C50C-407E-A947-70E740481C1C}">
+                <a14:useLocalDpi xmlns:a14="http://schemas.microsoft.com/office/drawing/2010/main" val="0"/>
+              </a:ext>
+            </a:extLst>
+          </a:blip>
+          <a:stretch>
+            <a:fillRect/>
+          </a:stretch>
+        </p:blipFill>
+        <p:spPr>
+          <a:xfrm>
+            <a:off x="6386511" y="2004371"/>
+            <a:ext cx="1362076" cy="759252"/>
+          </a:xfrm>
+          <a:prstGeom prst="rect">
+            <a:avLst/>
+          </a:prstGeom>
+        </p:spPr>
+      </p:pic>
+      <p:pic>
+        <p:nvPicPr>
+          <p:cNvPr id="21" name="Picture 20" descr="A picture containing text&#10;&#10;Description automatically generated">
+            <a:extLst>
+              <a:ext uri="{FF2B5EF4-FFF2-40B4-BE49-F238E27FC236}">
+                <a16:creationId xmlns:a16="http://schemas.microsoft.com/office/drawing/2014/main" id="{9E2300D6-17CE-4F6C-BDE9-87EFE172EC02}"/>
+              </a:ext>
+            </a:extLst>
+          </p:cNvPr>
+          <p:cNvPicPr>
+            <a:picLocks noChangeAspect="1"/>
+          </p:cNvPicPr>
+          <p:nvPr/>
+        </p:nvPicPr>
+        <p:blipFill>
+          <a:blip r:embed="rId5">
+            <a:extLst>
+              <a:ext uri="{28A0092B-C50C-407E-A947-70E740481C1C}">
+                <a14:useLocalDpi xmlns:a14="http://schemas.microsoft.com/office/drawing/2010/main" val="0"/>
+              </a:ext>
+            </a:extLst>
+          </a:blip>
+          <a:stretch>
+            <a:fillRect/>
+          </a:stretch>
+        </p:blipFill>
+        <p:spPr>
+          <a:xfrm>
+            <a:off x="8616150" y="2004371"/>
+            <a:ext cx="1556550" cy="759252"/>
+          </a:xfrm>
+          <a:prstGeom prst="rect">
+            <a:avLst/>
+          </a:prstGeom>
+        </p:spPr>
+      </p:pic>
+      <p:pic>
+        <p:nvPicPr>
+          <p:cNvPr id="23" name="Picture 22" descr="A picture containing text&#10;&#10;Description automatically generated">
+            <a:extLst>
+              <a:ext uri="{FF2B5EF4-FFF2-40B4-BE49-F238E27FC236}">
+                <a16:creationId xmlns:a16="http://schemas.microsoft.com/office/drawing/2014/main" id="{DBF29F5B-788D-4254-A217-8CEB220672ED}"/>
+              </a:ext>
+            </a:extLst>
+          </p:cNvPr>
+          <p:cNvPicPr>
+            <a:picLocks noChangeAspect="1"/>
+          </p:cNvPicPr>
+          <p:nvPr/>
+        </p:nvPicPr>
+        <p:blipFill>
+          <a:blip r:embed="rId6">
+            <a:extLst>
+              <a:ext uri="{28A0092B-C50C-407E-A947-70E740481C1C}">
+                <a14:useLocalDpi xmlns:a14="http://schemas.microsoft.com/office/drawing/2010/main" val="0"/>
+              </a:ext>
+            </a:extLst>
+          </a:blip>
+          <a:stretch>
+            <a:fillRect/>
+          </a:stretch>
+        </p:blipFill>
+        <p:spPr>
+          <a:xfrm>
+            <a:off x="4238563" y="2004371"/>
+            <a:ext cx="1409822" cy="759252"/>
+          </a:xfrm>
+          <a:prstGeom prst="rect">
+            <a:avLst/>
+          </a:prstGeom>
+        </p:spPr>
+      </p:pic>
+      <p:sp>
+        <p:nvSpPr>
+          <p:cNvPr id="24" name="Rectangle 23">
+            <a:extLst>
+              <a:ext uri="{FF2B5EF4-FFF2-40B4-BE49-F238E27FC236}">
+                <a16:creationId xmlns:a16="http://schemas.microsoft.com/office/drawing/2014/main" id="{9E63B231-4C53-49D6-9EE5-31660A5E5AA9}"/>
+              </a:ext>
+            </a:extLst>
+          </p:cNvPr>
+          <p:cNvSpPr/>
+          <p:nvPr/>
+        </p:nvSpPr>
+        <p:spPr>
+          <a:xfrm>
+            <a:off x="2095501" y="1762125"/>
+            <a:ext cx="1657350" cy="1263423"/>
+          </a:xfrm>
+          <a:prstGeom prst="rect">
+            <a:avLst/>
+          </a:prstGeom>
+          <a:noFill/>
+          <a:ln>
+            <a:solidFill>
+              <a:schemeClr val="accent1"/>
+            </a:solidFill>
+          </a:ln>
+        </p:spPr>
+        <p:style>
+          <a:lnRef idx="2">
+            <a:schemeClr val="accent1">
+              <a:shade val="50000"/>
+            </a:schemeClr>
+          </a:lnRef>
+          <a:fillRef idx="1">
+            <a:schemeClr val="accent1"/>
+          </a:fillRef>
+          <a:effectRef idx="0">
+            <a:schemeClr val="accent1"/>
+          </a:effectRef>
+          <a:fontRef idx="minor">
+            <a:schemeClr val="lt1"/>
+          </a:fontRef>
+        </p:style>
+        <p:txBody>
+          <a:bodyPr rtlCol="0" anchor="ctr"/>
+          <a:lstStyle/>
+          <a:p>
+            <a:pPr algn="ctr"/>
+            <a:endParaRPr lang="en-IN"/>
+          </a:p>
+        </p:txBody>
+      </p:sp>
+      <p:sp>
+        <p:nvSpPr>
+          <p:cNvPr id="25" name="Rectangle 24">
+            <a:extLst>
+              <a:ext uri="{FF2B5EF4-FFF2-40B4-BE49-F238E27FC236}">
+                <a16:creationId xmlns:a16="http://schemas.microsoft.com/office/drawing/2014/main" id="{0921A963-ABE7-47D3-BA08-A170B12B4693}"/>
+              </a:ext>
+            </a:extLst>
+          </p:cNvPr>
+          <p:cNvSpPr/>
+          <p:nvPr/>
+        </p:nvSpPr>
+        <p:spPr>
+          <a:xfrm>
+            <a:off x="4114799" y="1762125"/>
+            <a:ext cx="1657350" cy="1263423"/>
+          </a:xfrm>
+          <a:prstGeom prst="rect">
+            <a:avLst/>
+          </a:prstGeom>
+          <a:noFill/>
+          <a:ln>
+            <a:solidFill>
+              <a:schemeClr val="accent1"/>
+            </a:solidFill>
+          </a:ln>
+        </p:spPr>
+        <p:style>
+          <a:lnRef idx="2">
+            <a:schemeClr val="accent1">
+              <a:shade val="50000"/>
+            </a:schemeClr>
+          </a:lnRef>
+          <a:fillRef idx="1">
+            <a:schemeClr val="accent1"/>
+          </a:fillRef>
+          <a:effectRef idx="0">
+            <a:schemeClr val="accent1"/>
+          </a:effectRef>
+          <a:fontRef idx="minor">
+            <a:schemeClr val="lt1"/>
+          </a:fontRef>
+        </p:style>
+        <p:txBody>
+          <a:bodyPr rtlCol="0" anchor="ctr"/>
+          <a:lstStyle/>
+          <a:p>
+            <a:pPr algn="ctr"/>
+            <a:endParaRPr lang="en-IN"/>
+          </a:p>
+        </p:txBody>
+      </p:sp>
+      <p:sp>
+        <p:nvSpPr>
+          <p:cNvPr id="26" name="Rectangle 25">
+            <a:extLst>
+              <a:ext uri="{FF2B5EF4-FFF2-40B4-BE49-F238E27FC236}">
+                <a16:creationId xmlns:a16="http://schemas.microsoft.com/office/drawing/2014/main" id="{7293032A-A67E-4570-B871-BBA30D4744A7}"/>
+              </a:ext>
+            </a:extLst>
+          </p:cNvPr>
+          <p:cNvSpPr/>
+          <p:nvPr/>
+        </p:nvSpPr>
+        <p:spPr>
+          <a:xfrm>
+            <a:off x="6238874" y="1762125"/>
+            <a:ext cx="1657350" cy="1263423"/>
+          </a:xfrm>
+          <a:prstGeom prst="rect">
+            <a:avLst/>
+          </a:prstGeom>
+          <a:noFill/>
+          <a:ln>
+            <a:solidFill>
+              <a:schemeClr val="accent1"/>
+            </a:solidFill>
+          </a:ln>
+        </p:spPr>
+        <p:style>
+          <a:lnRef idx="2">
+            <a:schemeClr val="accent1">
+              <a:shade val="50000"/>
+            </a:schemeClr>
+          </a:lnRef>
+          <a:fillRef idx="1">
+            <a:schemeClr val="accent1"/>
+          </a:fillRef>
+          <a:effectRef idx="0">
+            <a:schemeClr val="accent1"/>
+          </a:effectRef>
+          <a:fontRef idx="minor">
+            <a:schemeClr val="lt1"/>
+          </a:fontRef>
+        </p:style>
+        <p:txBody>
+          <a:bodyPr rtlCol="0" anchor="ctr"/>
+          <a:lstStyle/>
+          <a:p>
+            <a:pPr algn="ctr"/>
+            <a:endParaRPr lang="en-IN"/>
+          </a:p>
+        </p:txBody>
+      </p:sp>
+      <p:sp>
+        <p:nvSpPr>
+          <p:cNvPr id="27" name="Rectangle 26">
+            <a:extLst>
+              <a:ext uri="{FF2B5EF4-FFF2-40B4-BE49-F238E27FC236}">
+                <a16:creationId xmlns:a16="http://schemas.microsoft.com/office/drawing/2014/main" id="{882A0A3C-2B62-4441-A824-1B9CDC60F780}"/>
+              </a:ext>
+            </a:extLst>
+          </p:cNvPr>
+          <p:cNvSpPr/>
+          <p:nvPr/>
+        </p:nvSpPr>
+        <p:spPr>
+          <a:xfrm>
+            <a:off x="8591549" y="1762125"/>
+            <a:ext cx="1657350" cy="1263423"/>
+          </a:xfrm>
+          <a:prstGeom prst="rect">
+            <a:avLst/>
+          </a:prstGeom>
+          <a:noFill/>
+          <a:ln>
+            <a:solidFill>
+              <a:schemeClr val="accent1"/>
+            </a:solidFill>
+          </a:ln>
+        </p:spPr>
+        <p:style>
+          <a:lnRef idx="2">
+            <a:schemeClr val="accent1">
+              <a:shade val="50000"/>
+            </a:schemeClr>
+          </a:lnRef>
+          <a:fillRef idx="1">
+            <a:schemeClr val="accent1"/>
+          </a:fillRef>
+          <a:effectRef idx="0">
+            <a:schemeClr val="accent1"/>
+          </a:effectRef>
+          <a:fontRef idx="minor">
+            <a:schemeClr val="lt1"/>
+          </a:fontRef>
+        </p:style>
+        <p:txBody>
+          <a:bodyPr rtlCol="0" anchor="ctr"/>
+          <a:lstStyle/>
+          <a:p>
+            <a:pPr algn="ctr"/>
+            <a:endParaRPr lang="en-IN"/>
+          </a:p>
+        </p:txBody>
+      </p:sp>
+      <p:sp>
+        <p:nvSpPr>
+          <p:cNvPr id="28" name="TextBox 27">
+            <a:extLst>
+              <a:ext uri="{FF2B5EF4-FFF2-40B4-BE49-F238E27FC236}">
+                <a16:creationId xmlns:a16="http://schemas.microsoft.com/office/drawing/2014/main" id="{10176CB8-A2BC-432D-8746-6811212AF9C3}"/>
+              </a:ext>
+            </a:extLst>
+          </p:cNvPr>
+          <p:cNvSpPr txBox="1"/>
+          <p:nvPr/>
+        </p:nvSpPr>
+        <p:spPr>
+          <a:xfrm>
+            <a:off x="2198657" y="1217364"/>
+            <a:ext cx="1168910" cy="307777"/>
+          </a:xfrm>
+          <a:prstGeom prst="rect">
+            <a:avLst/>
+          </a:prstGeom>
+          <a:noFill/>
+        </p:spPr>
+        <p:txBody>
+          <a:bodyPr wrap="none" rtlCol="0">
+            <a:spAutoFit/>
+          </a:bodyPr>
+          <a:lstStyle/>
+          <a:p>
+            <a:r>
+              <a:rPr lang="en-US" sz="1400" dirty="0"/>
+              <a:t>Web Server</a:t>
+            </a:r>
+            <a:endParaRPr lang="en-IN" sz="1400" dirty="0"/>
+          </a:p>
+        </p:txBody>
+      </p:sp>
+      <p:sp>
+        <p:nvSpPr>
+          <p:cNvPr id="29" name="TextBox 28">
+            <a:extLst>
+              <a:ext uri="{FF2B5EF4-FFF2-40B4-BE49-F238E27FC236}">
+                <a16:creationId xmlns:a16="http://schemas.microsoft.com/office/drawing/2014/main" id="{3D16C034-D015-4B68-91D2-C03B34D249DF}"/>
+              </a:ext>
+            </a:extLst>
+          </p:cNvPr>
+          <p:cNvSpPr txBox="1"/>
+          <p:nvPr/>
+        </p:nvSpPr>
+        <p:spPr>
+          <a:xfrm>
+            <a:off x="4114799" y="1163978"/>
+            <a:ext cx="1743076" cy="523220"/>
+          </a:xfrm>
+          <a:prstGeom prst="rect">
+            <a:avLst/>
+          </a:prstGeom>
+          <a:noFill/>
+        </p:spPr>
+        <p:txBody>
+          <a:bodyPr wrap="square" rtlCol="0">
+            <a:spAutoFit/>
+          </a:bodyPr>
+          <a:lstStyle/>
+          <a:p>
+            <a:r>
+              <a:rPr lang="en-US" sz="1400" dirty="0"/>
+              <a:t>Session Management</a:t>
+            </a:r>
+            <a:endParaRPr lang="en-IN" sz="1400" dirty="0"/>
+          </a:p>
+        </p:txBody>
+      </p:sp>
+      <p:sp>
+        <p:nvSpPr>
+          <p:cNvPr id="30" name="TextBox 29">
+            <a:extLst>
+              <a:ext uri="{FF2B5EF4-FFF2-40B4-BE49-F238E27FC236}">
+                <a16:creationId xmlns:a16="http://schemas.microsoft.com/office/drawing/2014/main" id="{13DDAFB5-C4FB-48A7-A748-7F45211616DC}"/>
+              </a:ext>
+            </a:extLst>
+          </p:cNvPr>
+          <p:cNvSpPr txBox="1"/>
+          <p:nvPr/>
+        </p:nvSpPr>
+        <p:spPr>
+          <a:xfrm>
+            <a:off x="6483094" y="1217364"/>
+            <a:ext cx="986167" cy="307777"/>
+          </a:xfrm>
+          <a:prstGeom prst="rect">
+            <a:avLst/>
+          </a:prstGeom>
+          <a:noFill/>
+        </p:spPr>
+        <p:txBody>
+          <a:bodyPr wrap="none" rtlCol="0">
+            <a:spAutoFit/>
+          </a:bodyPr>
+          <a:lstStyle/>
+          <a:p>
+            <a:r>
+              <a:rPr lang="en-US" sz="1400" dirty="0"/>
+              <a:t>Database</a:t>
+            </a:r>
+            <a:endParaRPr lang="en-IN" sz="1400" dirty="0"/>
+          </a:p>
+        </p:txBody>
+      </p:sp>
+      <p:sp>
+        <p:nvSpPr>
+          <p:cNvPr id="31" name="TextBox 30">
+            <a:extLst>
+              <a:ext uri="{FF2B5EF4-FFF2-40B4-BE49-F238E27FC236}">
+                <a16:creationId xmlns:a16="http://schemas.microsoft.com/office/drawing/2014/main" id="{9DF10547-2B45-49F6-8815-3934812EE862}"/>
+              </a:ext>
+            </a:extLst>
+          </p:cNvPr>
+          <p:cNvSpPr txBox="1"/>
+          <p:nvPr/>
+        </p:nvSpPr>
+        <p:spPr>
+          <a:xfrm>
+            <a:off x="9174804" y="1214733"/>
+            <a:ext cx="490840" cy="307777"/>
+          </a:xfrm>
+          <a:prstGeom prst="rect">
+            <a:avLst/>
+          </a:prstGeom>
+          <a:noFill/>
+        </p:spPr>
+        <p:txBody>
+          <a:bodyPr wrap="none" rtlCol="0">
+            <a:spAutoFit/>
+          </a:bodyPr>
+          <a:lstStyle/>
+          <a:p>
+            <a:r>
+              <a:rPr lang="en-US" sz="1400" dirty="0"/>
+              <a:t>MQ</a:t>
+            </a:r>
+            <a:endParaRPr lang="en-IN" sz="1400" dirty="0"/>
           </a:p>
         </p:txBody>
       </p:sp>
     </p:spTree>
     <p:extLst>
       <p:ext uri="{BB962C8B-B14F-4D97-AF65-F5344CB8AC3E}">
-        <p14:creationId xmlns:p14="http://schemas.microsoft.com/office/powerpoint/2010/main" val="991052440"/>
+        <p14:creationId xmlns:p14="http://schemas.microsoft.com/office/powerpoint/2010/main" val="4025168152"/>
       </p:ext>
     </p:extLst>
   </p:cSld>
@@ -6988,6 +8977,915 @@
 </file>
 
 <file path=ppt/slides/slide5.xml><?xml version="1.0" encoding="utf-8"?>
+<p:sld xmlns:a="http://schemas.openxmlformats.org/drawingml/2006/main" xmlns:r="http://schemas.openxmlformats.org/officeDocument/2006/relationships" xmlns:p="http://schemas.openxmlformats.org/presentationml/2006/main">
+  <p:cSld>
+    <p:spTree>
+      <p:nvGrpSpPr>
+        <p:cNvPr id="1" name=""/>
+        <p:cNvGrpSpPr/>
+        <p:nvPr/>
+      </p:nvGrpSpPr>
+      <p:grpSpPr>
+        <a:xfrm>
+          <a:off x="0" y="0"/>
+          <a:ext cx="0" cy="0"/>
+          <a:chOff x="0" y="0"/>
+          <a:chExt cx="0" cy="0"/>
+        </a:xfrm>
+      </p:grpSpPr>
+      <p:sp>
+        <p:nvSpPr>
+          <p:cNvPr id="2" name="Title 1">
+            <a:extLst>
+              <a:ext uri="{FF2B5EF4-FFF2-40B4-BE49-F238E27FC236}">
+                <a16:creationId xmlns:a16="http://schemas.microsoft.com/office/drawing/2014/main" id="{F2DFA964-535F-4B57-8A63-9A3AF9551B4E}"/>
+              </a:ext>
+            </a:extLst>
+          </p:cNvPr>
+          <p:cNvSpPr>
+            <a:spLocks noGrp="1"/>
+          </p:cNvSpPr>
+          <p:nvPr>
+            <p:ph type="title"/>
+          </p:nvPr>
+        </p:nvSpPr>
+        <p:spPr>
+          <a:xfrm>
+            <a:off x="1343025" y="328840"/>
+            <a:ext cx="10406063" cy="550050"/>
+          </a:xfrm>
+        </p:spPr>
+        <p:txBody>
+          <a:bodyPr>
+            <a:normAutofit/>
+          </a:bodyPr>
+          <a:lstStyle/>
+          <a:p>
+            <a:r>
+              <a:rPr lang="en-US" sz="2800" dirty="0"/>
+              <a:t>Spring Boot + Docker</a:t>
+            </a:r>
+            <a:endParaRPr lang="en-IN" sz="2800" dirty="0"/>
+          </a:p>
+        </p:txBody>
+      </p:sp>
+      <p:sp>
+        <p:nvSpPr>
+          <p:cNvPr id="4" name="Rectangle 3">
+            <a:extLst>
+              <a:ext uri="{FF2B5EF4-FFF2-40B4-BE49-F238E27FC236}">
+                <a16:creationId xmlns:a16="http://schemas.microsoft.com/office/drawing/2014/main" id="{717408AC-22A0-4FE7-A245-C6BE3B8EFDDF}"/>
+              </a:ext>
+            </a:extLst>
+          </p:cNvPr>
+          <p:cNvSpPr/>
+          <p:nvPr/>
+        </p:nvSpPr>
+        <p:spPr>
+          <a:xfrm>
+            <a:off x="1343025" y="1429305"/>
+            <a:ext cx="2341208" cy="656947"/>
+          </a:xfrm>
+          <a:prstGeom prst="rect">
+            <a:avLst/>
+          </a:prstGeom>
+        </p:spPr>
+        <p:style>
+          <a:lnRef idx="2">
+            <a:schemeClr val="accent1">
+              <a:shade val="50000"/>
+            </a:schemeClr>
+          </a:lnRef>
+          <a:fillRef idx="1">
+            <a:schemeClr val="accent1"/>
+          </a:fillRef>
+          <a:effectRef idx="0">
+            <a:schemeClr val="accent1"/>
+          </a:effectRef>
+          <a:fontRef idx="minor">
+            <a:schemeClr val="lt1"/>
+          </a:fontRef>
+        </p:style>
+        <p:txBody>
+          <a:bodyPr rtlCol="0" anchor="ctr"/>
+          <a:lstStyle/>
+          <a:p>
+            <a:pPr algn="ctr"/>
+            <a:r>
+              <a:rPr lang="en-US" dirty="0"/>
+              <a:t>Spring Boot </a:t>
+            </a:r>
+            <a:endParaRPr lang="en-IN" dirty="0"/>
+          </a:p>
+        </p:txBody>
+      </p:sp>
+      <p:sp>
+        <p:nvSpPr>
+          <p:cNvPr id="5" name="Rectangle 4">
+            <a:extLst>
+              <a:ext uri="{FF2B5EF4-FFF2-40B4-BE49-F238E27FC236}">
+                <a16:creationId xmlns:a16="http://schemas.microsoft.com/office/drawing/2014/main" id="{FA6ED809-1CE0-4983-AD9F-01B3CEB47309}"/>
+              </a:ext>
+            </a:extLst>
+          </p:cNvPr>
+          <p:cNvSpPr/>
+          <p:nvPr/>
+        </p:nvSpPr>
+        <p:spPr>
+          <a:xfrm>
+            <a:off x="4593731" y="1429305"/>
+            <a:ext cx="2341208" cy="656947"/>
+          </a:xfrm>
+          <a:prstGeom prst="rect">
+            <a:avLst/>
+          </a:prstGeom>
+        </p:spPr>
+        <p:style>
+          <a:lnRef idx="2">
+            <a:schemeClr val="accent1">
+              <a:shade val="50000"/>
+            </a:schemeClr>
+          </a:lnRef>
+          <a:fillRef idx="1">
+            <a:schemeClr val="accent1"/>
+          </a:fillRef>
+          <a:effectRef idx="0">
+            <a:schemeClr val="accent1"/>
+          </a:effectRef>
+          <a:fontRef idx="minor">
+            <a:schemeClr val="lt1"/>
+          </a:fontRef>
+        </p:style>
+        <p:txBody>
+          <a:bodyPr rtlCol="0" anchor="ctr"/>
+          <a:lstStyle/>
+          <a:p>
+            <a:pPr algn="ctr"/>
+            <a:r>
+              <a:rPr lang="en-US" dirty="0" err="1"/>
+              <a:t>DockerFile</a:t>
+            </a:r>
+            <a:endParaRPr lang="en-IN" dirty="0"/>
+          </a:p>
+        </p:txBody>
+      </p:sp>
+      <p:sp>
+        <p:nvSpPr>
+          <p:cNvPr id="6" name="Rectangle 5">
+            <a:extLst>
+              <a:ext uri="{FF2B5EF4-FFF2-40B4-BE49-F238E27FC236}">
+                <a16:creationId xmlns:a16="http://schemas.microsoft.com/office/drawing/2014/main" id="{8EE79675-238D-442A-BFDF-3B5A23499AF4}"/>
+              </a:ext>
+            </a:extLst>
+          </p:cNvPr>
+          <p:cNvSpPr/>
+          <p:nvPr/>
+        </p:nvSpPr>
+        <p:spPr>
+          <a:xfrm>
+            <a:off x="8279443" y="1429303"/>
+            <a:ext cx="2341208" cy="656947"/>
+          </a:xfrm>
+          <a:prstGeom prst="rect">
+            <a:avLst/>
+          </a:prstGeom>
+        </p:spPr>
+        <p:style>
+          <a:lnRef idx="2">
+            <a:schemeClr val="accent1">
+              <a:shade val="50000"/>
+            </a:schemeClr>
+          </a:lnRef>
+          <a:fillRef idx="1">
+            <a:schemeClr val="accent1"/>
+          </a:fillRef>
+          <a:effectRef idx="0">
+            <a:schemeClr val="accent1"/>
+          </a:effectRef>
+          <a:fontRef idx="minor">
+            <a:schemeClr val="lt1"/>
+          </a:fontRef>
+        </p:style>
+        <p:txBody>
+          <a:bodyPr rtlCol="0" anchor="ctr"/>
+          <a:lstStyle/>
+          <a:p>
+            <a:pPr algn="ctr"/>
+            <a:r>
+              <a:rPr lang="en-US" dirty="0"/>
+              <a:t>Docker Image</a:t>
+            </a:r>
+            <a:endParaRPr lang="en-IN" dirty="0"/>
+          </a:p>
+        </p:txBody>
+      </p:sp>
+      <p:cxnSp>
+        <p:nvCxnSpPr>
+          <p:cNvPr id="8" name="Straight Arrow Connector 7">
+            <a:extLst>
+              <a:ext uri="{FF2B5EF4-FFF2-40B4-BE49-F238E27FC236}">
+                <a16:creationId xmlns:a16="http://schemas.microsoft.com/office/drawing/2014/main" id="{2B7145A7-9D76-4EA9-9BD5-A1B0951FF667}"/>
+              </a:ext>
+            </a:extLst>
+          </p:cNvPr>
+          <p:cNvCxnSpPr>
+            <a:endCxn id="5" idx="1"/>
+          </p:cNvCxnSpPr>
+          <p:nvPr/>
+        </p:nvCxnSpPr>
+        <p:spPr>
+          <a:xfrm>
+            <a:off x="3764132" y="1757777"/>
+            <a:ext cx="829599" cy="2"/>
+          </a:xfrm>
+          <a:prstGeom prst="straightConnector1">
+            <a:avLst/>
+          </a:prstGeom>
+          <a:ln>
+            <a:tailEnd type="triangle"/>
+          </a:ln>
+        </p:spPr>
+        <p:style>
+          <a:lnRef idx="1">
+            <a:schemeClr val="accent1"/>
+          </a:lnRef>
+          <a:fillRef idx="0">
+            <a:schemeClr val="accent1"/>
+          </a:fillRef>
+          <a:effectRef idx="0">
+            <a:schemeClr val="accent1"/>
+          </a:effectRef>
+          <a:fontRef idx="minor">
+            <a:schemeClr val="tx1"/>
+          </a:fontRef>
+        </p:style>
+      </p:cxnSp>
+      <p:cxnSp>
+        <p:nvCxnSpPr>
+          <p:cNvPr id="10" name="Straight Arrow Connector 9">
+            <a:extLst>
+              <a:ext uri="{FF2B5EF4-FFF2-40B4-BE49-F238E27FC236}">
+                <a16:creationId xmlns:a16="http://schemas.microsoft.com/office/drawing/2014/main" id="{F032D80D-ED98-4666-A34D-3C549C5904B3}"/>
+              </a:ext>
+            </a:extLst>
+          </p:cNvPr>
+          <p:cNvCxnSpPr>
+            <a:stCxn id="5" idx="3"/>
+            <a:endCxn id="6" idx="1"/>
+          </p:cNvCxnSpPr>
+          <p:nvPr/>
+        </p:nvCxnSpPr>
+        <p:spPr>
+          <a:xfrm flipV="1">
+            <a:off x="6934939" y="1757777"/>
+            <a:ext cx="1344504" cy="2"/>
+          </a:xfrm>
+          <a:prstGeom prst="straightConnector1">
+            <a:avLst/>
+          </a:prstGeom>
+          <a:ln>
+            <a:tailEnd type="triangle"/>
+          </a:ln>
+        </p:spPr>
+        <p:style>
+          <a:lnRef idx="1">
+            <a:schemeClr val="accent1"/>
+          </a:lnRef>
+          <a:fillRef idx="0">
+            <a:schemeClr val="accent1"/>
+          </a:fillRef>
+          <a:effectRef idx="0">
+            <a:schemeClr val="accent1"/>
+          </a:effectRef>
+          <a:fontRef idx="minor">
+            <a:schemeClr val="tx1"/>
+          </a:fontRef>
+        </p:style>
+      </p:cxnSp>
+      <p:sp>
+        <p:nvSpPr>
+          <p:cNvPr id="11" name="TextBox 10">
+            <a:extLst>
+              <a:ext uri="{FF2B5EF4-FFF2-40B4-BE49-F238E27FC236}">
+                <a16:creationId xmlns:a16="http://schemas.microsoft.com/office/drawing/2014/main" id="{F49CCB65-8358-4CDD-867E-E3AA55AEB8CC}"/>
+              </a:ext>
+            </a:extLst>
+          </p:cNvPr>
+          <p:cNvSpPr txBox="1"/>
+          <p:nvPr/>
+        </p:nvSpPr>
+        <p:spPr>
+          <a:xfrm>
+            <a:off x="3840538" y="1480778"/>
+            <a:ext cx="676788" cy="276999"/>
+          </a:xfrm>
+          <a:prstGeom prst="rect">
+            <a:avLst/>
+          </a:prstGeom>
+          <a:noFill/>
+        </p:spPr>
+        <p:txBody>
+          <a:bodyPr wrap="none" rtlCol="0">
+            <a:spAutoFit/>
+          </a:bodyPr>
+          <a:lstStyle/>
+          <a:p>
+            <a:r>
+              <a:rPr lang="en-US" sz="1200" dirty="0"/>
+              <a:t>Create</a:t>
+            </a:r>
+            <a:endParaRPr lang="en-IN" sz="1200" dirty="0"/>
+          </a:p>
+        </p:txBody>
+      </p:sp>
+      <p:sp>
+        <p:nvSpPr>
+          <p:cNvPr id="12" name="TextBox 11">
+            <a:extLst>
+              <a:ext uri="{FF2B5EF4-FFF2-40B4-BE49-F238E27FC236}">
+                <a16:creationId xmlns:a16="http://schemas.microsoft.com/office/drawing/2014/main" id="{F14D6DED-74CD-44BA-AF8A-9AA9D4654CF5}"/>
+              </a:ext>
+            </a:extLst>
+          </p:cNvPr>
+          <p:cNvSpPr txBox="1"/>
+          <p:nvPr/>
+        </p:nvSpPr>
+        <p:spPr>
+          <a:xfrm>
+            <a:off x="7015320" y="1506516"/>
+            <a:ext cx="1098378" cy="276999"/>
+          </a:xfrm>
+          <a:prstGeom prst="rect">
+            <a:avLst/>
+          </a:prstGeom>
+          <a:noFill/>
+        </p:spPr>
+        <p:txBody>
+          <a:bodyPr wrap="none" rtlCol="0">
+            <a:spAutoFit/>
+          </a:bodyPr>
+          <a:lstStyle/>
+          <a:p>
+            <a:r>
+              <a:rPr lang="en-US" sz="1200" dirty="0"/>
+              <a:t>Docker Build</a:t>
+            </a:r>
+            <a:endParaRPr lang="en-IN" sz="1200" dirty="0"/>
+          </a:p>
+        </p:txBody>
+      </p:sp>
+      <p:sp>
+        <p:nvSpPr>
+          <p:cNvPr id="14" name="Rectangle 13">
+            <a:extLst>
+              <a:ext uri="{FF2B5EF4-FFF2-40B4-BE49-F238E27FC236}">
+                <a16:creationId xmlns:a16="http://schemas.microsoft.com/office/drawing/2014/main" id="{4BEC47F0-2CF9-472A-A2AC-9073F28E9274}"/>
+              </a:ext>
+            </a:extLst>
+          </p:cNvPr>
+          <p:cNvSpPr/>
+          <p:nvPr/>
+        </p:nvSpPr>
+        <p:spPr>
+          <a:xfrm>
+            <a:off x="8279443" y="2965137"/>
+            <a:ext cx="2341208" cy="656947"/>
+          </a:xfrm>
+          <a:prstGeom prst="rect">
+            <a:avLst/>
+          </a:prstGeom>
+        </p:spPr>
+        <p:style>
+          <a:lnRef idx="2">
+            <a:schemeClr val="accent1">
+              <a:shade val="50000"/>
+            </a:schemeClr>
+          </a:lnRef>
+          <a:fillRef idx="1">
+            <a:schemeClr val="accent1"/>
+          </a:fillRef>
+          <a:effectRef idx="0">
+            <a:schemeClr val="accent1"/>
+          </a:effectRef>
+          <a:fontRef idx="minor">
+            <a:schemeClr val="lt1"/>
+          </a:fontRef>
+        </p:style>
+        <p:txBody>
+          <a:bodyPr rtlCol="0" anchor="ctr"/>
+          <a:lstStyle/>
+          <a:p>
+            <a:pPr algn="ctr"/>
+            <a:r>
+              <a:rPr lang="en-US" dirty="0"/>
+              <a:t>Docker Container</a:t>
+            </a:r>
+            <a:endParaRPr lang="en-IN" dirty="0"/>
+          </a:p>
+        </p:txBody>
+      </p:sp>
+      <p:cxnSp>
+        <p:nvCxnSpPr>
+          <p:cNvPr id="16" name="Straight Arrow Connector 15">
+            <a:extLst>
+              <a:ext uri="{FF2B5EF4-FFF2-40B4-BE49-F238E27FC236}">
+                <a16:creationId xmlns:a16="http://schemas.microsoft.com/office/drawing/2014/main" id="{06B76A86-3B4E-42E7-B564-CE2A47A79D6D}"/>
+              </a:ext>
+            </a:extLst>
+          </p:cNvPr>
+          <p:cNvCxnSpPr>
+            <a:stCxn id="6" idx="2"/>
+            <a:endCxn id="14" idx="0"/>
+          </p:cNvCxnSpPr>
+          <p:nvPr/>
+        </p:nvCxnSpPr>
+        <p:spPr>
+          <a:xfrm>
+            <a:off x="9450047" y="2086250"/>
+            <a:ext cx="0" cy="878887"/>
+          </a:xfrm>
+          <a:prstGeom prst="straightConnector1">
+            <a:avLst/>
+          </a:prstGeom>
+          <a:ln>
+            <a:tailEnd type="triangle"/>
+          </a:ln>
+        </p:spPr>
+        <p:style>
+          <a:lnRef idx="1">
+            <a:schemeClr val="accent1"/>
+          </a:lnRef>
+          <a:fillRef idx="0">
+            <a:schemeClr val="accent1"/>
+          </a:fillRef>
+          <a:effectRef idx="0">
+            <a:schemeClr val="accent1"/>
+          </a:effectRef>
+          <a:fontRef idx="minor">
+            <a:schemeClr val="tx1"/>
+          </a:fontRef>
+        </p:style>
+      </p:cxnSp>
+      <p:sp>
+        <p:nvSpPr>
+          <p:cNvPr id="17" name="TextBox 16">
+            <a:extLst>
+              <a:ext uri="{FF2B5EF4-FFF2-40B4-BE49-F238E27FC236}">
+                <a16:creationId xmlns:a16="http://schemas.microsoft.com/office/drawing/2014/main" id="{584C473E-2E29-4656-A025-3AA199DC53AC}"/>
+              </a:ext>
+            </a:extLst>
+          </p:cNvPr>
+          <p:cNvSpPr txBox="1"/>
+          <p:nvPr/>
+        </p:nvSpPr>
+        <p:spPr>
+          <a:xfrm>
+            <a:off x="9552373" y="2503503"/>
+            <a:ext cx="978153" cy="276999"/>
+          </a:xfrm>
+          <a:prstGeom prst="rect">
+            <a:avLst/>
+          </a:prstGeom>
+          <a:noFill/>
+        </p:spPr>
+        <p:txBody>
+          <a:bodyPr wrap="none" rtlCol="0">
+            <a:spAutoFit/>
+          </a:bodyPr>
+          <a:lstStyle/>
+          <a:p>
+            <a:r>
+              <a:rPr lang="en-US" sz="1200" dirty="0"/>
+              <a:t>Docker run</a:t>
+            </a:r>
+            <a:endParaRPr lang="en-IN" sz="1200" dirty="0"/>
+          </a:p>
+        </p:txBody>
+      </p:sp>
+      <p:sp>
+        <p:nvSpPr>
+          <p:cNvPr id="18" name="TextBox 17">
+            <a:extLst>
+              <a:ext uri="{FF2B5EF4-FFF2-40B4-BE49-F238E27FC236}">
+                <a16:creationId xmlns:a16="http://schemas.microsoft.com/office/drawing/2014/main" id="{D829BD5C-ABDA-4CAA-98B0-CB0B5EB2135A}"/>
+              </a:ext>
+            </a:extLst>
+          </p:cNvPr>
+          <p:cNvSpPr txBox="1"/>
+          <p:nvPr/>
+        </p:nvSpPr>
+        <p:spPr>
+          <a:xfrm>
+            <a:off x="1343025" y="4136995"/>
+            <a:ext cx="5958682" cy="338554"/>
+          </a:xfrm>
+          <a:prstGeom prst="rect">
+            <a:avLst/>
+          </a:prstGeom>
+          <a:noFill/>
+        </p:spPr>
+        <p:txBody>
+          <a:bodyPr wrap="none" rtlCol="0">
+            <a:spAutoFit/>
+          </a:bodyPr>
+          <a:lstStyle/>
+          <a:p>
+            <a:r>
+              <a:rPr lang="en-US" sz="1600" b="1" dirty="0"/>
+              <a:t>Docker File: </a:t>
+            </a:r>
+            <a:r>
+              <a:rPr lang="en-US" sz="1600" dirty="0"/>
+              <a:t>Text file with instructions to build Docker Image</a:t>
+            </a:r>
+            <a:endParaRPr lang="en-IN" sz="1600" dirty="0"/>
+          </a:p>
+        </p:txBody>
+      </p:sp>
+    </p:spTree>
+    <p:extLst>
+      <p:ext uri="{BB962C8B-B14F-4D97-AF65-F5344CB8AC3E}">
+        <p14:creationId xmlns:p14="http://schemas.microsoft.com/office/powerpoint/2010/main" val="1861261768"/>
+      </p:ext>
+    </p:extLst>
+  </p:cSld>
+  <p:clrMapOvr>
+    <a:masterClrMapping/>
+  </p:clrMapOvr>
+</p:sld>
+</file>
+
+<file path=ppt/slides/slide6.xml><?xml version="1.0" encoding="utf-8"?>
+<p:sld xmlns:a="http://schemas.openxmlformats.org/drawingml/2006/main" xmlns:r="http://schemas.openxmlformats.org/officeDocument/2006/relationships" xmlns:p="http://schemas.openxmlformats.org/presentationml/2006/main">
+  <p:cSld>
+    <p:spTree>
+      <p:nvGrpSpPr>
+        <p:cNvPr id="1" name=""/>
+        <p:cNvGrpSpPr/>
+        <p:nvPr/>
+      </p:nvGrpSpPr>
+      <p:grpSpPr>
+        <a:xfrm>
+          <a:off x="0" y="0"/>
+          <a:ext cx="0" cy="0"/>
+          <a:chOff x="0" y="0"/>
+          <a:chExt cx="0" cy="0"/>
+        </a:xfrm>
+      </p:grpSpPr>
+      <p:sp>
+        <p:nvSpPr>
+          <p:cNvPr id="2" name="Title 1">
+            <a:extLst>
+              <a:ext uri="{FF2B5EF4-FFF2-40B4-BE49-F238E27FC236}">
+                <a16:creationId xmlns:a16="http://schemas.microsoft.com/office/drawing/2014/main" id="{515A14AB-18C4-4726-A2F1-566BDAA3BB20}"/>
+              </a:ext>
+            </a:extLst>
+          </p:cNvPr>
+          <p:cNvSpPr>
+            <a:spLocks noGrp="1"/>
+          </p:cNvSpPr>
+          <p:nvPr>
+            <p:ph type="title"/>
+          </p:nvPr>
+        </p:nvSpPr>
+        <p:spPr>
+          <a:xfrm>
+            <a:off x="1343025" y="328840"/>
+            <a:ext cx="10406063" cy="496784"/>
+          </a:xfrm>
+        </p:spPr>
+        <p:txBody>
+          <a:bodyPr>
+            <a:normAutofit/>
+          </a:bodyPr>
+          <a:lstStyle/>
+          <a:p>
+            <a:r>
+              <a:rPr lang="en-US" sz="2800" dirty="0" err="1"/>
+              <a:t>DockerFile</a:t>
+            </a:r>
+            <a:r>
+              <a:rPr lang="en-US" sz="2800" dirty="0"/>
+              <a:t> Script</a:t>
+            </a:r>
+            <a:endParaRPr lang="en-IN" sz="2800" dirty="0"/>
+          </a:p>
+        </p:txBody>
+      </p:sp>
+      <p:sp>
+        <p:nvSpPr>
+          <p:cNvPr id="3" name="Content Placeholder 2">
+            <a:extLst>
+              <a:ext uri="{FF2B5EF4-FFF2-40B4-BE49-F238E27FC236}">
+                <a16:creationId xmlns:a16="http://schemas.microsoft.com/office/drawing/2014/main" id="{4ACFA12B-DD8F-4708-828C-613C2247E9D6}"/>
+              </a:ext>
+            </a:extLst>
+          </p:cNvPr>
+          <p:cNvSpPr>
+            <a:spLocks noGrp="1"/>
+          </p:cNvSpPr>
+          <p:nvPr>
+            <p:ph idx="1"/>
+          </p:nvPr>
+        </p:nvSpPr>
+        <p:spPr>
+          <a:xfrm>
+            <a:off x="1343025" y="958788"/>
+            <a:ext cx="10406063" cy="5457887"/>
+          </a:xfrm>
+        </p:spPr>
+        <p:txBody>
+          <a:bodyPr/>
+          <a:lstStyle/>
+          <a:p>
+            <a:pPr marL="0" indent="0">
+              <a:lnSpc>
+                <a:spcPct val="100000"/>
+              </a:lnSpc>
+              <a:buNone/>
+            </a:pPr>
+            <a:r>
+              <a:rPr lang="en-US" sz="1600" dirty="0"/>
+              <a:t># Need to tell Docker what type of application is being deployed. The below command downloads the image from Docker Hub</a:t>
+            </a:r>
+          </a:p>
+          <a:p>
+            <a:pPr marL="0" indent="0">
+              <a:lnSpc>
+                <a:spcPct val="100000"/>
+              </a:lnSpc>
+              <a:buNone/>
+            </a:pPr>
+            <a:r>
+              <a:rPr lang="en-US" sz="1600" dirty="0"/>
+              <a:t>#FROM &lt;IMAGE-NAME:VERSION&gt;</a:t>
+            </a:r>
+          </a:p>
+          <a:p>
+            <a:pPr marL="0" indent="0">
+              <a:buNone/>
+            </a:pPr>
+            <a:r>
+              <a:rPr lang="en-US" sz="1600" b="1" dirty="0"/>
+              <a:t>FROM openjdk:8</a:t>
+            </a:r>
+          </a:p>
+          <a:p>
+            <a:pPr marL="0" indent="0">
+              <a:buNone/>
+            </a:pPr>
+            <a:r>
+              <a:rPr lang="en-US" sz="1600" dirty="0"/>
+              <a:t>#Add the JAR which is built by our application into the Docker Container</a:t>
+            </a:r>
+          </a:p>
+          <a:p>
+            <a:pPr marL="0" indent="0">
+              <a:buNone/>
+            </a:pPr>
+            <a:r>
+              <a:rPr lang="en-US" sz="1600" b="1" dirty="0"/>
+              <a:t>ADD target/spring-boot-docker.jar spring-boot-docker.jar</a:t>
+            </a:r>
+          </a:p>
+          <a:p>
+            <a:pPr marL="0" indent="0">
+              <a:buNone/>
+            </a:pPr>
+            <a:r>
+              <a:rPr lang="en-US" sz="1600" dirty="0"/>
+              <a:t>#Expose application port</a:t>
+            </a:r>
+          </a:p>
+          <a:p>
+            <a:pPr marL="0" indent="0">
+              <a:buNone/>
+            </a:pPr>
+            <a:r>
+              <a:rPr lang="en-US" sz="1600" b="1" dirty="0"/>
+              <a:t>EXPOSE 8080</a:t>
+            </a:r>
+          </a:p>
+          <a:p>
+            <a:pPr marL="0" indent="0">
+              <a:buNone/>
+            </a:pPr>
+            <a:r>
+              <a:rPr lang="en-US" sz="1600" dirty="0"/>
+              <a:t>#EntryPoint is the command used to start the container</a:t>
+            </a:r>
+          </a:p>
+          <a:p>
+            <a:pPr marL="0" indent="0">
+              <a:buNone/>
+            </a:pPr>
+            <a:r>
+              <a:rPr lang="en-US" sz="1600" b="1" dirty="0"/>
+              <a:t>ENTRYPOINT [“java”, “-jar”, “spring-boot-docker.jar”]</a:t>
+            </a:r>
+          </a:p>
+          <a:p>
+            <a:pPr marL="0" indent="0">
+              <a:buNone/>
+            </a:pPr>
+            <a:endParaRPr lang="en-US" sz="1600" b="1" dirty="0"/>
+          </a:p>
+          <a:p>
+            <a:pPr marL="0" indent="0">
+              <a:buNone/>
+            </a:pPr>
+            <a:endParaRPr lang="en-IN" sz="1600" b="1" dirty="0"/>
+          </a:p>
+        </p:txBody>
+      </p:sp>
+    </p:spTree>
+    <p:extLst>
+      <p:ext uri="{BB962C8B-B14F-4D97-AF65-F5344CB8AC3E}">
+        <p14:creationId xmlns:p14="http://schemas.microsoft.com/office/powerpoint/2010/main" val="1044793846"/>
+      </p:ext>
+    </p:extLst>
+  </p:cSld>
+  <p:clrMapOvr>
+    <a:masterClrMapping/>
+  </p:clrMapOvr>
+</p:sld>
+</file>
+
+<file path=ppt/slides/slide7.xml><?xml version="1.0" encoding="utf-8"?>
+<p:sld xmlns:a="http://schemas.openxmlformats.org/drawingml/2006/main" xmlns:r="http://schemas.openxmlformats.org/officeDocument/2006/relationships" xmlns:p="http://schemas.openxmlformats.org/presentationml/2006/main">
+  <p:cSld>
+    <p:spTree>
+      <p:nvGrpSpPr>
+        <p:cNvPr id="1" name=""/>
+        <p:cNvGrpSpPr/>
+        <p:nvPr/>
+      </p:nvGrpSpPr>
+      <p:grpSpPr>
+        <a:xfrm>
+          <a:off x="0" y="0"/>
+          <a:ext cx="0" cy="0"/>
+          <a:chOff x="0" y="0"/>
+          <a:chExt cx="0" cy="0"/>
+        </a:xfrm>
+      </p:grpSpPr>
+      <p:sp>
+        <p:nvSpPr>
+          <p:cNvPr id="2" name="Title 1">
+            <a:extLst>
+              <a:ext uri="{FF2B5EF4-FFF2-40B4-BE49-F238E27FC236}">
+                <a16:creationId xmlns:a16="http://schemas.microsoft.com/office/drawing/2014/main" id="{8E3835F7-E17D-4BCF-BB32-2F69EA94C302}"/>
+              </a:ext>
+            </a:extLst>
+          </p:cNvPr>
+          <p:cNvSpPr>
+            <a:spLocks noGrp="1"/>
+          </p:cNvSpPr>
+          <p:nvPr>
+            <p:ph type="title"/>
+          </p:nvPr>
+        </p:nvSpPr>
+        <p:spPr>
+          <a:xfrm>
+            <a:off x="1343025" y="328839"/>
+            <a:ext cx="10406063" cy="541173"/>
+          </a:xfrm>
+        </p:spPr>
+        <p:txBody>
+          <a:bodyPr>
+            <a:normAutofit/>
+          </a:bodyPr>
+          <a:lstStyle/>
+          <a:p>
+            <a:r>
+              <a:rPr lang="en-US" sz="2800" dirty="0"/>
+              <a:t>Run </a:t>
+            </a:r>
+            <a:r>
+              <a:rPr lang="en-US" sz="2800" dirty="0" err="1"/>
+              <a:t>DockerFile</a:t>
+            </a:r>
+            <a:endParaRPr lang="en-IN" sz="2800" dirty="0"/>
+          </a:p>
+        </p:txBody>
+      </p:sp>
+      <p:sp>
+        <p:nvSpPr>
+          <p:cNvPr id="3" name="Content Placeholder 2">
+            <a:extLst>
+              <a:ext uri="{FF2B5EF4-FFF2-40B4-BE49-F238E27FC236}">
+                <a16:creationId xmlns:a16="http://schemas.microsoft.com/office/drawing/2014/main" id="{0F70F85C-D99B-41FF-9538-C04F808FCF7B}"/>
+              </a:ext>
+            </a:extLst>
+          </p:cNvPr>
+          <p:cNvSpPr>
+            <a:spLocks noGrp="1"/>
+          </p:cNvSpPr>
+          <p:nvPr>
+            <p:ph idx="1"/>
+          </p:nvPr>
+        </p:nvSpPr>
+        <p:spPr>
+          <a:xfrm>
+            <a:off x="1343025" y="1004132"/>
+            <a:ext cx="10406063" cy="4356100"/>
+          </a:xfrm>
+        </p:spPr>
+        <p:txBody>
+          <a:bodyPr/>
+          <a:lstStyle/>
+          <a:p>
+            <a:pPr marL="0" indent="0">
+              <a:buNone/>
+            </a:pPr>
+            <a:r>
+              <a:rPr lang="en-US" sz="1400" dirty="0"/>
+              <a:t>Build the application in Docker Container by creating a docker image</a:t>
+            </a:r>
+          </a:p>
+          <a:p>
+            <a:pPr marL="0" indent="0">
+              <a:buNone/>
+            </a:pPr>
+            <a:r>
+              <a:rPr lang="en-US" sz="1400" dirty="0"/>
+              <a:t>#docker build –f &lt;FILE-NAME&gt; -t &lt;IMAGE-NAME&gt; &lt;Directory path of the </a:t>
+            </a:r>
+            <a:r>
+              <a:rPr lang="en-US" sz="1400" dirty="0" err="1"/>
+              <a:t>DockerFile</a:t>
+            </a:r>
+            <a:r>
+              <a:rPr lang="en-US" sz="1400" dirty="0"/>
+              <a:t>&gt;</a:t>
+            </a:r>
+          </a:p>
+          <a:p>
+            <a:pPr marL="0" indent="0">
+              <a:buNone/>
+            </a:pPr>
+            <a:r>
+              <a:rPr lang="en-US" sz="1400" b="1" dirty="0"/>
+              <a:t>docker build –f </a:t>
+            </a:r>
+            <a:r>
+              <a:rPr lang="en-US" sz="1400" b="1" dirty="0" err="1"/>
+              <a:t>DockerFile</a:t>
+            </a:r>
+            <a:r>
+              <a:rPr lang="en-US" sz="1400" b="1" dirty="0"/>
+              <a:t> –t docker-image-name .</a:t>
+            </a:r>
+          </a:p>
+          <a:p>
+            <a:pPr marL="0" indent="0">
+              <a:buNone/>
+            </a:pPr>
+            <a:endParaRPr lang="en-US" sz="1400" b="1" dirty="0"/>
+          </a:p>
+          <a:p>
+            <a:pPr marL="0" indent="0">
+              <a:buNone/>
+            </a:pPr>
+            <a:r>
+              <a:rPr lang="en-US" sz="1400" dirty="0"/>
+              <a:t>Run the Docker container</a:t>
+            </a:r>
+          </a:p>
+          <a:p>
+            <a:pPr marL="0" indent="0">
+              <a:buNone/>
+            </a:pPr>
+            <a:r>
+              <a:rPr lang="en-US" sz="1400" dirty="0"/>
+              <a:t>#docker run –p &lt;system port&gt;: &lt;container port&gt; &lt;IMAGE-NAME&gt;</a:t>
+            </a:r>
+          </a:p>
+          <a:p>
+            <a:pPr marL="0" indent="0">
+              <a:buNone/>
+            </a:pPr>
+            <a:r>
+              <a:rPr lang="en-US" sz="1400" b="1" dirty="0"/>
+              <a:t>docker run –p 8080:8080 docker-image-name</a:t>
+            </a:r>
+            <a:endParaRPr lang="en-IN" sz="1400" b="1" dirty="0"/>
+          </a:p>
+        </p:txBody>
+      </p:sp>
+    </p:spTree>
+    <p:extLst>
+      <p:ext uri="{BB962C8B-B14F-4D97-AF65-F5344CB8AC3E}">
+        <p14:creationId xmlns:p14="http://schemas.microsoft.com/office/powerpoint/2010/main" val="1726704696"/>
+      </p:ext>
+    </p:extLst>
+  </p:cSld>
+  <p:clrMapOvr>
+    <a:masterClrMapping/>
+  </p:clrMapOvr>
+</p:sld>
+</file>
+
+<file path=ppt/slides/slide8.xml><?xml version="1.0" encoding="utf-8"?>
 <p:sld xmlns:a="http://schemas.openxmlformats.org/drawingml/2006/main" xmlns:r="http://schemas.openxmlformats.org/officeDocument/2006/relationships" xmlns:p="http://schemas.openxmlformats.org/presentationml/2006/main">
   <p:cSld>
     <p:spTree>
@@ -7310,7 +10208,7 @@
 </p:sld>
 </file>
 
-<file path=ppt/slides/slide6.xml><?xml version="1.0" encoding="utf-8"?>
+<file path=ppt/slides/slide9.xml><?xml version="1.0" encoding="utf-8"?>
 <p:sld xmlns:a="http://schemas.openxmlformats.org/drawingml/2006/main" xmlns:r="http://schemas.openxmlformats.org/officeDocument/2006/relationships" xmlns:p="http://schemas.openxmlformats.org/presentationml/2006/main">
   <p:cSld>
     <p:spTree>
@@ -7407,603 +10305,6 @@
     <p:extLst>
       <p:ext uri="{BB962C8B-B14F-4D97-AF65-F5344CB8AC3E}">
         <p14:creationId xmlns:p14="http://schemas.microsoft.com/office/powerpoint/2010/main" val="789732290"/>
-      </p:ext>
-    </p:extLst>
-  </p:cSld>
-  <p:clrMapOvr>
-    <a:masterClrMapping/>
-  </p:clrMapOvr>
-</p:sld>
-</file>
-
-<file path=ppt/slides/slide7.xml><?xml version="1.0" encoding="utf-8"?>
-<p:sld xmlns:a="http://schemas.openxmlformats.org/drawingml/2006/main" xmlns:r="http://schemas.openxmlformats.org/officeDocument/2006/relationships" xmlns:p="http://schemas.openxmlformats.org/presentationml/2006/main">
-  <p:cSld>
-    <p:spTree>
-      <p:nvGrpSpPr>
-        <p:cNvPr id="1" name=""/>
-        <p:cNvGrpSpPr/>
-        <p:nvPr/>
-      </p:nvGrpSpPr>
-      <p:grpSpPr>
-        <a:xfrm>
-          <a:off x="0" y="0"/>
-          <a:ext cx="0" cy="0"/>
-          <a:chOff x="0" y="0"/>
-          <a:chExt cx="0" cy="0"/>
-        </a:xfrm>
-      </p:grpSpPr>
-      <p:sp>
-        <p:nvSpPr>
-          <p:cNvPr id="6" name="Content Placeholder 5">
-            <a:extLst>
-              <a:ext uri="{FF2B5EF4-FFF2-40B4-BE49-F238E27FC236}">
-                <a16:creationId xmlns:a16="http://schemas.microsoft.com/office/drawing/2014/main" id="{CE28E35D-9620-406A-8D70-FFB6367A26E9}"/>
-              </a:ext>
-            </a:extLst>
-          </p:cNvPr>
-          <p:cNvSpPr>
-            <a:spLocks noGrp="1"/>
-          </p:cNvSpPr>
-          <p:nvPr>
-            <p:ph idx="1"/>
-          </p:nvPr>
-        </p:nvSpPr>
-        <p:spPr>
-          <a:xfrm>
-            <a:off x="1343025" y="1704975"/>
-            <a:ext cx="10406063" cy="4711700"/>
-          </a:xfrm>
-        </p:spPr>
-        <p:txBody>
-          <a:bodyPr/>
-          <a:lstStyle/>
-          <a:p>
-            <a:pPr marL="0" indent="0" algn="ctr">
-              <a:buNone/>
-            </a:pPr>
-            <a:r>
-              <a:rPr lang="en-US" dirty="0"/>
-              <a:t>Containerized Application</a:t>
-            </a:r>
-            <a:endParaRPr lang="en-IN" dirty="0"/>
-          </a:p>
-        </p:txBody>
-      </p:sp>
-      <p:sp>
-        <p:nvSpPr>
-          <p:cNvPr id="7" name="Rectangle 6">
-            <a:extLst>
-              <a:ext uri="{FF2B5EF4-FFF2-40B4-BE49-F238E27FC236}">
-                <a16:creationId xmlns:a16="http://schemas.microsoft.com/office/drawing/2014/main" id="{184E1010-F8D6-4324-BA66-2B2A26405996}"/>
-              </a:ext>
-            </a:extLst>
-          </p:cNvPr>
-          <p:cNvSpPr/>
-          <p:nvPr/>
-        </p:nvSpPr>
-        <p:spPr>
-          <a:xfrm>
-            <a:off x="2266949" y="5405437"/>
-            <a:ext cx="8239125" cy="600075"/>
-          </a:xfrm>
-          <a:prstGeom prst="rect">
-            <a:avLst/>
-          </a:prstGeom>
-          <a:solidFill>
-            <a:srgbClr val="62C3AA"/>
-          </a:solidFill>
-        </p:spPr>
-        <p:style>
-          <a:lnRef idx="2">
-            <a:schemeClr val="accent1">
-              <a:shade val="50000"/>
-            </a:schemeClr>
-          </a:lnRef>
-          <a:fillRef idx="1">
-            <a:schemeClr val="accent1"/>
-          </a:fillRef>
-          <a:effectRef idx="0">
-            <a:schemeClr val="accent1"/>
-          </a:effectRef>
-          <a:fontRef idx="minor">
-            <a:schemeClr val="lt1"/>
-          </a:fontRef>
-        </p:style>
-        <p:txBody>
-          <a:bodyPr rtlCol="0" anchor="ctr"/>
-          <a:lstStyle/>
-          <a:p>
-            <a:pPr algn="ctr"/>
-            <a:r>
-              <a:rPr lang="en-US" dirty="0"/>
-              <a:t>Infrastructure</a:t>
-            </a:r>
-            <a:endParaRPr lang="en-IN" dirty="0"/>
-          </a:p>
-        </p:txBody>
-      </p:sp>
-      <p:sp>
-        <p:nvSpPr>
-          <p:cNvPr id="8" name="Rectangle 7">
-            <a:extLst>
-              <a:ext uri="{FF2B5EF4-FFF2-40B4-BE49-F238E27FC236}">
-                <a16:creationId xmlns:a16="http://schemas.microsoft.com/office/drawing/2014/main" id="{8F68A1FF-74E1-475D-8FA1-24158C99ADBF}"/>
-              </a:ext>
-            </a:extLst>
-          </p:cNvPr>
-          <p:cNvSpPr/>
-          <p:nvPr/>
-        </p:nvSpPr>
-        <p:spPr>
-          <a:xfrm>
-            <a:off x="2266949" y="4694236"/>
-            <a:ext cx="8239125" cy="600075"/>
-          </a:xfrm>
-          <a:prstGeom prst="rect">
-            <a:avLst/>
-          </a:prstGeom>
-          <a:solidFill>
-            <a:srgbClr val="D2E9FA"/>
-          </a:solidFill>
-        </p:spPr>
-        <p:style>
-          <a:lnRef idx="2">
-            <a:schemeClr val="accent1">
-              <a:shade val="50000"/>
-            </a:schemeClr>
-          </a:lnRef>
-          <a:fillRef idx="1">
-            <a:schemeClr val="accent1"/>
-          </a:fillRef>
-          <a:effectRef idx="0">
-            <a:schemeClr val="accent1"/>
-          </a:effectRef>
-          <a:fontRef idx="minor">
-            <a:schemeClr val="lt1"/>
-          </a:fontRef>
-        </p:style>
-        <p:txBody>
-          <a:bodyPr rtlCol="0" anchor="ctr"/>
-          <a:lstStyle/>
-          <a:p>
-            <a:pPr algn="ctr"/>
-            <a:r>
-              <a:rPr lang="en-US" dirty="0"/>
-              <a:t>Host Operating System</a:t>
-            </a:r>
-            <a:endParaRPr lang="en-IN" dirty="0"/>
-          </a:p>
-        </p:txBody>
-      </p:sp>
-      <p:sp>
-        <p:nvSpPr>
-          <p:cNvPr id="9" name="Rectangle 8">
-            <a:extLst>
-              <a:ext uri="{FF2B5EF4-FFF2-40B4-BE49-F238E27FC236}">
-                <a16:creationId xmlns:a16="http://schemas.microsoft.com/office/drawing/2014/main" id="{49797F5A-0A8D-477C-BC36-C9D9283FCA1D}"/>
-              </a:ext>
-            </a:extLst>
-          </p:cNvPr>
-          <p:cNvSpPr/>
-          <p:nvPr/>
-        </p:nvSpPr>
-        <p:spPr>
-          <a:xfrm>
-            <a:off x="2266949" y="3983035"/>
-            <a:ext cx="8239125" cy="600075"/>
-          </a:xfrm>
-          <a:prstGeom prst="rect">
-            <a:avLst/>
-          </a:prstGeom>
-          <a:solidFill>
-            <a:srgbClr val="4491CD"/>
-          </a:solidFill>
-        </p:spPr>
-        <p:style>
-          <a:lnRef idx="2">
-            <a:schemeClr val="accent1">
-              <a:shade val="50000"/>
-            </a:schemeClr>
-          </a:lnRef>
-          <a:fillRef idx="1">
-            <a:schemeClr val="accent1"/>
-          </a:fillRef>
-          <a:effectRef idx="0">
-            <a:schemeClr val="accent1"/>
-          </a:effectRef>
-          <a:fontRef idx="minor">
-            <a:schemeClr val="lt1"/>
-          </a:fontRef>
-        </p:style>
-        <p:txBody>
-          <a:bodyPr rtlCol="0" anchor="ctr"/>
-          <a:lstStyle/>
-          <a:p>
-            <a:pPr algn="ctr"/>
-            <a:r>
-              <a:rPr lang="en-US" dirty="0"/>
-              <a:t>Docker</a:t>
-            </a:r>
-            <a:endParaRPr lang="en-IN" dirty="0"/>
-          </a:p>
-        </p:txBody>
-      </p:sp>
-      <p:sp>
-        <p:nvSpPr>
-          <p:cNvPr id="10" name="Rectangle 9">
-            <a:extLst>
-              <a:ext uri="{FF2B5EF4-FFF2-40B4-BE49-F238E27FC236}">
-                <a16:creationId xmlns:a16="http://schemas.microsoft.com/office/drawing/2014/main" id="{94B16BFA-2877-46E0-A840-FE3C6AA3572B}"/>
-              </a:ext>
-            </a:extLst>
-          </p:cNvPr>
-          <p:cNvSpPr/>
-          <p:nvPr/>
-        </p:nvSpPr>
-        <p:spPr>
-          <a:xfrm>
-            <a:off x="2266949" y="2438400"/>
-            <a:ext cx="904876" cy="1433509"/>
-          </a:xfrm>
-          <a:prstGeom prst="rect">
-            <a:avLst/>
-          </a:prstGeom>
-          <a:solidFill>
-            <a:srgbClr val="4491CD"/>
-          </a:solidFill>
-        </p:spPr>
-        <p:style>
-          <a:lnRef idx="2">
-            <a:schemeClr val="accent1">
-              <a:shade val="50000"/>
-            </a:schemeClr>
-          </a:lnRef>
-          <a:fillRef idx="1">
-            <a:schemeClr val="accent1"/>
-          </a:fillRef>
-          <a:effectRef idx="0">
-            <a:schemeClr val="accent1"/>
-          </a:effectRef>
-          <a:fontRef idx="minor">
-            <a:schemeClr val="lt1"/>
-          </a:fontRef>
-        </p:style>
-        <p:txBody>
-          <a:bodyPr rtlCol="0" anchor="ctr"/>
-          <a:lstStyle/>
-          <a:p>
-            <a:pPr algn="ctr"/>
-            <a:r>
-              <a:rPr lang="en-US" dirty="0"/>
-              <a:t>App A</a:t>
-            </a:r>
-            <a:endParaRPr lang="en-IN" dirty="0"/>
-          </a:p>
-        </p:txBody>
-      </p:sp>
-      <p:sp>
-        <p:nvSpPr>
-          <p:cNvPr id="19" name="Rectangle 18">
-            <a:extLst>
-              <a:ext uri="{FF2B5EF4-FFF2-40B4-BE49-F238E27FC236}">
-                <a16:creationId xmlns:a16="http://schemas.microsoft.com/office/drawing/2014/main" id="{638A36FC-89F8-4832-9D01-B49EA1953DDD}"/>
-              </a:ext>
-            </a:extLst>
-          </p:cNvPr>
-          <p:cNvSpPr/>
-          <p:nvPr/>
-        </p:nvSpPr>
-        <p:spPr>
-          <a:xfrm>
-            <a:off x="3428999" y="2438399"/>
-            <a:ext cx="904876" cy="1433509"/>
-          </a:xfrm>
-          <a:prstGeom prst="rect">
-            <a:avLst/>
-          </a:prstGeom>
-          <a:solidFill>
-            <a:srgbClr val="4491CD"/>
-          </a:solidFill>
-        </p:spPr>
-        <p:style>
-          <a:lnRef idx="2">
-            <a:schemeClr val="accent1">
-              <a:shade val="50000"/>
-            </a:schemeClr>
-          </a:lnRef>
-          <a:fillRef idx="1">
-            <a:schemeClr val="accent1"/>
-          </a:fillRef>
-          <a:effectRef idx="0">
-            <a:schemeClr val="accent1"/>
-          </a:effectRef>
-          <a:fontRef idx="minor">
-            <a:schemeClr val="lt1"/>
-          </a:fontRef>
-        </p:style>
-        <p:txBody>
-          <a:bodyPr rtlCol="0" anchor="ctr"/>
-          <a:lstStyle/>
-          <a:p>
-            <a:pPr algn="ctr"/>
-            <a:r>
-              <a:rPr lang="en-US" dirty="0"/>
-              <a:t>App B</a:t>
-            </a:r>
-            <a:endParaRPr lang="en-IN" dirty="0"/>
-          </a:p>
-        </p:txBody>
-      </p:sp>
-      <p:sp>
-        <p:nvSpPr>
-          <p:cNvPr id="20" name="Rectangle 19">
-            <a:extLst>
-              <a:ext uri="{FF2B5EF4-FFF2-40B4-BE49-F238E27FC236}">
-                <a16:creationId xmlns:a16="http://schemas.microsoft.com/office/drawing/2014/main" id="{4CE51BE9-3162-40AA-ACA4-8B11575F0476}"/>
-              </a:ext>
-            </a:extLst>
-          </p:cNvPr>
-          <p:cNvSpPr/>
-          <p:nvPr/>
-        </p:nvSpPr>
-        <p:spPr>
-          <a:xfrm>
-            <a:off x="4591049" y="2438398"/>
-            <a:ext cx="904876" cy="1433509"/>
-          </a:xfrm>
-          <a:prstGeom prst="rect">
-            <a:avLst/>
-          </a:prstGeom>
-          <a:solidFill>
-            <a:srgbClr val="4491CD"/>
-          </a:solidFill>
-        </p:spPr>
-        <p:style>
-          <a:lnRef idx="2">
-            <a:schemeClr val="accent1">
-              <a:shade val="50000"/>
-            </a:schemeClr>
-          </a:lnRef>
-          <a:fillRef idx="1">
-            <a:schemeClr val="accent1"/>
-          </a:fillRef>
-          <a:effectRef idx="0">
-            <a:schemeClr val="accent1"/>
-          </a:effectRef>
-          <a:fontRef idx="minor">
-            <a:schemeClr val="lt1"/>
-          </a:fontRef>
-        </p:style>
-        <p:txBody>
-          <a:bodyPr rtlCol="0" anchor="ctr"/>
-          <a:lstStyle/>
-          <a:p>
-            <a:pPr algn="ctr"/>
-            <a:r>
-              <a:rPr lang="en-US" dirty="0"/>
-              <a:t>App C</a:t>
-            </a:r>
-            <a:endParaRPr lang="en-IN" dirty="0"/>
-          </a:p>
-        </p:txBody>
-      </p:sp>
-      <p:sp>
-        <p:nvSpPr>
-          <p:cNvPr id="21" name="Rectangle 20">
-            <a:extLst>
-              <a:ext uri="{FF2B5EF4-FFF2-40B4-BE49-F238E27FC236}">
-                <a16:creationId xmlns:a16="http://schemas.microsoft.com/office/drawing/2014/main" id="{6EFD4281-7C08-407A-B484-4229567E8B2E}"/>
-              </a:ext>
-            </a:extLst>
-          </p:cNvPr>
-          <p:cNvSpPr/>
-          <p:nvPr/>
-        </p:nvSpPr>
-        <p:spPr>
-          <a:xfrm>
-            <a:off x="5803104" y="2438394"/>
-            <a:ext cx="904876" cy="1433509"/>
-          </a:xfrm>
-          <a:prstGeom prst="rect">
-            <a:avLst/>
-          </a:prstGeom>
-          <a:solidFill>
-            <a:srgbClr val="4491CD"/>
-          </a:solidFill>
-        </p:spPr>
-        <p:style>
-          <a:lnRef idx="2">
-            <a:schemeClr val="accent1">
-              <a:shade val="50000"/>
-            </a:schemeClr>
-          </a:lnRef>
-          <a:fillRef idx="1">
-            <a:schemeClr val="accent1"/>
-          </a:fillRef>
-          <a:effectRef idx="0">
-            <a:schemeClr val="accent1"/>
-          </a:effectRef>
-          <a:fontRef idx="minor">
-            <a:schemeClr val="lt1"/>
-          </a:fontRef>
-        </p:style>
-        <p:txBody>
-          <a:bodyPr rtlCol="0" anchor="ctr"/>
-          <a:lstStyle/>
-          <a:p>
-            <a:pPr algn="ctr"/>
-            <a:r>
-              <a:rPr lang="en-US" dirty="0"/>
-              <a:t>App D</a:t>
-            </a:r>
-            <a:endParaRPr lang="en-IN" dirty="0"/>
-          </a:p>
-        </p:txBody>
-      </p:sp>
-      <p:sp>
-        <p:nvSpPr>
-          <p:cNvPr id="22" name="Rectangle 21">
-            <a:extLst>
-              <a:ext uri="{FF2B5EF4-FFF2-40B4-BE49-F238E27FC236}">
-                <a16:creationId xmlns:a16="http://schemas.microsoft.com/office/drawing/2014/main" id="{2739D1FA-1AAB-4CEA-BC78-8F75714FE88B}"/>
-              </a:ext>
-            </a:extLst>
-          </p:cNvPr>
-          <p:cNvSpPr/>
-          <p:nvPr/>
-        </p:nvSpPr>
-        <p:spPr>
-          <a:xfrm>
-            <a:off x="7015159" y="2438394"/>
-            <a:ext cx="904876" cy="1433509"/>
-          </a:xfrm>
-          <a:prstGeom prst="rect">
-            <a:avLst/>
-          </a:prstGeom>
-          <a:solidFill>
-            <a:srgbClr val="4491CD"/>
-          </a:solidFill>
-        </p:spPr>
-        <p:style>
-          <a:lnRef idx="2">
-            <a:schemeClr val="accent1">
-              <a:shade val="50000"/>
-            </a:schemeClr>
-          </a:lnRef>
-          <a:fillRef idx="1">
-            <a:schemeClr val="accent1"/>
-          </a:fillRef>
-          <a:effectRef idx="0">
-            <a:schemeClr val="accent1"/>
-          </a:effectRef>
-          <a:fontRef idx="minor">
-            <a:schemeClr val="lt1"/>
-          </a:fontRef>
-        </p:style>
-        <p:txBody>
-          <a:bodyPr rtlCol="0" anchor="ctr"/>
-          <a:lstStyle/>
-          <a:p>
-            <a:pPr algn="ctr"/>
-            <a:r>
-              <a:rPr lang="en-US" dirty="0"/>
-              <a:t>App E</a:t>
-            </a:r>
-            <a:endParaRPr lang="en-IN" dirty="0"/>
-          </a:p>
-        </p:txBody>
-      </p:sp>
-      <p:sp>
-        <p:nvSpPr>
-          <p:cNvPr id="23" name="Rectangle 22">
-            <a:extLst>
-              <a:ext uri="{FF2B5EF4-FFF2-40B4-BE49-F238E27FC236}">
-                <a16:creationId xmlns:a16="http://schemas.microsoft.com/office/drawing/2014/main" id="{2E94001D-92F5-457F-BE44-450C8CAAC9EF}"/>
-              </a:ext>
-            </a:extLst>
-          </p:cNvPr>
-          <p:cNvSpPr/>
-          <p:nvPr/>
-        </p:nvSpPr>
-        <p:spPr>
-          <a:xfrm>
-            <a:off x="8258173" y="2438394"/>
-            <a:ext cx="904876" cy="1433509"/>
-          </a:xfrm>
-          <a:prstGeom prst="rect">
-            <a:avLst/>
-          </a:prstGeom>
-          <a:solidFill>
-            <a:srgbClr val="4491CD"/>
-          </a:solidFill>
-        </p:spPr>
-        <p:style>
-          <a:lnRef idx="2">
-            <a:schemeClr val="accent1">
-              <a:shade val="50000"/>
-            </a:schemeClr>
-          </a:lnRef>
-          <a:fillRef idx="1">
-            <a:schemeClr val="accent1"/>
-          </a:fillRef>
-          <a:effectRef idx="0">
-            <a:schemeClr val="accent1"/>
-          </a:effectRef>
-          <a:fontRef idx="minor">
-            <a:schemeClr val="lt1"/>
-          </a:fontRef>
-        </p:style>
-        <p:txBody>
-          <a:bodyPr rtlCol="0" anchor="ctr"/>
-          <a:lstStyle/>
-          <a:p>
-            <a:pPr algn="ctr"/>
-            <a:r>
-              <a:rPr lang="en-US" dirty="0"/>
-              <a:t>App F</a:t>
-            </a:r>
-            <a:endParaRPr lang="en-IN" dirty="0"/>
-          </a:p>
-        </p:txBody>
-      </p:sp>
-      <p:sp>
-        <p:nvSpPr>
-          <p:cNvPr id="24" name="Rectangle 23">
-            <a:extLst>
-              <a:ext uri="{FF2B5EF4-FFF2-40B4-BE49-F238E27FC236}">
-                <a16:creationId xmlns:a16="http://schemas.microsoft.com/office/drawing/2014/main" id="{154930D0-3E19-4371-A953-5171C4FBC800}"/>
-              </a:ext>
-            </a:extLst>
-          </p:cNvPr>
-          <p:cNvSpPr/>
-          <p:nvPr/>
-        </p:nvSpPr>
-        <p:spPr>
-          <a:xfrm>
-            <a:off x="9601198" y="2438394"/>
-            <a:ext cx="904876" cy="1433509"/>
-          </a:xfrm>
-          <a:prstGeom prst="rect">
-            <a:avLst/>
-          </a:prstGeom>
-          <a:solidFill>
-            <a:srgbClr val="4491CD"/>
-          </a:solidFill>
-        </p:spPr>
-        <p:style>
-          <a:lnRef idx="2">
-            <a:schemeClr val="accent1">
-              <a:shade val="50000"/>
-            </a:schemeClr>
-          </a:lnRef>
-          <a:fillRef idx="1">
-            <a:schemeClr val="accent1"/>
-          </a:fillRef>
-          <a:effectRef idx="0">
-            <a:schemeClr val="accent1"/>
-          </a:effectRef>
-          <a:fontRef idx="minor">
-            <a:schemeClr val="lt1"/>
-          </a:fontRef>
-        </p:style>
-        <p:txBody>
-          <a:bodyPr rtlCol="0" anchor="ctr"/>
-          <a:lstStyle/>
-          <a:p>
-            <a:pPr algn="ctr"/>
-            <a:r>
-              <a:rPr lang="en-US" dirty="0"/>
-              <a:t>App G</a:t>
-            </a:r>
-            <a:endParaRPr lang="en-IN" dirty="0"/>
-          </a:p>
-        </p:txBody>
-      </p:sp>
-    </p:spTree>
-    <p:extLst>
-      <p:ext uri="{BB962C8B-B14F-4D97-AF65-F5344CB8AC3E}">
-        <p14:creationId xmlns:p14="http://schemas.microsoft.com/office/powerpoint/2010/main" val="668981619"/>
       </p:ext>
     </p:extLst>
   </p:cSld>

</xml_diff>